<commit_message>
worked on presentation HeuristicLab 4.0.pptx
git-svn-id: https://src.heuristiclab.com/svn/core/trunk@13588 2abd9481-f8db-48e9-bd25-06bc13291c1b
</commit_message>
<xml_diff>
--- a/documentation/HeuristicLab 4.0.pptx
+++ b/documentation/HeuristicLab 4.0.pptx
@@ -14,9 +14,11 @@
     <p:sldId id="257" r:id="rId8"/>
     <p:sldId id="260" r:id="rId9"/>
     <p:sldId id="263" r:id="rId10"/>
-    <p:sldId id="264" r:id="rId11"/>
-    <p:sldId id="266" r:id="rId12"/>
-    <p:sldId id="265" r:id="rId13"/>
+    <p:sldId id="271" r:id="rId11"/>
+    <p:sldId id="272" r:id="rId12"/>
+    <p:sldId id="264" r:id="rId13"/>
+    <p:sldId id="266" r:id="rId14"/>
+    <p:sldId id="265" r:id="rId15"/>
   </p:sldIdLst>
   <p:sldSz cx="12192000" cy="6858000"/>
   <p:notesSz cx="6858000" cy="9144000"/>
@@ -254,7 +256,7 @@
           <a:p>
             <a:fld id="{04FFA9E9-5461-4D3B-90F8-43CB1CC1C3BF}" type="datetimeFigureOut">
               <a:rPr lang="de-DE" smtClean="0"/>
-              <a:t>04.02.2016</a:t>
+              <a:t>05.02.2016</a:t>
             </a:fld>
             <a:endParaRPr lang="de-DE"/>
           </a:p>
@@ -424,7 +426,7 @@
           <a:p>
             <a:fld id="{04FFA9E9-5461-4D3B-90F8-43CB1CC1C3BF}" type="datetimeFigureOut">
               <a:rPr lang="de-DE" smtClean="0"/>
-              <a:t>04.02.2016</a:t>
+              <a:t>05.02.2016</a:t>
             </a:fld>
             <a:endParaRPr lang="de-DE"/>
           </a:p>
@@ -604,7 +606,7 @@
           <a:p>
             <a:fld id="{04FFA9E9-5461-4D3B-90F8-43CB1CC1C3BF}" type="datetimeFigureOut">
               <a:rPr lang="de-DE" smtClean="0"/>
-              <a:t>04.02.2016</a:t>
+              <a:t>05.02.2016</a:t>
             </a:fld>
             <a:endParaRPr lang="de-DE"/>
           </a:p>
@@ -774,7 +776,7 @@
           <a:p>
             <a:fld id="{04FFA9E9-5461-4D3B-90F8-43CB1CC1C3BF}" type="datetimeFigureOut">
               <a:rPr lang="de-DE" smtClean="0"/>
-              <a:t>04.02.2016</a:t>
+              <a:t>05.02.2016</a:t>
             </a:fld>
             <a:endParaRPr lang="de-DE"/>
           </a:p>
@@ -1020,7 +1022,7 @@
           <a:p>
             <a:fld id="{04FFA9E9-5461-4D3B-90F8-43CB1CC1C3BF}" type="datetimeFigureOut">
               <a:rPr lang="de-DE" smtClean="0"/>
-              <a:t>04.02.2016</a:t>
+              <a:t>05.02.2016</a:t>
             </a:fld>
             <a:endParaRPr lang="de-DE"/>
           </a:p>
@@ -1252,7 +1254,7 @@
           <a:p>
             <a:fld id="{04FFA9E9-5461-4D3B-90F8-43CB1CC1C3BF}" type="datetimeFigureOut">
               <a:rPr lang="de-DE" smtClean="0"/>
-              <a:t>04.02.2016</a:t>
+              <a:t>05.02.2016</a:t>
             </a:fld>
             <a:endParaRPr lang="de-DE"/>
           </a:p>
@@ -1619,7 +1621,7 @@
           <a:p>
             <a:fld id="{04FFA9E9-5461-4D3B-90F8-43CB1CC1C3BF}" type="datetimeFigureOut">
               <a:rPr lang="de-DE" smtClean="0"/>
-              <a:t>04.02.2016</a:t>
+              <a:t>05.02.2016</a:t>
             </a:fld>
             <a:endParaRPr lang="de-DE"/>
           </a:p>
@@ -1737,7 +1739,7 @@
           <a:p>
             <a:fld id="{04FFA9E9-5461-4D3B-90F8-43CB1CC1C3BF}" type="datetimeFigureOut">
               <a:rPr lang="de-DE" smtClean="0"/>
-              <a:t>04.02.2016</a:t>
+              <a:t>05.02.2016</a:t>
             </a:fld>
             <a:endParaRPr lang="de-DE"/>
           </a:p>
@@ -1832,7 +1834,7 @@
           <a:p>
             <a:fld id="{04FFA9E9-5461-4D3B-90F8-43CB1CC1C3BF}" type="datetimeFigureOut">
               <a:rPr lang="de-DE" smtClean="0"/>
-              <a:t>04.02.2016</a:t>
+              <a:t>05.02.2016</a:t>
             </a:fld>
             <a:endParaRPr lang="de-DE"/>
           </a:p>
@@ -2109,7 +2111,7 @@
           <a:p>
             <a:fld id="{04FFA9E9-5461-4D3B-90F8-43CB1CC1C3BF}" type="datetimeFigureOut">
               <a:rPr lang="de-DE" smtClean="0"/>
-              <a:t>04.02.2016</a:t>
+              <a:t>05.02.2016</a:t>
             </a:fld>
             <a:endParaRPr lang="de-DE"/>
           </a:p>
@@ -2362,7 +2364,7 @@
           <a:p>
             <a:fld id="{04FFA9E9-5461-4D3B-90F8-43CB1CC1C3BF}" type="datetimeFigureOut">
               <a:rPr lang="de-DE" smtClean="0"/>
-              <a:t>04.02.2016</a:t>
+              <a:t>05.02.2016</a:t>
             </a:fld>
             <a:endParaRPr lang="de-DE"/>
           </a:p>
@@ -2575,7 +2577,7 @@
           <a:p>
             <a:fld id="{04FFA9E9-5461-4D3B-90F8-43CB1CC1C3BF}" type="datetimeFigureOut">
               <a:rPr lang="de-DE" smtClean="0"/>
-              <a:t>04.02.2016</a:t>
+              <a:t>05.02.2016</a:t>
             </a:fld>
             <a:endParaRPr lang="de-DE"/>
           </a:p>
@@ -3083,6 +3085,969 @@
           <a:lstStyle/>
           <a:p>
             <a:r>
+              <a:rPr lang="de-DE" dirty="0" smtClean="0"/>
+              <a:t>Async </a:t>
+            </a:r>
+            <a:r>
+              <a:rPr lang="de-DE" dirty="0"/>
+              <a:t>Start/Stop f</a:t>
+            </a:r>
+            <a:r>
+              <a:rPr lang="de-DE" dirty="0" smtClean="0"/>
+              <a:t>or Algorithms</a:t>
+            </a:r>
+            <a:r>
+              <a:rPr lang="en-US" dirty="0" smtClean="0"/>
+              <a:t> (</a:t>
+            </a:r>
+            <a:r>
+              <a:rPr lang="en-US" dirty="0" err="1" smtClean="0"/>
+              <a:t>JKarder</a:t>
+            </a:r>
+            <a:r>
+              <a:rPr lang="en-US" dirty="0" smtClean="0"/>
+              <a:t>)</a:t>
+            </a:r>
+            <a:endParaRPr lang="en-US" dirty="0"/>
+          </a:p>
+        </p:txBody>
+      </p:sp>
+      <p:sp>
+        <p:nvSpPr>
+          <p:cNvPr id="3" name="Content Placeholder 2"/>
+          <p:cNvSpPr>
+            <a:spLocks noGrp="1"/>
+          </p:cNvSpPr>
+          <p:nvPr>
+            <p:ph idx="1"/>
+          </p:nvPr>
+        </p:nvSpPr>
+        <p:spPr/>
+        <p:txBody>
+          <a:bodyPr>
+            <a:normAutofit/>
+          </a:bodyPr>
+          <a:lstStyle/>
+          <a:p>
+            <a:r>
+              <a:rPr lang="de-DE" dirty="0" smtClean="0"/>
+              <a:t>We </a:t>
+            </a:r>
+            <a:r>
+              <a:rPr lang="de-DE" dirty="0"/>
+              <a:t>should better reflect the style of async/wait programming in C#</a:t>
+            </a:r>
+          </a:p>
+          <a:p>
+            <a:pPr lvl="1"/>
+            <a:r>
+              <a:rPr lang="de-DE" dirty="0"/>
+              <a:t>IExecutable.Start is actually an asynchronous operation and should be named StartAsync</a:t>
+            </a:r>
+          </a:p>
+          <a:p>
+            <a:r>
+              <a:rPr lang="de-DE" dirty="0"/>
+              <a:t>Sample tests (and e.g. scripts) must use helper functions to wait for algorithm results</a:t>
+            </a:r>
+          </a:p>
+          <a:p>
+            <a:pPr lvl="1"/>
+            <a:r>
+              <a:rPr lang="de-DE" dirty="0"/>
+              <a:t>We could just call Start synchronously</a:t>
+            </a:r>
+          </a:p>
+          <a:p>
+            <a:r>
+              <a:rPr lang="de-DE" dirty="0"/>
+              <a:t>We </a:t>
+            </a:r>
+            <a:r>
+              <a:rPr lang="de-DE" dirty="0" smtClean="0"/>
+              <a:t>added/implemented </a:t>
+            </a:r>
+            <a:r>
+              <a:rPr lang="de-DE" dirty="0"/>
+              <a:t>IExecutable.Start and IExecutable.StartAsync</a:t>
+            </a:r>
+            <a:endParaRPr lang="en-US" dirty="0"/>
+          </a:p>
+        </p:txBody>
+      </p:sp>
+      <p:sp>
+        <p:nvSpPr>
+          <p:cNvPr id="4" name="Inhaltsplatzhalter 7"/>
+          <p:cNvSpPr txBox="1">
+            <a:spLocks/>
+          </p:cNvSpPr>
+          <p:nvPr/>
+        </p:nvSpPr>
+        <p:spPr>
+          <a:xfrm>
+            <a:off x="1831571" y="4563687"/>
+            <a:ext cx="4535978" cy="1396538"/>
+          </a:xfrm>
+          <a:prstGeom prst="rect">
+            <a:avLst/>
+          </a:prstGeom>
+        </p:spPr>
+        <p:txBody>
+          <a:bodyPr>
+            <a:noAutofit/>
+          </a:bodyPr>
+          <a:lstStyle>
+            <a:lvl1pPr marL="228600" indent="-228600" algn="l" defTabSz="914400" rtl="0" eaLnBrk="1" latinLnBrk="0" hangingPunct="1">
+              <a:lnSpc>
+                <a:spcPct val="90000"/>
+              </a:lnSpc>
+              <a:spcBef>
+                <a:spcPts val="1000"/>
+              </a:spcBef>
+              <a:buFont typeface="Arial" panose="020B0604020202020204" pitchFamily="34" charset="0"/>
+              <a:buChar char="•"/>
+              <a:defRPr sz="2800" kern="1200">
+                <a:solidFill>
+                  <a:schemeClr val="tx1"/>
+                </a:solidFill>
+                <a:latin typeface="+mn-lt"/>
+                <a:ea typeface="+mn-ea"/>
+                <a:cs typeface="+mn-cs"/>
+              </a:defRPr>
+            </a:lvl1pPr>
+            <a:lvl2pPr marL="685800" indent="-228600" algn="l" defTabSz="914400" rtl="0" eaLnBrk="1" latinLnBrk="0" hangingPunct="1">
+              <a:lnSpc>
+                <a:spcPct val="90000"/>
+              </a:lnSpc>
+              <a:spcBef>
+                <a:spcPts val="500"/>
+              </a:spcBef>
+              <a:buFont typeface="Arial" panose="020B0604020202020204" pitchFamily="34" charset="0"/>
+              <a:buChar char="•"/>
+              <a:defRPr sz="2400" kern="1200">
+                <a:solidFill>
+                  <a:schemeClr val="tx1"/>
+                </a:solidFill>
+                <a:latin typeface="+mn-lt"/>
+                <a:ea typeface="+mn-ea"/>
+                <a:cs typeface="+mn-cs"/>
+              </a:defRPr>
+            </a:lvl2pPr>
+            <a:lvl3pPr marL="1143000" indent="-228600" algn="l" defTabSz="914400" rtl="0" eaLnBrk="1" latinLnBrk="0" hangingPunct="1">
+              <a:lnSpc>
+                <a:spcPct val="90000"/>
+              </a:lnSpc>
+              <a:spcBef>
+                <a:spcPts val="500"/>
+              </a:spcBef>
+              <a:buFont typeface="Arial" panose="020B0604020202020204" pitchFamily="34" charset="0"/>
+              <a:buChar char="•"/>
+              <a:defRPr sz="2000" kern="1200">
+                <a:solidFill>
+                  <a:schemeClr val="tx1"/>
+                </a:solidFill>
+                <a:latin typeface="+mn-lt"/>
+                <a:ea typeface="+mn-ea"/>
+                <a:cs typeface="+mn-cs"/>
+              </a:defRPr>
+            </a:lvl3pPr>
+            <a:lvl4pPr marL="1600200" indent="-228600" algn="l" defTabSz="914400" rtl="0" eaLnBrk="1" latinLnBrk="0" hangingPunct="1">
+              <a:lnSpc>
+                <a:spcPct val="90000"/>
+              </a:lnSpc>
+              <a:spcBef>
+                <a:spcPts val="500"/>
+              </a:spcBef>
+              <a:buFont typeface="Arial" panose="020B0604020202020204" pitchFamily="34" charset="0"/>
+              <a:buChar char="•"/>
+              <a:defRPr sz="1800" kern="1200">
+                <a:solidFill>
+                  <a:schemeClr val="tx1"/>
+                </a:solidFill>
+                <a:latin typeface="+mn-lt"/>
+                <a:ea typeface="+mn-ea"/>
+                <a:cs typeface="+mn-cs"/>
+              </a:defRPr>
+            </a:lvl4pPr>
+            <a:lvl5pPr marL="2057400" indent="-228600" algn="l" defTabSz="914400" rtl="0" eaLnBrk="1" latinLnBrk="0" hangingPunct="1">
+              <a:lnSpc>
+                <a:spcPct val="90000"/>
+              </a:lnSpc>
+              <a:spcBef>
+                <a:spcPts val="500"/>
+              </a:spcBef>
+              <a:buFont typeface="Arial" panose="020B0604020202020204" pitchFamily="34" charset="0"/>
+              <a:buChar char="•"/>
+              <a:defRPr sz="1800" kern="1200">
+                <a:solidFill>
+                  <a:schemeClr val="tx1"/>
+                </a:solidFill>
+                <a:latin typeface="+mn-lt"/>
+                <a:ea typeface="+mn-ea"/>
+                <a:cs typeface="+mn-cs"/>
+              </a:defRPr>
+            </a:lvl5pPr>
+            <a:lvl6pPr marL="2514600" indent="-228600" algn="l" defTabSz="914400" rtl="0" eaLnBrk="1" latinLnBrk="0" hangingPunct="1">
+              <a:lnSpc>
+                <a:spcPct val="90000"/>
+              </a:lnSpc>
+              <a:spcBef>
+                <a:spcPts val="500"/>
+              </a:spcBef>
+              <a:buFont typeface="Arial" panose="020B0604020202020204" pitchFamily="34" charset="0"/>
+              <a:buChar char="•"/>
+              <a:defRPr sz="1800" kern="1200">
+                <a:solidFill>
+                  <a:schemeClr val="tx1"/>
+                </a:solidFill>
+                <a:latin typeface="+mn-lt"/>
+                <a:ea typeface="+mn-ea"/>
+                <a:cs typeface="+mn-cs"/>
+              </a:defRPr>
+            </a:lvl6pPr>
+            <a:lvl7pPr marL="2971800" indent="-228600" algn="l" defTabSz="914400" rtl="0" eaLnBrk="1" latinLnBrk="0" hangingPunct="1">
+              <a:lnSpc>
+                <a:spcPct val="90000"/>
+              </a:lnSpc>
+              <a:spcBef>
+                <a:spcPts val="500"/>
+              </a:spcBef>
+              <a:buFont typeface="Arial" panose="020B0604020202020204" pitchFamily="34" charset="0"/>
+              <a:buChar char="•"/>
+              <a:defRPr sz="1800" kern="1200">
+                <a:solidFill>
+                  <a:schemeClr val="tx1"/>
+                </a:solidFill>
+                <a:latin typeface="+mn-lt"/>
+                <a:ea typeface="+mn-ea"/>
+                <a:cs typeface="+mn-cs"/>
+              </a:defRPr>
+            </a:lvl7pPr>
+            <a:lvl8pPr marL="3429000" indent="-228600" algn="l" defTabSz="914400" rtl="0" eaLnBrk="1" latinLnBrk="0" hangingPunct="1">
+              <a:lnSpc>
+                <a:spcPct val="90000"/>
+              </a:lnSpc>
+              <a:spcBef>
+                <a:spcPts val="500"/>
+              </a:spcBef>
+              <a:buFont typeface="Arial" panose="020B0604020202020204" pitchFamily="34" charset="0"/>
+              <a:buChar char="•"/>
+              <a:defRPr sz="1800" kern="1200">
+                <a:solidFill>
+                  <a:schemeClr val="tx1"/>
+                </a:solidFill>
+                <a:latin typeface="+mn-lt"/>
+                <a:ea typeface="+mn-ea"/>
+                <a:cs typeface="+mn-cs"/>
+              </a:defRPr>
+            </a:lvl8pPr>
+            <a:lvl9pPr marL="3886200" indent="-228600" algn="l" defTabSz="914400" rtl="0" eaLnBrk="1" latinLnBrk="0" hangingPunct="1">
+              <a:lnSpc>
+                <a:spcPct val="90000"/>
+              </a:lnSpc>
+              <a:spcBef>
+                <a:spcPts val="500"/>
+              </a:spcBef>
+              <a:buFont typeface="Arial" panose="020B0604020202020204" pitchFamily="34" charset="0"/>
+              <a:buChar char="•"/>
+              <a:defRPr sz="1800" kern="1200">
+                <a:solidFill>
+                  <a:schemeClr val="tx1"/>
+                </a:solidFill>
+                <a:latin typeface="+mn-lt"/>
+                <a:ea typeface="+mn-ea"/>
+                <a:cs typeface="+mn-cs"/>
+              </a:defRPr>
+            </a:lvl9pPr>
+          </a:lstStyle>
+          <a:p>
+            <a:pPr marL="0" indent="0">
+              <a:lnSpc>
+                <a:spcPct val="100000"/>
+              </a:lnSpc>
+              <a:buFont typeface="Arial" panose="020B0604020202020204" pitchFamily="34" charset="0"/>
+              <a:buNone/>
+            </a:pPr>
+            <a:endParaRPr lang="de-DE" sz="1200" dirty="0" smtClean="0"/>
+          </a:p>
+        </p:txBody>
+      </p:sp>
+      <p:sp>
+        <p:nvSpPr>
+          <p:cNvPr id="6" name="Inhaltsplatzhalter 7"/>
+          <p:cNvSpPr txBox="1">
+            <a:spLocks/>
+          </p:cNvSpPr>
+          <p:nvPr/>
+        </p:nvSpPr>
+        <p:spPr>
+          <a:xfrm>
+            <a:off x="3944358" y="4912822"/>
+            <a:ext cx="4303285" cy="1047403"/>
+          </a:xfrm>
+          <a:prstGeom prst="rect">
+            <a:avLst/>
+          </a:prstGeom>
+        </p:spPr>
+        <p:txBody>
+          <a:bodyPr anchor="ctr">
+            <a:noAutofit/>
+          </a:bodyPr>
+          <a:lstStyle>
+            <a:lvl1pPr marL="228600" indent="-228600" algn="l" defTabSz="914400" rtl="0" eaLnBrk="1" latinLnBrk="0" hangingPunct="1">
+              <a:lnSpc>
+                <a:spcPct val="90000"/>
+              </a:lnSpc>
+              <a:spcBef>
+                <a:spcPts val="1000"/>
+              </a:spcBef>
+              <a:buFont typeface="Arial" panose="020B0604020202020204" pitchFamily="34" charset="0"/>
+              <a:buChar char="•"/>
+              <a:defRPr sz="2800" kern="1200">
+                <a:solidFill>
+                  <a:schemeClr val="tx1"/>
+                </a:solidFill>
+                <a:latin typeface="+mn-lt"/>
+                <a:ea typeface="+mn-ea"/>
+                <a:cs typeface="+mn-cs"/>
+              </a:defRPr>
+            </a:lvl1pPr>
+            <a:lvl2pPr marL="685800" indent="-228600" algn="l" defTabSz="914400" rtl="0" eaLnBrk="1" latinLnBrk="0" hangingPunct="1">
+              <a:lnSpc>
+                <a:spcPct val="90000"/>
+              </a:lnSpc>
+              <a:spcBef>
+                <a:spcPts val="500"/>
+              </a:spcBef>
+              <a:buFont typeface="Arial" panose="020B0604020202020204" pitchFamily="34" charset="0"/>
+              <a:buChar char="•"/>
+              <a:defRPr sz="2400" kern="1200">
+                <a:solidFill>
+                  <a:schemeClr val="tx1"/>
+                </a:solidFill>
+                <a:latin typeface="+mn-lt"/>
+                <a:ea typeface="+mn-ea"/>
+                <a:cs typeface="+mn-cs"/>
+              </a:defRPr>
+            </a:lvl2pPr>
+            <a:lvl3pPr marL="1143000" indent="-228600" algn="l" defTabSz="914400" rtl="0" eaLnBrk="1" latinLnBrk="0" hangingPunct="1">
+              <a:lnSpc>
+                <a:spcPct val="90000"/>
+              </a:lnSpc>
+              <a:spcBef>
+                <a:spcPts val="500"/>
+              </a:spcBef>
+              <a:buFont typeface="Arial" panose="020B0604020202020204" pitchFamily="34" charset="0"/>
+              <a:buChar char="•"/>
+              <a:defRPr sz="2000" kern="1200">
+                <a:solidFill>
+                  <a:schemeClr val="tx1"/>
+                </a:solidFill>
+                <a:latin typeface="+mn-lt"/>
+                <a:ea typeface="+mn-ea"/>
+                <a:cs typeface="+mn-cs"/>
+              </a:defRPr>
+            </a:lvl3pPr>
+            <a:lvl4pPr marL="1600200" indent="-228600" algn="l" defTabSz="914400" rtl="0" eaLnBrk="1" latinLnBrk="0" hangingPunct="1">
+              <a:lnSpc>
+                <a:spcPct val="90000"/>
+              </a:lnSpc>
+              <a:spcBef>
+                <a:spcPts val="500"/>
+              </a:spcBef>
+              <a:buFont typeface="Arial" panose="020B0604020202020204" pitchFamily="34" charset="0"/>
+              <a:buChar char="•"/>
+              <a:defRPr sz="1800" kern="1200">
+                <a:solidFill>
+                  <a:schemeClr val="tx1"/>
+                </a:solidFill>
+                <a:latin typeface="+mn-lt"/>
+                <a:ea typeface="+mn-ea"/>
+                <a:cs typeface="+mn-cs"/>
+              </a:defRPr>
+            </a:lvl4pPr>
+            <a:lvl5pPr marL="2057400" indent="-228600" algn="l" defTabSz="914400" rtl="0" eaLnBrk="1" latinLnBrk="0" hangingPunct="1">
+              <a:lnSpc>
+                <a:spcPct val="90000"/>
+              </a:lnSpc>
+              <a:spcBef>
+                <a:spcPts val="500"/>
+              </a:spcBef>
+              <a:buFont typeface="Arial" panose="020B0604020202020204" pitchFamily="34" charset="0"/>
+              <a:buChar char="•"/>
+              <a:defRPr sz="1800" kern="1200">
+                <a:solidFill>
+                  <a:schemeClr val="tx1"/>
+                </a:solidFill>
+                <a:latin typeface="+mn-lt"/>
+                <a:ea typeface="+mn-ea"/>
+                <a:cs typeface="+mn-cs"/>
+              </a:defRPr>
+            </a:lvl5pPr>
+            <a:lvl6pPr marL="2514600" indent="-228600" algn="l" defTabSz="914400" rtl="0" eaLnBrk="1" latinLnBrk="0" hangingPunct="1">
+              <a:lnSpc>
+                <a:spcPct val="90000"/>
+              </a:lnSpc>
+              <a:spcBef>
+                <a:spcPts val="500"/>
+              </a:spcBef>
+              <a:buFont typeface="Arial" panose="020B0604020202020204" pitchFamily="34" charset="0"/>
+              <a:buChar char="•"/>
+              <a:defRPr sz="1800" kern="1200">
+                <a:solidFill>
+                  <a:schemeClr val="tx1"/>
+                </a:solidFill>
+                <a:latin typeface="+mn-lt"/>
+                <a:ea typeface="+mn-ea"/>
+                <a:cs typeface="+mn-cs"/>
+              </a:defRPr>
+            </a:lvl6pPr>
+            <a:lvl7pPr marL="2971800" indent="-228600" algn="l" defTabSz="914400" rtl="0" eaLnBrk="1" latinLnBrk="0" hangingPunct="1">
+              <a:lnSpc>
+                <a:spcPct val="90000"/>
+              </a:lnSpc>
+              <a:spcBef>
+                <a:spcPts val="500"/>
+              </a:spcBef>
+              <a:buFont typeface="Arial" panose="020B0604020202020204" pitchFamily="34" charset="0"/>
+              <a:buChar char="•"/>
+              <a:defRPr sz="1800" kern="1200">
+                <a:solidFill>
+                  <a:schemeClr val="tx1"/>
+                </a:solidFill>
+                <a:latin typeface="+mn-lt"/>
+                <a:ea typeface="+mn-ea"/>
+                <a:cs typeface="+mn-cs"/>
+              </a:defRPr>
+            </a:lvl7pPr>
+            <a:lvl8pPr marL="3429000" indent="-228600" algn="l" defTabSz="914400" rtl="0" eaLnBrk="1" latinLnBrk="0" hangingPunct="1">
+              <a:lnSpc>
+                <a:spcPct val="90000"/>
+              </a:lnSpc>
+              <a:spcBef>
+                <a:spcPts val="500"/>
+              </a:spcBef>
+              <a:buFont typeface="Arial" panose="020B0604020202020204" pitchFamily="34" charset="0"/>
+              <a:buChar char="•"/>
+              <a:defRPr sz="1800" kern="1200">
+                <a:solidFill>
+                  <a:schemeClr val="tx1"/>
+                </a:solidFill>
+                <a:latin typeface="+mn-lt"/>
+                <a:ea typeface="+mn-ea"/>
+                <a:cs typeface="+mn-cs"/>
+              </a:defRPr>
+            </a:lvl8pPr>
+            <a:lvl9pPr marL="3886200" indent="-228600" algn="l" defTabSz="914400" rtl="0" eaLnBrk="1" latinLnBrk="0" hangingPunct="1">
+              <a:lnSpc>
+                <a:spcPct val="90000"/>
+              </a:lnSpc>
+              <a:spcBef>
+                <a:spcPts val="500"/>
+              </a:spcBef>
+              <a:buFont typeface="Arial" panose="020B0604020202020204" pitchFamily="34" charset="0"/>
+              <a:buChar char="•"/>
+              <a:defRPr sz="1800" kern="1200">
+                <a:solidFill>
+                  <a:schemeClr val="tx1"/>
+                </a:solidFill>
+                <a:latin typeface="+mn-lt"/>
+                <a:ea typeface="+mn-ea"/>
+                <a:cs typeface="+mn-cs"/>
+              </a:defRPr>
+            </a:lvl9pPr>
+          </a:lstStyle>
+          <a:p>
+            <a:pPr marL="0" indent="0">
+              <a:lnSpc>
+                <a:spcPct val="100000"/>
+              </a:lnSpc>
+              <a:buNone/>
+            </a:pPr>
+            <a:r>
+              <a:rPr lang="de-AT" sz="1200" dirty="0">
+                <a:solidFill>
+                  <a:srgbClr val="000080"/>
+                </a:solidFill>
+              </a:rPr>
+              <a:t>var</a:t>
+            </a:r>
+            <a:r>
+              <a:rPr lang="de-AT" sz="1200" dirty="0"/>
+              <a:t> ga = </a:t>
+            </a:r>
+            <a:r>
+              <a:rPr lang="de-AT" sz="1200" dirty="0">
+                <a:solidFill>
+                  <a:srgbClr val="008B8B"/>
+                </a:solidFill>
+              </a:rPr>
+              <a:t>new</a:t>
+            </a:r>
+            <a:r>
+              <a:rPr lang="de-AT" sz="1200" dirty="0"/>
+              <a:t> </a:t>
+            </a:r>
+            <a:r>
+              <a:rPr lang="de-AT" sz="1200" dirty="0">
+                <a:solidFill>
+                  <a:srgbClr val="191970"/>
+                </a:solidFill>
+              </a:rPr>
+              <a:t>GeneticAlgorithm</a:t>
+            </a:r>
+            <a:r>
+              <a:rPr lang="de-AT" sz="1200" dirty="0"/>
+              <a:t>()</a:t>
+            </a:r>
+            <a:br>
+              <a:rPr lang="de-AT" sz="1200" dirty="0"/>
+            </a:br>
+            <a:r>
+              <a:rPr lang="de-AT" sz="1200" dirty="0">
+                <a:solidFill>
+                  <a:srgbClr val="008000"/>
+                </a:solidFill>
+              </a:rPr>
+              <a:t>// configure algorithm ...</a:t>
+            </a:r>
+            <a:r>
+              <a:rPr lang="de-AT" sz="1200" dirty="0"/>
+              <a:t/>
+            </a:r>
+            <a:br>
+              <a:rPr lang="de-AT" sz="1200" dirty="0"/>
+            </a:br>
+            <a:r>
+              <a:rPr lang="de-AT" sz="1200" dirty="0"/>
+              <a:t/>
+            </a:r>
+            <a:br>
+              <a:rPr lang="de-AT" sz="1200" dirty="0"/>
+            </a:br>
+            <a:r>
+              <a:rPr lang="de-AT" sz="1200" dirty="0"/>
+              <a:t>ga.</a:t>
+            </a:r>
+            <a:r>
+              <a:rPr lang="de-AT" sz="1200" dirty="0">
+                <a:solidFill>
+                  <a:srgbClr val="191970"/>
+                </a:solidFill>
+              </a:rPr>
+              <a:t>Start</a:t>
+            </a:r>
+            <a:r>
+              <a:rPr lang="de-AT" sz="1200" dirty="0"/>
+              <a:t>() </a:t>
+            </a:r>
+            <a:r>
+              <a:rPr lang="de-AT" sz="1200" dirty="0">
+                <a:solidFill>
+                  <a:srgbClr val="008000"/>
+                </a:solidFill>
+              </a:rPr>
+              <a:t>// start "synchronously" (calls StartAsync().Wait())</a:t>
+            </a:r>
+            <a:r>
+              <a:rPr lang="de-AT" sz="1200" dirty="0"/>
+              <a:t/>
+            </a:r>
+            <a:br>
+              <a:rPr lang="de-AT" sz="1200" dirty="0"/>
+            </a:br>
+            <a:r>
+              <a:rPr lang="de-AT" sz="1200" dirty="0"/>
+              <a:t>ga.</a:t>
+            </a:r>
+            <a:r>
+              <a:rPr lang="de-AT" sz="1200" dirty="0">
+                <a:solidFill>
+                  <a:srgbClr val="191970"/>
+                </a:solidFill>
+              </a:rPr>
+              <a:t>StartAsync</a:t>
+            </a:r>
+            <a:r>
+              <a:rPr lang="de-AT" sz="1200" dirty="0"/>
+              <a:t>() </a:t>
+            </a:r>
+            <a:r>
+              <a:rPr lang="de-AT" sz="1200" dirty="0">
+                <a:solidFill>
+                  <a:srgbClr val="008000"/>
+                </a:solidFill>
+              </a:rPr>
+              <a:t>// start asynchronously</a:t>
+            </a:r>
+            <a:r>
+              <a:rPr lang="de-AT" sz="1200" dirty="0"/>
+              <a:t/>
+            </a:r>
+            <a:br>
+              <a:rPr lang="de-AT" sz="1200" dirty="0"/>
+            </a:br>
+            <a:r>
+              <a:rPr lang="de-AT" sz="1200" dirty="0"/>
+              <a:t>ga.</a:t>
+            </a:r>
+            <a:r>
+              <a:rPr lang="de-AT" sz="1200" dirty="0">
+                <a:solidFill>
+                  <a:srgbClr val="191970"/>
+                </a:solidFill>
+              </a:rPr>
+              <a:t>StartAsync</a:t>
+            </a:r>
+            <a:r>
+              <a:rPr lang="de-AT" sz="1200" dirty="0"/>
+              <a:t>().</a:t>
+            </a:r>
+            <a:r>
+              <a:rPr lang="de-AT" sz="1200" dirty="0">
+                <a:solidFill>
+                  <a:srgbClr val="191970"/>
+                </a:solidFill>
+              </a:rPr>
+              <a:t>Wait</a:t>
+            </a:r>
+            <a:r>
+              <a:rPr lang="de-AT" sz="1200" dirty="0"/>
+              <a:t>() </a:t>
+            </a:r>
+            <a:r>
+              <a:rPr lang="de-AT" sz="1200" dirty="0">
+                <a:solidFill>
+                  <a:srgbClr val="008000"/>
+                </a:solidFill>
+              </a:rPr>
+              <a:t>// start asynchronously and wait</a:t>
+            </a:r>
+            <a:endParaRPr lang="de-DE" sz="1200" dirty="0"/>
+          </a:p>
+        </p:txBody>
+      </p:sp>
+    </p:spTree>
+    <p:extLst>
+      <p:ext uri="{BB962C8B-B14F-4D97-AF65-F5344CB8AC3E}">
+        <p14:creationId xmlns:p14="http://schemas.microsoft.com/office/powerpoint/2010/main" val="1822671034"/>
+      </p:ext>
+    </p:extLst>
+  </p:cSld>
+  <p:clrMapOvr>
+    <a:masterClrMapping/>
+  </p:clrMapOvr>
+  <p:timing>
+    <p:tnLst>
+      <p:par>
+        <p:cTn id="1" dur="indefinite" restart="never" nodeType="tmRoot"/>
+      </p:par>
+    </p:tnLst>
+  </p:timing>
+</p:sld>
+</file>
+
+<file path=ppt/slides/slide11.xml><?xml version="1.0" encoding="utf-8"?>
+<p:sld xmlns:a="http://schemas.openxmlformats.org/drawingml/2006/main" xmlns:r="http://schemas.openxmlformats.org/officeDocument/2006/relationships" xmlns:p="http://schemas.openxmlformats.org/presentationml/2006/main">
+  <p:cSld>
+    <p:spTree>
+      <p:nvGrpSpPr>
+        <p:cNvPr id="1" name=""/>
+        <p:cNvGrpSpPr/>
+        <p:nvPr/>
+      </p:nvGrpSpPr>
+      <p:grpSpPr>
+        <a:xfrm>
+          <a:off x="0" y="0"/>
+          <a:ext cx="0" cy="0"/>
+          <a:chOff x="0" y="0"/>
+          <a:chExt cx="0" cy="0"/>
+        </a:xfrm>
+      </p:grpSpPr>
+      <p:sp>
+        <p:nvSpPr>
+          <p:cNvPr id="2" name="Title 1"/>
+          <p:cNvSpPr>
+            <a:spLocks noGrp="1"/>
+          </p:cNvSpPr>
+          <p:nvPr>
+            <p:ph type="title"/>
+          </p:nvPr>
+        </p:nvSpPr>
+        <p:spPr/>
+        <p:txBody>
+          <a:bodyPr/>
+          <a:lstStyle/>
+          <a:p>
+            <a:r>
+              <a:rPr lang="de-DE" dirty="0"/>
+              <a:t>New Termination Criteria</a:t>
+            </a:r>
+            <a:r>
+              <a:rPr lang="en-US" dirty="0" smtClean="0"/>
+              <a:t> (</a:t>
+            </a:r>
+            <a:r>
+              <a:rPr lang="en-US" dirty="0" err="1" smtClean="0"/>
+              <a:t>PFleck</a:t>
+            </a:r>
+            <a:r>
+              <a:rPr lang="en-US" dirty="0" smtClean="0"/>
+              <a:t>/</a:t>
+            </a:r>
+            <a:r>
+              <a:rPr lang="en-US" dirty="0" err="1" smtClean="0"/>
+              <a:t>MKommend</a:t>
+            </a:r>
+            <a:r>
+              <a:rPr lang="en-US" dirty="0" smtClean="0"/>
+              <a:t>)</a:t>
+            </a:r>
+            <a:endParaRPr lang="en-US" dirty="0"/>
+          </a:p>
+        </p:txBody>
+      </p:sp>
+      <p:sp>
+        <p:nvSpPr>
+          <p:cNvPr id="3" name="Content Placeholder 2"/>
+          <p:cNvSpPr>
+            <a:spLocks noGrp="1"/>
+          </p:cNvSpPr>
+          <p:nvPr>
+            <p:ph idx="1"/>
+          </p:nvPr>
+        </p:nvSpPr>
+        <p:spPr/>
+        <p:txBody>
+          <a:bodyPr>
+            <a:normAutofit/>
+          </a:bodyPr>
+          <a:lstStyle/>
+          <a:p>
+            <a:r>
+              <a:rPr lang="en-US" dirty="0" smtClean="0"/>
+              <a:t>ALPS supports new termination criteria</a:t>
+            </a:r>
+          </a:p>
+          <a:p>
+            <a:pPr lvl="1"/>
+            <a:r>
+              <a:rPr lang="en-US" dirty="0" err="1" smtClean="0"/>
+              <a:t>TerminationOperator</a:t>
+            </a:r>
+            <a:r>
+              <a:rPr lang="en-US" dirty="0" smtClean="0"/>
+              <a:t> uses </a:t>
+            </a:r>
+            <a:r>
+              <a:rPr lang="en-US" dirty="0" err="1" smtClean="0"/>
+              <a:t>MultiTerminator</a:t>
+            </a:r>
+            <a:r>
+              <a:rPr lang="en-US" dirty="0" smtClean="0"/>
+              <a:t> and cancels the algorithm if any of the active termination criteria is not met</a:t>
+            </a:r>
+            <a:endParaRPr lang="en-US" dirty="0"/>
+          </a:p>
+          <a:p>
+            <a:endParaRPr lang="en-US" dirty="0" smtClean="0"/>
+          </a:p>
+          <a:p>
+            <a:endParaRPr lang="en-US" dirty="0"/>
+          </a:p>
+          <a:p>
+            <a:endParaRPr lang="en-US" dirty="0" smtClean="0"/>
+          </a:p>
+          <a:p>
+            <a:endParaRPr lang="en-US" dirty="0" smtClean="0"/>
+          </a:p>
+          <a:p>
+            <a:endParaRPr lang="en-US" dirty="0"/>
+          </a:p>
+          <a:p>
+            <a:r>
+              <a:rPr lang="en-US" dirty="0" smtClean="0"/>
+              <a:t>…</a:t>
+            </a:r>
+            <a:endParaRPr lang="en-US" dirty="0"/>
+          </a:p>
+        </p:txBody>
+      </p:sp>
+      <p:pic>
+        <p:nvPicPr>
+          <p:cNvPr id="11" name="Picture 10"/>
+          <p:cNvPicPr>
+            <a:picLocks noChangeAspect="1"/>
+          </p:cNvPicPr>
+          <p:nvPr/>
+        </p:nvPicPr>
+        <p:blipFill>
+          <a:blip r:embed="rId2"/>
+          <a:stretch>
+            <a:fillRect/>
+          </a:stretch>
+        </p:blipFill>
+        <p:spPr>
+          <a:xfrm>
+            <a:off x="2196291" y="3123362"/>
+            <a:ext cx="8048625" cy="2009775"/>
+          </a:xfrm>
+          <a:prstGeom prst="rect">
+            <a:avLst/>
+          </a:prstGeom>
+          <a:ln>
+            <a:noFill/>
+          </a:ln>
+          <a:effectLst>
+            <a:outerShdw blurRad="190500" algn="tl" rotWithShape="0">
+              <a:srgbClr val="000000">
+                <a:alpha val="70000"/>
+              </a:srgbClr>
+            </a:outerShdw>
+          </a:effectLst>
+        </p:spPr>
+      </p:pic>
+      <p:sp>
+        <p:nvSpPr>
+          <p:cNvPr id="7" name="Rectangle 6"/>
+          <p:cNvSpPr/>
+          <p:nvPr/>
+        </p:nvSpPr>
+        <p:spPr>
+          <a:xfrm>
+            <a:off x="2221230" y="3441472"/>
+            <a:ext cx="1419743" cy="207817"/>
+          </a:xfrm>
+          <a:prstGeom prst="rect">
+            <a:avLst/>
+          </a:prstGeom>
+          <a:noFill/>
+          <a:ln>
+            <a:solidFill>
+              <a:srgbClr val="FF0000"/>
+            </a:solidFill>
+          </a:ln>
+        </p:spPr>
+        <p:style>
+          <a:lnRef idx="2">
+            <a:schemeClr val="accent2"/>
+          </a:lnRef>
+          <a:fillRef idx="1">
+            <a:schemeClr val="lt1"/>
+          </a:fillRef>
+          <a:effectRef idx="0">
+            <a:schemeClr val="accent2"/>
+          </a:effectRef>
+          <a:fontRef idx="minor">
+            <a:schemeClr val="dk1"/>
+          </a:fontRef>
+        </p:style>
+        <p:txBody>
+          <a:bodyPr rtlCol="0" anchor="ctr"/>
+          <a:lstStyle/>
+          <a:p>
+            <a:pPr algn="ctr"/>
+            <a:endParaRPr lang="de-AT"/>
+          </a:p>
+        </p:txBody>
+      </p:sp>
+      <p:sp>
+        <p:nvSpPr>
+          <p:cNvPr id="9" name="Rectangle 8"/>
+          <p:cNvSpPr/>
+          <p:nvPr/>
+        </p:nvSpPr>
+        <p:spPr>
+          <a:xfrm>
+            <a:off x="4867449" y="3426780"/>
+            <a:ext cx="1275656" cy="207817"/>
+          </a:xfrm>
+          <a:prstGeom prst="rect">
+            <a:avLst/>
+          </a:prstGeom>
+          <a:noFill/>
+          <a:ln>
+            <a:solidFill>
+              <a:srgbClr val="FF0000"/>
+            </a:solidFill>
+          </a:ln>
+        </p:spPr>
+        <p:style>
+          <a:lnRef idx="2">
+            <a:schemeClr val="accent2"/>
+          </a:lnRef>
+          <a:fillRef idx="1">
+            <a:schemeClr val="lt1"/>
+          </a:fillRef>
+          <a:effectRef idx="0">
+            <a:schemeClr val="accent2"/>
+          </a:effectRef>
+          <a:fontRef idx="minor">
+            <a:schemeClr val="dk1"/>
+          </a:fontRef>
+        </p:style>
+        <p:txBody>
+          <a:bodyPr rtlCol="0" anchor="ctr"/>
+          <a:lstStyle/>
+          <a:p>
+            <a:pPr algn="ctr"/>
+            <a:endParaRPr lang="de-AT"/>
+          </a:p>
+        </p:txBody>
+      </p:sp>
+    </p:spTree>
+    <p:extLst>
+      <p:ext uri="{BB962C8B-B14F-4D97-AF65-F5344CB8AC3E}">
+        <p14:creationId xmlns:p14="http://schemas.microsoft.com/office/powerpoint/2010/main" val="4092597754"/>
+      </p:ext>
+    </p:extLst>
+  </p:cSld>
+  <p:clrMapOvr>
+    <a:masterClrMapping/>
+  </p:clrMapOvr>
+  <p:timing>
+    <p:tnLst>
+      <p:par>
+        <p:cTn id="1" dur="indefinite" restart="never" nodeType="tmRoot"/>
+      </p:par>
+    </p:tnLst>
+  </p:timing>
+</p:sld>
+</file>
+
+<file path=ppt/slides/slide12.xml><?xml version="1.0" encoding="utf-8"?>
+<p:sld xmlns:a="http://schemas.openxmlformats.org/drawingml/2006/main" xmlns:r="http://schemas.openxmlformats.org/officeDocument/2006/relationships" xmlns:p="http://schemas.openxmlformats.org/presentationml/2006/main">
+  <p:cSld>
+    <p:spTree>
+      <p:nvGrpSpPr>
+        <p:cNvPr id="1" name=""/>
+        <p:cNvGrpSpPr/>
+        <p:nvPr/>
+      </p:nvGrpSpPr>
+      <p:grpSpPr>
+        <a:xfrm>
+          <a:off x="0" y="0"/>
+          <a:ext cx="0" cy="0"/>
+          <a:chOff x="0" y="0"/>
+          <a:chExt cx="0" cy="0"/>
+        </a:xfrm>
+      </p:grpSpPr>
+      <p:sp>
+        <p:nvSpPr>
+          <p:cNvPr id="2" name="Title 1"/>
+          <p:cNvSpPr>
+            <a:spLocks noGrp="1"/>
+          </p:cNvSpPr>
+          <p:nvPr>
+            <p:ph type="title"/>
+          </p:nvPr>
+        </p:nvSpPr>
+        <p:spPr/>
+        <p:txBody>
+          <a:bodyPr/>
+          <a:lstStyle/>
+          <a:p>
+            <a:r>
               <a:rPr lang="en-US" dirty="0" smtClean="0"/>
               <a:t>Plugin Infrastructure changes (</a:t>
             </a:r>
@@ -3094,7 +4059,6 @@
               <a:rPr lang="en-US" dirty="0"/>
               <a:t>)</a:t>
             </a:r>
-            <a:endParaRPr lang="en-US" dirty="0"/>
           </a:p>
         </p:txBody>
       </p:sp>
@@ -3137,7 +4101,7 @@
 </p:sld>
 </file>
 
-<file path=ppt/slides/slide11.xml><?xml version="1.0" encoding="utf-8"?>
+<file path=ppt/slides/slide13.xml><?xml version="1.0" encoding="utf-8"?>
 <p:sld xmlns:a="http://schemas.openxmlformats.org/drawingml/2006/main" xmlns:r="http://schemas.openxmlformats.org/officeDocument/2006/relationships" xmlns:p="http://schemas.openxmlformats.org/presentationml/2006/main">
   <p:cSld>
     <p:spTree>
@@ -3365,7 +4329,7 @@
 </p:sld>
 </file>
 
-<file path=ppt/slides/slide12.xml><?xml version="1.0" encoding="utf-8"?>
+<file path=ppt/slides/slide14.xml><?xml version="1.0" encoding="utf-8"?>
 <p:sld xmlns:a="http://schemas.openxmlformats.org/drawingml/2006/main" xmlns:r="http://schemas.openxmlformats.org/officeDocument/2006/relationships" xmlns:p="http://schemas.openxmlformats.org/presentationml/2006/main">
   <p:cSld>
     <p:spTree>
@@ -7237,11 +8201,7 @@
           <a:p>
             <a:r>
               <a:rPr lang="de-DE" dirty="0" smtClean="0"/>
-              <a:t>Open </a:t>
-            </a:r>
-            <a:r>
-              <a:rPr lang="de-DE" dirty="0" smtClean="0"/>
-              <a:t>Points</a:t>
+              <a:t>Open Points</a:t>
             </a:r>
             <a:endParaRPr lang="de-DE" dirty="0"/>
           </a:p>
@@ -7413,8 +8373,20 @@
           <a:lstStyle/>
           <a:p>
             <a:r>
+              <a:rPr lang="en-US" dirty="0"/>
+              <a:t>Pause for </a:t>
+            </a:r>
+            <a:r>
+              <a:rPr lang="en-US" dirty="0" err="1"/>
+              <a:t>BasicAlgorithms</a:t>
+            </a:r>
+            <a:r>
+              <a:rPr lang="en-US" dirty="0"/>
+              <a:t> </a:t>
+            </a:r>
+            <a:r>
               <a:rPr lang="en-US" dirty="0" smtClean="0"/>
-              <a:t>Algorithm Development(</a:t>
+              <a:t>(</a:t>
             </a:r>
             <a:r>
               <a:rPr lang="en-US" dirty="0" err="1" smtClean="0"/>
@@ -7440,64 +8412,637 @@
         </p:nvSpPr>
         <p:spPr/>
         <p:txBody>
-          <a:bodyPr/>
+          <a:bodyPr>
+            <a:normAutofit/>
+          </a:bodyPr>
           <a:lstStyle/>
           <a:p>
             <a:r>
               <a:rPr lang="en-US" dirty="0" smtClean="0"/>
-              <a:t>Pause for </a:t>
+              <a:t>Up to now, </a:t>
             </a:r>
             <a:r>
               <a:rPr lang="en-US" dirty="0" err="1" smtClean="0"/>
               <a:t>BasicAlgorithms</a:t>
             </a:r>
-            <a:endParaRPr lang="en-US" dirty="0" smtClean="0"/>
-          </a:p>
-          <a:p>
-            <a:r>
-              <a:rPr lang="de-DE" dirty="0" err="1"/>
-              <a:t>Async</a:t>
-            </a:r>
-            <a:r>
-              <a:rPr lang="de-DE" dirty="0"/>
-              <a:t> Start/</a:t>
-            </a:r>
-            <a:r>
-              <a:rPr lang="de-DE" dirty="0" err="1"/>
-              <a:t>Stop</a:t>
-            </a:r>
-            <a:r>
-              <a:rPr lang="de-DE" dirty="0"/>
-              <a:t> </a:t>
-            </a:r>
-            <a:r>
-              <a:rPr lang="de-DE" dirty="0" err="1"/>
-              <a:t>for</a:t>
-            </a:r>
-            <a:r>
-              <a:rPr lang="de-DE" dirty="0"/>
-              <a:t> </a:t>
-            </a:r>
-            <a:r>
-              <a:rPr lang="de-DE" dirty="0" err="1"/>
-              <a:t>algorithms</a:t>
-            </a:r>
-            <a:r>
-              <a:rPr lang="de-DE" dirty="0"/>
-              <a:t> </a:t>
-            </a:r>
-            <a:endParaRPr lang="de-DE" dirty="0" smtClean="0"/>
-          </a:p>
-          <a:p>
-            <a:r>
-              <a:rPr lang="de-DE" dirty="0" smtClean="0"/>
-              <a:t>New Termination </a:t>
-            </a:r>
-            <a:r>
-              <a:rPr lang="de-DE" dirty="0" err="1" smtClean="0"/>
-              <a:t>Criteria</a:t>
-            </a:r>
-            <a:endParaRPr lang="en-US" dirty="0"/>
+            <a:r>
+              <a:rPr lang="en-US" dirty="0" smtClean="0"/>
+              <a:t> could not be paused</a:t>
+            </a:r>
+          </a:p>
+          <a:p>
+            <a:r>
+              <a:rPr lang="en-US" dirty="0" err="1" smtClean="0"/>
+              <a:t>BasicAlgorithms.Pausable</a:t>
+            </a:r>
+            <a:r>
+              <a:rPr lang="en-US" dirty="0" smtClean="0"/>
+              <a:t> has been added</a:t>
+            </a:r>
+          </a:p>
+          <a:p>
+            <a:pPr lvl="1"/>
+            <a:r>
+              <a:rPr lang="en-US" dirty="0" smtClean="0"/>
+              <a:t>If true, cancelling</a:t>
+            </a:r>
+            <a:r>
+              <a:rPr lang="en-US" dirty="0" smtClean="0"/>
+              <a:t> the </a:t>
+            </a:r>
+            <a:r>
+              <a:rPr lang="en-US" dirty="0" err="1" smtClean="0"/>
+              <a:t>CancellationToken</a:t>
+            </a:r>
+            <a:r>
+              <a:rPr lang="en-US" dirty="0" smtClean="0"/>
+              <a:t> can pause the algorithm</a:t>
+            </a:r>
+          </a:p>
+          <a:p>
+            <a:pPr lvl="1"/>
+            <a:r>
+              <a:rPr lang="en-US" dirty="0" smtClean="0"/>
+              <a:t>Specific algorithm is responsible for supporting pause/resume</a:t>
+            </a:r>
+          </a:p>
+        </p:txBody>
+      </p:sp>
+      <p:sp>
+        <p:nvSpPr>
+          <p:cNvPr id="5" name="Inhaltsplatzhalter 7"/>
+          <p:cNvSpPr txBox="1">
+            <a:spLocks/>
+          </p:cNvSpPr>
+          <p:nvPr/>
+        </p:nvSpPr>
+        <p:spPr>
+          <a:xfrm>
+            <a:off x="2468754" y="3674227"/>
+            <a:ext cx="7254493" cy="2818015"/>
+          </a:xfrm>
+          <a:prstGeom prst="rect">
+            <a:avLst/>
+          </a:prstGeom>
+        </p:spPr>
+        <p:txBody>
+          <a:bodyPr anchor="ctr">
+            <a:noAutofit/>
+          </a:bodyPr>
+          <a:lstStyle>
+            <a:lvl1pPr marL="228600" indent="-228600" algn="l" defTabSz="914400" rtl="0" eaLnBrk="1" latinLnBrk="0" hangingPunct="1">
+              <a:lnSpc>
+                <a:spcPct val="90000"/>
+              </a:lnSpc>
+              <a:spcBef>
+                <a:spcPts val="1000"/>
+              </a:spcBef>
+              <a:buFont typeface="Arial" panose="020B0604020202020204" pitchFamily="34" charset="0"/>
+              <a:buChar char="•"/>
+              <a:defRPr sz="2800" kern="1200">
+                <a:solidFill>
+                  <a:schemeClr val="tx1"/>
+                </a:solidFill>
+                <a:latin typeface="+mn-lt"/>
+                <a:ea typeface="+mn-ea"/>
+                <a:cs typeface="+mn-cs"/>
+              </a:defRPr>
+            </a:lvl1pPr>
+            <a:lvl2pPr marL="685800" indent="-228600" algn="l" defTabSz="914400" rtl="0" eaLnBrk="1" latinLnBrk="0" hangingPunct="1">
+              <a:lnSpc>
+                <a:spcPct val="90000"/>
+              </a:lnSpc>
+              <a:spcBef>
+                <a:spcPts val="500"/>
+              </a:spcBef>
+              <a:buFont typeface="Arial" panose="020B0604020202020204" pitchFamily="34" charset="0"/>
+              <a:buChar char="•"/>
+              <a:defRPr sz="2400" kern="1200">
+                <a:solidFill>
+                  <a:schemeClr val="tx1"/>
+                </a:solidFill>
+                <a:latin typeface="+mn-lt"/>
+                <a:ea typeface="+mn-ea"/>
+                <a:cs typeface="+mn-cs"/>
+              </a:defRPr>
+            </a:lvl2pPr>
+            <a:lvl3pPr marL="1143000" indent="-228600" algn="l" defTabSz="914400" rtl="0" eaLnBrk="1" latinLnBrk="0" hangingPunct="1">
+              <a:lnSpc>
+                <a:spcPct val="90000"/>
+              </a:lnSpc>
+              <a:spcBef>
+                <a:spcPts val="500"/>
+              </a:spcBef>
+              <a:buFont typeface="Arial" panose="020B0604020202020204" pitchFamily="34" charset="0"/>
+              <a:buChar char="•"/>
+              <a:defRPr sz="2000" kern="1200">
+                <a:solidFill>
+                  <a:schemeClr val="tx1"/>
+                </a:solidFill>
+                <a:latin typeface="+mn-lt"/>
+                <a:ea typeface="+mn-ea"/>
+                <a:cs typeface="+mn-cs"/>
+              </a:defRPr>
+            </a:lvl3pPr>
+            <a:lvl4pPr marL="1600200" indent="-228600" algn="l" defTabSz="914400" rtl="0" eaLnBrk="1" latinLnBrk="0" hangingPunct="1">
+              <a:lnSpc>
+                <a:spcPct val="90000"/>
+              </a:lnSpc>
+              <a:spcBef>
+                <a:spcPts val="500"/>
+              </a:spcBef>
+              <a:buFont typeface="Arial" panose="020B0604020202020204" pitchFamily="34" charset="0"/>
+              <a:buChar char="•"/>
+              <a:defRPr sz="1800" kern="1200">
+                <a:solidFill>
+                  <a:schemeClr val="tx1"/>
+                </a:solidFill>
+                <a:latin typeface="+mn-lt"/>
+                <a:ea typeface="+mn-ea"/>
+                <a:cs typeface="+mn-cs"/>
+              </a:defRPr>
+            </a:lvl4pPr>
+            <a:lvl5pPr marL="2057400" indent="-228600" algn="l" defTabSz="914400" rtl="0" eaLnBrk="1" latinLnBrk="0" hangingPunct="1">
+              <a:lnSpc>
+                <a:spcPct val="90000"/>
+              </a:lnSpc>
+              <a:spcBef>
+                <a:spcPts val="500"/>
+              </a:spcBef>
+              <a:buFont typeface="Arial" panose="020B0604020202020204" pitchFamily="34" charset="0"/>
+              <a:buChar char="•"/>
+              <a:defRPr sz="1800" kern="1200">
+                <a:solidFill>
+                  <a:schemeClr val="tx1"/>
+                </a:solidFill>
+                <a:latin typeface="+mn-lt"/>
+                <a:ea typeface="+mn-ea"/>
+                <a:cs typeface="+mn-cs"/>
+              </a:defRPr>
+            </a:lvl5pPr>
+            <a:lvl6pPr marL="2514600" indent="-228600" algn="l" defTabSz="914400" rtl="0" eaLnBrk="1" latinLnBrk="0" hangingPunct="1">
+              <a:lnSpc>
+                <a:spcPct val="90000"/>
+              </a:lnSpc>
+              <a:spcBef>
+                <a:spcPts val="500"/>
+              </a:spcBef>
+              <a:buFont typeface="Arial" panose="020B0604020202020204" pitchFamily="34" charset="0"/>
+              <a:buChar char="•"/>
+              <a:defRPr sz="1800" kern="1200">
+                <a:solidFill>
+                  <a:schemeClr val="tx1"/>
+                </a:solidFill>
+                <a:latin typeface="+mn-lt"/>
+                <a:ea typeface="+mn-ea"/>
+                <a:cs typeface="+mn-cs"/>
+              </a:defRPr>
+            </a:lvl6pPr>
+            <a:lvl7pPr marL="2971800" indent="-228600" algn="l" defTabSz="914400" rtl="0" eaLnBrk="1" latinLnBrk="0" hangingPunct="1">
+              <a:lnSpc>
+                <a:spcPct val="90000"/>
+              </a:lnSpc>
+              <a:spcBef>
+                <a:spcPts val="500"/>
+              </a:spcBef>
+              <a:buFont typeface="Arial" panose="020B0604020202020204" pitchFamily="34" charset="0"/>
+              <a:buChar char="•"/>
+              <a:defRPr sz="1800" kern="1200">
+                <a:solidFill>
+                  <a:schemeClr val="tx1"/>
+                </a:solidFill>
+                <a:latin typeface="+mn-lt"/>
+                <a:ea typeface="+mn-ea"/>
+                <a:cs typeface="+mn-cs"/>
+              </a:defRPr>
+            </a:lvl7pPr>
+            <a:lvl8pPr marL="3429000" indent="-228600" algn="l" defTabSz="914400" rtl="0" eaLnBrk="1" latinLnBrk="0" hangingPunct="1">
+              <a:lnSpc>
+                <a:spcPct val="90000"/>
+              </a:lnSpc>
+              <a:spcBef>
+                <a:spcPts val="500"/>
+              </a:spcBef>
+              <a:buFont typeface="Arial" panose="020B0604020202020204" pitchFamily="34" charset="0"/>
+              <a:buChar char="•"/>
+              <a:defRPr sz="1800" kern="1200">
+                <a:solidFill>
+                  <a:schemeClr val="tx1"/>
+                </a:solidFill>
+                <a:latin typeface="+mn-lt"/>
+                <a:ea typeface="+mn-ea"/>
+                <a:cs typeface="+mn-cs"/>
+              </a:defRPr>
+            </a:lvl8pPr>
+            <a:lvl9pPr marL="3886200" indent="-228600" algn="l" defTabSz="914400" rtl="0" eaLnBrk="1" latinLnBrk="0" hangingPunct="1">
+              <a:lnSpc>
+                <a:spcPct val="90000"/>
+              </a:lnSpc>
+              <a:spcBef>
+                <a:spcPts val="500"/>
+              </a:spcBef>
+              <a:buFont typeface="Arial" panose="020B0604020202020204" pitchFamily="34" charset="0"/>
+              <a:buChar char="•"/>
+              <a:defRPr sz="1800" kern="1200">
+                <a:solidFill>
+                  <a:schemeClr val="tx1"/>
+                </a:solidFill>
+                <a:latin typeface="+mn-lt"/>
+                <a:ea typeface="+mn-ea"/>
+                <a:cs typeface="+mn-cs"/>
+              </a:defRPr>
+            </a:lvl9pPr>
+          </a:lstStyle>
+          <a:p>
+            <a:pPr marL="0" indent="0">
+              <a:lnSpc>
+                <a:spcPct val="100000"/>
+              </a:lnSpc>
+              <a:buNone/>
+            </a:pPr>
+            <a:r>
+              <a:rPr lang="de-AT" sz="1200" dirty="0">
+                <a:solidFill>
+                  <a:srgbClr val="0000FF"/>
+                </a:solidFill>
+              </a:rPr>
+              <a:t>protected</a:t>
+            </a:r>
+            <a:r>
+              <a:rPr lang="de-AT" sz="1200" dirty="0"/>
+              <a:t> </a:t>
+            </a:r>
+            <a:r>
+              <a:rPr lang="de-AT" sz="1200" dirty="0">
+                <a:solidFill>
+                  <a:srgbClr val="A52A2A"/>
+                </a:solidFill>
+              </a:rPr>
+              <a:t>override</a:t>
+            </a:r>
+            <a:r>
+              <a:rPr lang="de-AT" sz="1200" dirty="0"/>
+              <a:t> </a:t>
+            </a:r>
+            <a:r>
+              <a:rPr lang="de-AT" sz="1200" dirty="0">
+                <a:solidFill>
+                  <a:srgbClr val="FF0000"/>
+                </a:solidFill>
+              </a:rPr>
+              <a:t>void</a:t>
+            </a:r>
+            <a:r>
+              <a:rPr lang="de-AT" sz="1200" dirty="0"/>
+              <a:t> </a:t>
+            </a:r>
+            <a:r>
+              <a:rPr lang="de-AT" sz="1200" dirty="0">
+                <a:solidFill>
+                  <a:srgbClr val="191970"/>
+                </a:solidFill>
+              </a:rPr>
+              <a:t>Initialize</a:t>
+            </a:r>
+            <a:r>
+              <a:rPr lang="de-AT" sz="1200" dirty="0"/>
+              <a:t>(CancellationToken cancellationToken) {</a:t>
+            </a:r>
+            <a:br>
+              <a:rPr lang="de-AT" sz="1200" dirty="0"/>
+            </a:br>
+            <a:r>
+              <a:rPr lang="de-AT" sz="1200" dirty="0"/>
+              <a:t>  Results.</a:t>
+            </a:r>
+            <a:r>
+              <a:rPr lang="de-AT" sz="1200" dirty="0">
+                <a:solidFill>
+                  <a:srgbClr val="191970"/>
+                </a:solidFill>
+              </a:rPr>
+              <a:t>Add</a:t>
+            </a:r>
+            <a:r>
+              <a:rPr lang="de-AT" sz="1200" dirty="0"/>
+              <a:t>(</a:t>
+            </a:r>
+            <a:r>
+              <a:rPr lang="de-AT" sz="1200" dirty="0">
+                <a:solidFill>
+                  <a:srgbClr val="008B8B"/>
+                </a:solidFill>
+              </a:rPr>
+              <a:t>new</a:t>
+            </a:r>
+            <a:r>
+              <a:rPr lang="de-AT" sz="1200" dirty="0"/>
+              <a:t> </a:t>
+            </a:r>
+            <a:r>
+              <a:rPr lang="de-AT" sz="1200" dirty="0">
+                <a:solidFill>
+                  <a:srgbClr val="191970"/>
+                </a:solidFill>
+              </a:rPr>
+              <a:t>Result</a:t>
+            </a:r>
+            <a:r>
+              <a:rPr lang="de-AT" sz="1200" dirty="0"/>
+              <a:t>(BestQualityResultName, </a:t>
+            </a:r>
+            <a:r>
+              <a:rPr lang="de-AT" sz="1200" dirty="0">
+                <a:solidFill>
+                  <a:srgbClr val="008B8B"/>
+                </a:solidFill>
+              </a:rPr>
+              <a:t>new</a:t>
+            </a:r>
+            <a:r>
+              <a:rPr lang="de-AT" sz="1200" dirty="0"/>
+              <a:t> </a:t>
+            </a:r>
+            <a:r>
+              <a:rPr lang="de-AT" sz="1200" dirty="0">
+                <a:solidFill>
+                  <a:srgbClr val="191970"/>
+                </a:solidFill>
+              </a:rPr>
+              <a:t>DoubleValue</a:t>
+            </a:r>
+            <a:r>
+              <a:rPr lang="de-AT" sz="1200" dirty="0"/>
+              <a:t>(</a:t>
+            </a:r>
+            <a:r>
+              <a:rPr lang="de-AT" sz="1200" dirty="0">
+                <a:solidFill>
+                  <a:srgbClr val="FF0000"/>
+                </a:solidFill>
+              </a:rPr>
+              <a:t>double</a:t>
+            </a:r>
+            <a:r>
+              <a:rPr lang="de-AT" sz="1200" dirty="0"/>
+              <a:t>.NaN)));</a:t>
+            </a:r>
+            <a:br>
+              <a:rPr lang="de-AT" sz="1200" dirty="0"/>
+            </a:br>
+            <a:r>
+              <a:rPr lang="de-AT" sz="1200" dirty="0"/>
+              <a:t>  Results.</a:t>
+            </a:r>
+            <a:r>
+              <a:rPr lang="de-AT" sz="1200" dirty="0">
+                <a:solidFill>
+                  <a:srgbClr val="191970"/>
+                </a:solidFill>
+              </a:rPr>
+              <a:t>Add</a:t>
+            </a:r>
+            <a:r>
+              <a:rPr lang="de-AT" sz="1200" dirty="0"/>
+              <a:t>(</a:t>
+            </a:r>
+            <a:r>
+              <a:rPr lang="de-AT" sz="1200" dirty="0">
+                <a:solidFill>
+                  <a:srgbClr val="008B8B"/>
+                </a:solidFill>
+              </a:rPr>
+              <a:t>new</a:t>
+            </a:r>
+            <a:r>
+              <a:rPr lang="de-AT" sz="1200" dirty="0"/>
+              <a:t> </a:t>
+            </a:r>
+            <a:r>
+              <a:rPr lang="de-AT" sz="1200" dirty="0">
+                <a:solidFill>
+                  <a:srgbClr val="191970"/>
+                </a:solidFill>
+              </a:rPr>
+              <a:t>Result</a:t>
+            </a:r>
+            <a:r>
+              <a:rPr lang="de-AT" sz="1200" dirty="0"/>
+              <a:t>(IterationsResultName, </a:t>
+            </a:r>
+            <a:r>
+              <a:rPr lang="de-AT" sz="1200" dirty="0">
+                <a:solidFill>
+                  <a:srgbClr val="008B8B"/>
+                </a:solidFill>
+              </a:rPr>
+              <a:t>new</a:t>
+            </a:r>
+            <a:r>
+              <a:rPr lang="de-AT" sz="1200" dirty="0"/>
+              <a:t> </a:t>
+            </a:r>
+            <a:r>
+              <a:rPr lang="de-AT" sz="1200" dirty="0">
+                <a:solidFill>
+                  <a:srgbClr val="191970"/>
+                </a:solidFill>
+              </a:rPr>
+              <a:t>IntValue</a:t>
+            </a:r>
+            <a:r>
+              <a:rPr lang="de-AT" sz="1200" dirty="0"/>
+              <a:t>(</a:t>
+            </a:r>
+            <a:r>
+              <a:rPr lang="de-AT" sz="1200" dirty="0">
+                <a:solidFill>
+                  <a:srgbClr val="00008B"/>
+                </a:solidFill>
+              </a:rPr>
+              <a:t>0</a:t>
+            </a:r>
+            <a:r>
+              <a:rPr lang="de-AT" sz="1200" dirty="0"/>
+              <a:t>)));</a:t>
+            </a:r>
+            <a:br>
+              <a:rPr lang="de-AT" sz="1200" dirty="0"/>
+            </a:br>
+            <a:r>
+              <a:rPr lang="de-AT" sz="1200" dirty="0"/>
+              <a:t>  base.</a:t>
+            </a:r>
+            <a:r>
+              <a:rPr lang="de-AT" sz="1200" dirty="0">
+                <a:solidFill>
+                  <a:srgbClr val="191970"/>
+                </a:solidFill>
+              </a:rPr>
+              <a:t>Initialize</a:t>
+            </a:r>
+            <a:r>
+              <a:rPr lang="de-AT" sz="1200" dirty="0"/>
+              <a:t>(cancellationToken);</a:t>
+            </a:r>
+            <a:br>
+              <a:rPr lang="de-AT" sz="1200" dirty="0"/>
+            </a:br>
+            <a:r>
+              <a:rPr lang="de-AT" sz="1200" dirty="0"/>
+              <a:t>}</a:t>
+            </a:r>
+            <a:br>
+              <a:rPr lang="de-AT" sz="1200" dirty="0"/>
+            </a:br>
+            <a:r>
+              <a:rPr lang="de-AT" sz="1200" dirty="0"/>
+              <a:t/>
+            </a:r>
+            <a:br>
+              <a:rPr lang="de-AT" sz="1200" dirty="0"/>
+            </a:br>
+            <a:r>
+              <a:rPr lang="de-AT" sz="1200" dirty="0">
+                <a:solidFill>
+                  <a:srgbClr val="0000FF"/>
+                </a:solidFill>
+              </a:rPr>
+              <a:t>protected</a:t>
+            </a:r>
+            <a:r>
+              <a:rPr lang="de-AT" sz="1200" dirty="0"/>
+              <a:t> </a:t>
+            </a:r>
+            <a:r>
+              <a:rPr lang="de-AT" sz="1200" dirty="0">
+                <a:solidFill>
+                  <a:srgbClr val="A52A2A"/>
+                </a:solidFill>
+              </a:rPr>
+              <a:t>override</a:t>
+            </a:r>
+            <a:r>
+              <a:rPr lang="de-AT" sz="1200" dirty="0"/>
+              <a:t> </a:t>
+            </a:r>
+            <a:r>
+              <a:rPr lang="de-AT" sz="1200" dirty="0">
+                <a:solidFill>
+                  <a:srgbClr val="FF0000"/>
+                </a:solidFill>
+              </a:rPr>
+              <a:t>void</a:t>
+            </a:r>
+            <a:r>
+              <a:rPr lang="de-AT" sz="1200" dirty="0"/>
+              <a:t> </a:t>
+            </a:r>
+            <a:r>
+              <a:rPr lang="de-AT" sz="1200" dirty="0">
+                <a:solidFill>
+                  <a:srgbClr val="191970"/>
+                </a:solidFill>
+              </a:rPr>
+              <a:t>Run</a:t>
+            </a:r>
+            <a:r>
+              <a:rPr lang="de-AT" sz="1200" dirty="0"/>
+              <a:t>(CancellationToken cancellationToken) {</a:t>
+            </a:r>
+            <a:br>
+              <a:rPr lang="de-AT" sz="1200" dirty="0"/>
+            </a:br>
+            <a:r>
+              <a:rPr lang="de-AT" sz="1200" dirty="0"/>
+              <a:t>  </a:t>
+            </a:r>
+            <a:r>
+              <a:rPr lang="de-AT" sz="1200" dirty="0">
+                <a:solidFill>
+                  <a:srgbClr val="0000FF"/>
+                </a:solidFill>
+              </a:rPr>
+              <a:t>while</a:t>
+            </a:r>
+            <a:r>
+              <a:rPr lang="de-AT" sz="1200" dirty="0"/>
+              <a:t> (ResultsIterations &lt; Iterations) {</a:t>
+            </a:r>
+            <a:br>
+              <a:rPr lang="de-AT" sz="1200" dirty="0"/>
+            </a:br>
+            <a:r>
+              <a:rPr lang="de-AT" sz="1200" dirty="0"/>
+              <a:t>    cancellationToken.</a:t>
+            </a:r>
+            <a:r>
+              <a:rPr lang="de-AT" sz="1200" dirty="0">
+                <a:solidFill>
+                  <a:srgbClr val="191970"/>
+                </a:solidFill>
+              </a:rPr>
+              <a:t>ThrowIfCancellationRequested</a:t>
+            </a:r>
+            <a:r>
+              <a:rPr lang="de-AT" sz="1200" dirty="0"/>
+              <a:t>();</a:t>
+            </a:r>
+            <a:br>
+              <a:rPr lang="de-AT" sz="1200" dirty="0"/>
+            </a:br>
+            <a:r>
+              <a:rPr lang="de-AT" sz="1200" dirty="0"/>
+              <a:t/>
+            </a:r>
+            <a:br>
+              <a:rPr lang="de-AT" sz="1200" dirty="0"/>
+            </a:br>
+            <a:r>
+              <a:rPr lang="de-AT" sz="1200" dirty="0"/>
+              <a:t>    </a:t>
+            </a:r>
+            <a:r>
+              <a:rPr lang="de-AT" sz="1200" dirty="0">
+                <a:solidFill>
+                  <a:srgbClr val="008000"/>
+                </a:solidFill>
+              </a:rPr>
+              <a:t>// execute one iteration</a:t>
+            </a:r>
+            <a:r>
+              <a:rPr lang="de-AT" sz="1200" dirty="0"/>
+              <a:t/>
+            </a:r>
+            <a:br>
+              <a:rPr lang="de-AT" sz="1200" dirty="0"/>
+            </a:br>
+            <a:r>
+              <a:rPr lang="de-AT" sz="1200" dirty="0"/>
+              <a:t/>
+            </a:r>
+            <a:br>
+              <a:rPr lang="de-AT" sz="1200" dirty="0"/>
+            </a:br>
+            <a:r>
+              <a:rPr lang="de-AT" sz="1200" dirty="0"/>
+              <a:t>    ResultsIterations++;</a:t>
+            </a:r>
+            <a:br>
+              <a:rPr lang="de-AT" sz="1200" dirty="0"/>
+            </a:br>
+            <a:r>
+              <a:rPr lang="de-AT" sz="1200" dirty="0"/>
+              <a:t>  }</a:t>
+            </a:r>
+            <a:br>
+              <a:rPr lang="de-AT" sz="1200" dirty="0"/>
+            </a:br>
+            <a:r>
+              <a:rPr lang="de-AT" sz="1200" dirty="0"/>
+              <a:t>}</a:t>
+            </a:r>
+            <a:endParaRPr lang="de-DE" sz="1200" dirty="0"/>
           </a:p>
         </p:txBody>
       </p:sp>

</xml_diff>

<commit_message>
added roadmap to hl 4 slides
git-svn-id: https://src.heuristiclab.com/svn/core/trunk@13589 2abd9481-f8db-48e9-bd25-06bc13291c1b
</commit_message>
<xml_diff>
--- a/documentation/HeuristicLab 4.0.pptx
+++ b/documentation/HeuristicLab 4.0.pptx
@@ -6,7 +6,7 @@
   </p:sldMasterIdLst>
   <p:sldIdLst>
     <p:sldId id="256" r:id="rId2"/>
-    <p:sldId id="267" r:id="rId3"/>
+    <p:sldId id="273" r:id="rId3"/>
     <p:sldId id="269" r:id="rId4"/>
     <p:sldId id="270" r:id="rId5"/>
     <p:sldId id="258" r:id="rId6"/>
@@ -4496,15 +4496,7 @@
           <a:p>
             <a:r>
               <a:rPr lang="en-US" dirty="0" smtClean="0"/>
-              <a:t>Roadmap (</a:t>
-            </a:r>
-            <a:r>
-              <a:rPr lang="en-US" dirty="0" err="1" smtClean="0"/>
-              <a:t>Ascheibe</a:t>
-            </a:r>
-            <a:r>
-              <a:rPr lang="en-US" dirty="0" smtClean="0"/>
-              <a:t>)</a:t>
+              <a:t>Roadmap</a:t>
             </a:r>
             <a:endParaRPr lang="en-US" dirty="0"/>
           </a:p>
@@ -4522,9 +4514,111 @@
         </p:nvSpPr>
         <p:spPr/>
         <p:txBody>
-          <a:bodyPr/>
+          <a:bodyPr>
+            <a:normAutofit fontScale="92500" lnSpcReduction="10000"/>
+          </a:bodyPr>
           <a:lstStyle/>
           <a:p>
+            <a:r>
+              <a:rPr lang="en-US" dirty="0" smtClean="0"/>
+              <a:t>2 releases until HL 4.0</a:t>
+            </a:r>
+          </a:p>
+          <a:p>
+            <a:pPr lvl="1"/>
+            <a:r>
+              <a:rPr lang="en-US" dirty="0" smtClean="0"/>
+              <a:t>HL 3.3.14 “Unnamed”: begin of March 2016</a:t>
+            </a:r>
+          </a:p>
+          <a:p>
+            <a:pPr lvl="1"/>
+            <a:r>
+              <a:rPr lang="en-US" dirty="0" smtClean="0"/>
+              <a:t>HL 3.3.15 “Denver”: begin of July 2016</a:t>
+            </a:r>
+          </a:p>
+          <a:p>
+            <a:r>
+              <a:rPr lang="en-US" dirty="0" smtClean="0"/>
+              <a:t>HL 4.0</a:t>
+            </a:r>
+          </a:p>
+          <a:p>
+            <a:pPr lvl="1"/>
+            <a:r>
+              <a:rPr lang="en-US" dirty="0" smtClean="0"/>
+              <a:t>Use summer for finishing 4.0</a:t>
+            </a:r>
+          </a:p>
+          <a:p>
+            <a:pPr lvl="1"/>
+            <a:r>
+              <a:rPr lang="en-US" dirty="0" smtClean="0"/>
+              <a:t>Release end of September 2016</a:t>
+            </a:r>
+          </a:p>
+          <a:p>
+            <a:r>
+              <a:rPr lang="en-US" dirty="0" smtClean="0"/>
+              <a:t>Between 3.3.15 and 4.0</a:t>
+            </a:r>
+          </a:p>
+          <a:p>
+            <a:pPr lvl="1"/>
+            <a:r>
+              <a:rPr lang="en-US" dirty="0"/>
+              <a:t>Integration of </a:t>
+            </a:r>
+            <a:r>
+              <a:rPr lang="en-US" dirty="0" smtClean="0"/>
+              <a:t>new features </a:t>
+            </a:r>
+            <a:r>
+              <a:rPr lang="en-US" dirty="0"/>
+              <a:t>into </a:t>
+            </a:r>
+            <a:r>
+              <a:rPr lang="en-US" dirty="0" smtClean="0"/>
+              <a:t>trunk</a:t>
+            </a:r>
+            <a:endParaRPr lang="en-US" dirty="0"/>
+          </a:p>
+          <a:p>
+            <a:pPr lvl="1"/>
+            <a:r>
+              <a:rPr lang="en-US" dirty="0" smtClean="0"/>
+              <a:t>HL3legacy branch</a:t>
+            </a:r>
+          </a:p>
+          <a:p>
+            <a:pPr lvl="2"/>
+            <a:r>
+              <a:rPr lang="en-US" dirty="0" smtClean="0"/>
+              <a:t>Last version of trunk before integration</a:t>
+            </a:r>
+          </a:p>
+          <a:p>
+            <a:pPr lvl="2"/>
+            <a:r>
+              <a:rPr lang="en-US" dirty="0" smtClean="0"/>
+              <a:t>Will only get </a:t>
+            </a:r>
+            <a:r>
+              <a:rPr lang="en-US" dirty="0" err="1" smtClean="0"/>
+              <a:t>bugfixes</a:t>
+            </a:r>
+            <a:endParaRPr lang="en-US" dirty="0" smtClean="0"/>
+          </a:p>
+          <a:p>
+            <a:pPr lvl="2"/>
+            <a:r>
+              <a:rPr lang="en-US" dirty="0" smtClean="0"/>
+              <a:t>Can be used until trunk settles</a:t>
+            </a:r>
+          </a:p>
+          <a:p>
+            <a:pPr lvl="1"/>
             <a:endParaRPr lang="en-US" dirty="0"/>
           </a:p>
         </p:txBody>
@@ -4532,7 +4626,7 @@
     </p:spTree>
     <p:extLst>
       <p:ext uri="{BB962C8B-B14F-4D97-AF65-F5344CB8AC3E}">
-        <p14:creationId xmlns:p14="http://schemas.microsoft.com/office/powerpoint/2010/main" val="3537438304"/>
+        <p14:creationId xmlns:p14="http://schemas.microsoft.com/office/powerpoint/2010/main" val="3840491458"/>
       </p:ext>
     </p:extLst>
   </p:cSld>
@@ -8444,11 +8538,7 @@
             <a:pPr lvl="1"/>
             <a:r>
               <a:rPr lang="en-US" dirty="0" smtClean="0"/>
-              <a:t>If true, cancelling</a:t>
-            </a:r>
-            <a:r>
-              <a:rPr lang="en-US" dirty="0" smtClean="0"/>
-              <a:t> the </a:t>
+              <a:t>If true, cancelling the </a:t>
             </a:r>
             <a:r>
               <a:rPr lang="en-US" dirty="0" err="1" smtClean="0"/>

</xml_diff>

<commit_message>
Updated HL 4.0 presentation
git-svn-id: https://src.heuristiclab.com/svn/core/trunk@13596 2abd9481-f8db-48e9-bd25-06bc13291c1b
</commit_message>
<xml_diff>
--- a/documentation/HeuristicLab 4.0.pptx
+++ b/documentation/HeuristicLab 4.0.pptx
@@ -256,7 +256,7 @@
           <a:p>
             <a:fld id="{04FFA9E9-5461-4D3B-90F8-43CB1CC1C3BF}" type="datetimeFigureOut">
               <a:rPr lang="de-DE" smtClean="0"/>
-              <a:t>05.02.2016</a:t>
+              <a:t>08.02.2016</a:t>
             </a:fld>
             <a:endParaRPr lang="de-DE"/>
           </a:p>
@@ -426,7 +426,7 @@
           <a:p>
             <a:fld id="{04FFA9E9-5461-4D3B-90F8-43CB1CC1C3BF}" type="datetimeFigureOut">
               <a:rPr lang="de-DE" smtClean="0"/>
-              <a:t>05.02.2016</a:t>
+              <a:t>08.02.2016</a:t>
             </a:fld>
             <a:endParaRPr lang="de-DE"/>
           </a:p>
@@ -606,7 +606,7 @@
           <a:p>
             <a:fld id="{04FFA9E9-5461-4D3B-90F8-43CB1CC1C3BF}" type="datetimeFigureOut">
               <a:rPr lang="de-DE" smtClean="0"/>
-              <a:t>05.02.2016</a:t>
+              <a:t>08.02.2016</a:t>
             </a:fld>
             <a:endParaRPr lang="de-DE"/>
           </a:p>
@@ -776,7 +776,7 @@
           <a:p>
             <a:fld id="{04FFA9E9-5461-4D3B-90F8-43CB1CC1C3BF}" type="datetimeFigureOut">
               <a:rPr lang="de-DE" smtClean="0"/>
-              <a:t>05.02.2016</a:t>
+              <a:t>08.02.2016</a:t>
             </a:fld>
             <a:endParaRPr lang="de-DE"/>
           </a:p>
@@ -1022,7 +1022,7 @@
           <a:p>
             <a:fld id="{04FFA9E9-5461-4D3B-90F8-43CB1CC1C3BF}" type="datetimeFigureOut">
               <a:rPr lang="de-DE" smtClean="0"/>
-              <a:t>05.02.2016</a:t>
+              <a:t>08.02.2016</a:t>
             </a:fld>
             <a:endParaRPr lang="de-DE"/>
           </a:p>
@@ -1254,7 +1254,7 @@
           <a:p>
             <a:fld id="{04FFA9E9-5461-4D3B-90F8-43CB1CC1C3BF}" type="datetimeFigureOut">
               <a:rPr lang="de-DE" smtClean="0"/>
-              <a:t>05.02.2016</a:t>
+              <a:t>08.02.2016</a:t>
             </a:fld>
             <a:endParaRPr lang="de-DE"/>
           </a:p>
@@ -1621,7 +1621,7 @@
           <a:p>
             <a:fld id="{04FFA9E9-5461-4D3B-90F8-43CB1CC1C3BF}" type="datetimeFigureOut">
               <a:rPr lang="de-DE" smtClean="0"/>
-              <a:t>05.02.2016</a:t>
+              <a:t>08.02.2016</a:t>
             </a:fld>
             <a:endParaRPr lang="de-DE"/>
           </a:p>
@@ -1739,7 +1739,7 @@
           <a:p>
             <a:fld id="{04FFA9E9-5461-4D3B-90F8-43CB1CC1C3BF}" type="datetimeFigureOut">
               <a:rPr lang="de-DE" smtClean="0"/>
-              <a:t>05.02.2016</a:t>
+              <a:t>08.02.2016</a:t>
             </a:fld>
             <a:endParaRPr lang="de-DE"/>
           </a:p>
@@ -1834,7 +1834,7 @@
           <a:p>
             <a:fld id="{04FFA9E9-5461-4D3B-90F8-43CB1CC1C3BF}" type="datetimeFigureOut">
               <a:rPr lang="de-DE" smtClean="0"/>
-              <a:t>05.02.2016</a:t>
+              <a:t>08.02.2016</a:t>
             </a:fld>
             <a:endParaRPr lang="de-DE"/>
           </a:p>
@@ -2111,7 +2111,7 @@
           <a:p>
             <a:fld id="{04FFA9E9-5461-4D3B-90F8-43CB1CC1C3BF}" type="datetimeFigureOut">
               <a:rPr lang="de-DE" smtClean="0"/>
-              <a:t>05.02.2016</a:t>
+              <a:t>08.02.2016</a:t>
             </a:fld>
             <a:endParaRPr lang="de-DE"/>
           </a:p>
@@ -2364,7 +2364,7 @@
           <a:p>
             <a:fld id="{04FFA9E9-5461-4D3B-90F8-43CB1CC1C3BF}" type="datetimeFigureOut">
               <a:rPr lang="de-DE" smtClean="0"/>
-              <a:t>05.02.2016</a:t>
+              <a:t>08.02.2016</a:t>
             </a:fld>
             <a:endParaRPr lang="de-DE"/>
           </a:p>
@@ -2577,7 +2577,7 @@
           <a:p>
             <a:fld id="{04FFA9E9-5461-4D3B-90F8-43CB1CC1C3BF}" type="datetimeFigureOut">
               <a:rPr lang="de-DE" smtClean="0"/>
-              <a:t>05.02.2016</a:t>
+              <a:t>08.02.2016</a:t>
             </a:fld>
             <a:endParaRPr lang="de-DE"/>
           </a:p>
@@ -3022,7 +3022,11 @@
           <a:p>
             <a:r>
               <a:rPr lang="de-DE" dirty="0" smtClean="0"/>
-              <a:t>Roadmap – Features - </a:t>
+              <a:t>Roadmap – Features </a:t>
+            </a:r>
+            <a:r>
+              <a:rPr lang="de-DE" dirty="0" smtClean="0"/>
+              <a:t>– </a:t>
             </a:r>
             <a:r>
               <a:rPr lang="de-DE" dirty="0" err="1" smtClean="0"/>
@@ -3837,22 +3841,14 @@
             <a:pPr lvl="1"/>
             <a:r>
               <a:rPr lang="en-US" dirty="0" smtClean="0"/>
-              <a:t>Additional concept to better compare algorithm </a:t>
-            </a:r>
+              <a:t>Additional concept to better compare algorithm performances</a:t>
+            </a:r>
+          </a:p>
+          <a:p>
+            <a:pPr lvl="1"/>
             <a:r>
               <a:rPr lang="en-US" dirty="0" smtClean="0"/>
-              <a:t>performances</a:t>
-            </a:r>
-          </a:p>
-          <a:p>
-            <a:pPr lvl="1"/>
-            <a:r>
-              <a:rPr lang="en-US" dirty="0" smtClean="0"/>
-              <a:t>e.g</a:t>
-            </a:r>
-            <a:r>
-              <a:rPr lang="en-US" dirty="0" smtClean="0"/>
-              <a:t>. only allow 10</a:t>
+              <a:t>e.g. only allow 10</a:t>
             </a:r>
             <a:r>
               <a:rPr lang="en-US" baseline="30000" dirty="0" smtClean="0"/>
@@ -3883,11 +3879,7 @@
             </a:r>
             <a:r>
               <a:rPr lang="en-US" dirty="0" smtClean="0"/>
-              <a:t> and cancels the algorithm if any of the active termination criteria is not </a:t>
-            </a:r>
-            <a:r>
-              <a:rPr lang="en-US" dirty="0" smtClean="0"/>
-              <a:t>met</a:t>
+              <a:t> and cancels the algorithm if any of the active termination criteria is not met</a:t>
             </a:r>
             <a:endParaRPr lang="en-US" dirty="0"/>
           </a:p>
@@ -4535,7 +4527,7 @@
         <p:spPr/>
         <p:txBody>
           <a:bodyPr>
-            <a:normAutofit fontScale="92500" lnSpcReduction="10000"/>
+            <a:normAutofit fontScale="92500" lnSpcReduction="20000"/>
           </a:bodyPr>
           <a:lstStyle/>
           <a:p>
@@ -4548,15 +4540,28 @@
             <a:pPr lvl="1"/>
             <a:r>
               <a:rPr lang="en-US" dirty="0" smtClean="0"/>
-              <a:t>HL 3.3.14 “Unnamed”: begin of March 2016</a:t>
+              <a:t>HL 3.3.14 “Unnamed”: </a:t>
+            </a:r>
+            <a:r>
+              <a:rPr lang="en-US" dirty="0" smtClean="0"/>
+              <a:t>March </a:t>
+            </a:r>
+            <a:r>
+              <a:rPr lang="en-US" dirty="0" smtClean="0"/>
+              <a:t>2016</a:t>
             </a:r>
           </a:p>
           <a:p>
             <a:pPr lvl="1"/>
             <a:r>
               <a:rPr lang="en-US" dirty="0" smtClean="0"/>
-              <a:t>HL 3.3.15 “Denver”: begin of July 2016</a:t>
-            </a:r>
+              <a:t>HL 3.3.15 “Denver”: </a:t>
+            </a:r>
+            <a:r>
+              <a:rPr lang="en-US" dirty="0" smtClean="0"/>
+              <a:t>July 2016 (before/at GECCO 2016)</a:t>
+            </a:r>
+            <a:endParaRPr lang="en-US" dirty="0" smtClean="0"/>
           </a:p>
           <a:p>
             <a:r>
@@ -4568,31 +4573,63 @@
             <a:pPr lvl="1"/>
             <a:r>
               <a:rPr lang="en-US" dirty="0" smtClean="0"/>
-              <a:t>Use summer for finishing 4.0</a:t>
+              <a:t>use </a:t>
+            </a:r>
+            <a:r>
+              <a:rPr lang="en-US" dirty="0" smtClean="0"/>
+              <a:t>summer for finishing 4.0</a:t>
             </a:r>
           </a:p>
           <a:p>
             <a:pPr lvl="1"/>
             <a:r>
               <a:rPr lang="en-US" dirty="0" smtClean="0"/>
-              <a:t>Release end of September 2016</a:t>
-            </a:r>
-          </a:p>
-          <a:p>
+              <a:t>release in </a:t>
+            </a:r>
             <a:r>
               <a:rPr lang="en-US" dirty="0" smtClean="0"/>
-              <a:t>Between 3.3.15 and 4.0</a:t>
+              <a:t>September </a:t>
+            </a:r>
+            <a:r>
+              <a:rPr lang="en-US" dirty="0" smtClean="0"/>
+              <a:t>2016</a:t>
             </a:r>
           </a:p>
           <a:p>
             <a:pPr lvl="1"/>
             <a:r>
+              <a:rPr lang="en-US" dirty="0" smtClean="0"/>
+              <a:t>present HL 4.0 at APCASE 2016 (?)</a:t>
+            </a:r>
+            <a:endParaRPr lang="en-US" dirty="0" smtClean="0"/>
+          </a:p>
+          <a:p>
+            <a:r>
+              <a:rPr lang="en-US" dirty="0" smtClean="0"/>
+              <a:t>Between </a:t>
+            </a:r>
+            <a:r>
+              <a:rPr lang="en-US" dirty="0" smtClean="0"/>
+              <a:t>3.3.15 and 4.0</a:t>
+            </a:r>
+          </a:p>
+          <a:p>
+            <a:pPr lvl="1"/>
+            <a:r>
+              <a:rPr lang="en-US" dirty="0" smtClean="0"/>
+              <a:t>integration </a:t>
+            </a:r>
+            <a:r>
               <a:rPr lang="en-US" dirty="0"/>
-              <a:t>Integration of </a:t>
+              <a:t>of </a:t>
             </a:r>
             <a:r>
               <a:rPr lang="en-US" dirty="0" smtClean="0"/>
-              <a:t>new features </a:t>
+              <a:t>new </a:t>
+            </a:r>
+            <a:r>
+              <a:rPr lang="en-US" dirty="0" smtClean="0"/>
+              <a:t>HL 4.0 features </a:t>
             </a:r>
             <a:r>
               <a:rPr lang="en-US" dirty="0"/>
@@ -4615,14 +4652,22 @@
             <a:pPr lvl="2"/>
             <a:r>
               <a:rPr lang="en-US" dirty="0" smtClean="0"/>
-              <a:t>Last version of trunk before integration</a:t>
+              <a:t>last </a:t>
+            </a:r>
+            <a:r>
+              <a:rPr lang="en-US" dirty="0" smtClean="0"/>
+              <a:t>version of trunk before integration</a:t>
             </a:r>
           </a:p>
           <a:p>
             <a:pPr lvl="2"/>
             <a:r>
               <a:rPr lang="en-US" dirty="0" smtClean="0"/>
-              <a:t>Will only get </a:t>
+              <a:t>will </a:t>
+            </a:r>
+            <a:r>
+              <a:rPr lang="en-US" dirty="0" smtClean="0"/>
+              <a:t>only get </a:t>
             </a:r>
             <a:r>
               <a:rPr lang="en-US" dirty="0" err="1" smtClean="0"/>
@@ -4634,12 +4679,17 @@
             <a:pPr lvl="2"/>
             <a:r>
               <a:rPr lang="en-US" dirty="0" smtClean="0"/>
-              <a:t>Can be used until trunk settles</a:t>
-            </a:r>
-          </a:p>
-          <a:p>
-            <a:pPr lvl="1"/>
-            <a:endParaRPr lang="en-US" dirty="0"/>
+              <a:t>can </a:t>
+            </a:r>
+            <a:r>
+              <a:rPr lang="en-US" dirty="0" smtClean="0"/>
+              <a:t>be used until trunk </a:t>
+            </a:r>
+            <a:r>
+              <a:rPr lang="en-US" dirty="0" smtClean="0"/>
+              <a:t>settles</a:t>
+            </a:r>
+            <a:endParaRPr lang="en-US" dirty="0" smtClean="0"/>
           </a:p>
         </p:txBody>
       </p:sp>
@@ -4744,14 +4794,24 @@
           <a:p>
             <a:r>
               <a:rPr lang="en-US" dirty="0" smtClean="0"/>
-              <a:t>Plugin Infrastructure changes</a:t>
-            </a:r>
-          </a:p>
-          <a:p>
+              <a:t>Plugin Infrastructure </a:t>
+            </a:r>
             <a:r>
               <a:rPr lang="en-US" dirty="0" smtClean="0"/>
-              <a:t>Minor changes</a:t>
-            </a:r>
+              <a:t>Changes</a:t>
+            </a:r>
+            <a:endParaRPr lang="en-US" dirty="0" smtClean="0"/>
+          </a:p>
+          <a:p>
+            <a:r>
+              <a:rPr lang="en-US" dirty="0" smtClean="0"/>
+              <a:t>Minor </a:t>
+            </a:r>
+            <a:r>
+              <a:rPr lang="en-US" dirty="0" smtClean="0"/>
+              <a:t>Changes</a:t>
+            </a:r>
+            <a:endParaRPr lang="en-US" dirty="0" smtClean="0"/>
           </a:p>
           <a:p>
             <a:endParaRPr lang="en-US" dirty="0"/>
@@ -8570,11 +8630,7 @@
           <a:p>
             <a:r>
               <a:rPr lang="en-US" dirty="0" smtClean="0"/>
-              <a:t>Up </a:t>
-            </a:r>
-            <a:r>
-              <a:rPr lang="en-US" dirty="0" smtClean="0"/>
-              <a:t>to now, </a:t>
+              <a:t>Up to now, </a:t>
             </a:r>
             <a:r>
               <a:rPr lang="en-US" dirty="0" err="1" smtClean="0"/>

</xml_diff>

<commit_message>
updated HL 4.0 slides
git-svn-id: https://src.heuristiclab.com/svn/core/trunk@13599 2abd9481-f8db-48e9-bd25-06bc13291c1b
</commit_message>
<xml_diff>
--- a/documentation/HeuristicLab 4.0.pptx
+++ b/documentation/HeuristicLab 4.0.pptx
@@ -11,19 +11,18 @@
     <p:sldId id="258" r:id="rId5"/>
     <p:sldId id="262" r:id="rId6"/>
     <p:sldId id="257" r:id="rId7"/>
-    <p:sldId id="260" r:id="rId8"/>
-    <p:sldId id="274" r:id="rId9"/>
-    <p:sldId id="271" r:id="rId10"/>
-    <p:sldId id="272" r:id="rId11"/>
-    <p:sldId id="270" r:id="rId12"/>
-    <p:sldId id="275" r:id="rId13"/>
-    <p:sldId id="276" r:id="rId14"/>
-    <p:sldId id="277" r:id="rId15"/>
-    <p:sldId id="278" r:id="rId16"/>
-    <p:sldId id="279" r:id="rId17"/>
-    <p:sldId id="280" r:id="rId18"/>
-    <p:sldId id="266" r:id="rId19"/>
-    <p:sldId id="265" r:id="rId20"/>
+    <p:sldId id="274" r:id="rId8"/>
+    <p:sldId id="271" r:id="rId9"/>
+    <p:sldId id="272" r:id="rId10"/>
+    <p:sldId id="270" r:id="rId11"/>
+    <p:sldId id="275" r:id="rId12"/>
+    <p:sldId id="276" r:id="rId13"/>
+    <p:sldId id="277" r:id="rId14"/>
+    <p:sldId id="278" r:id="rId15"/>
+    <p:sldId id="279" r:id="rId16"/>
+    <p:sldId id="280" r:id="rId17"/>
+    <p:sldId id="266" r:id="rId18"/>
+    <p:sldId id="265" r:id="rId19"/>
   </p:sldIdLst>
   <p:sldSz cx="12192000" cy="6858000"/>
   <p:notesSz cx="6858000" cy="9144000"/>
@@ -3090,294 +3089,6 @@
           <a:lstStyle/>
           <a:p>
             <a:r>
-              <a:rPr lang="de-DE" dirty="0"/>
-              <a:t>New Termination Criteria</a:t>
-            </a:r>
-            <a:r>
-              <a:rPr lang="en-US" dirty="0" smtClean="0"/>
-              <a:t> </a:t>
-            </a:r>
-            <a:r>
-              <a:rPr lang="en-US" dirty="0"/>
-              <a:t>(</a:t>
-            </a:r>
-            <a:r>
-              <a:rPr lang="en-US" dirty="0" err="1" smtClean="0"/>
-              <a:t>JKarder</a:t>
-            </a:r>
-            <a:r>
-              <a:rPr lang="en-US" dirty="0" smtClean="0"/>
-              <a:t>/</a:t>
-            </a:r>
-            <a:r>
-              <a:rPr lang="en-US" dirty="0" err="1" smtClean="0"/>
-              <a:t>MKommend</a:t>
-            </a:r>
-            <a:r>
-              <a:rPr lang="en-US" dirty="0" smtClean="0"/>
-              <a:t>/</a:t>
-            </a:r>
-            <a:r>
-              <a:rPr lang="en-US" dirty="0" err="1" smtClean="0"/>
-              <a:t>PFleck</a:t>
-            </a:r>
-            <a:r>
-              <a:rPr lang="en-US" dirty="0"/>
-              <a:t>)</a:t>
-            </a:r>
-          </a:p>
-        </p:txBody>
-      </p:sp>
-      <p:sp>
-        <p:nvSpPr>
-          <p:cNvPr id="3" name="Content Placeholder 2"/>
-          <p:cNvSpPr>
-            <a:spLocks noGrp="1"/>
-          </p:cNvSpPr>
-          <p:nvPr>
-            <p:ph idx="1"/>
-          </p:nvPr>
-        </p:nvSpPr>
-        <p:spPr/>
-        <p:txBody>
-          <a:bodyPr>
-            <a:normAutofit/>
-          </a:bodyPr>
-          <a:lstStyle/>
-          <a:p>
-            <a:r>
-              <a:rPr lang="en-US" dirty="0" smtClean="0"/>
-              <a:t>Allows consistent termination in all </a:t>
-            </a:r>
-            <a:r>
-              <a:rPr lang="en-US" dirty="0" err="1" smtClean="0"/>
-              <a:t>EngineAlgorithms</a:t>
-            </a:r>
-            <a:endParaRPr lang="en-US" dirty="0" smtClean="0"/>
-          </a:p>
-          <a:p>
-            <a:pPr lvl="1"/>
-            <a:r>
-              <a:rPr lang="en-US" dirty="0" smtClean="0"/>
-              <a:t>Additional concept to better compare algorithm performances</a:t>
-            </a:r>
-          </a:p>
-          <a:p>
-            <a:pPr lvl="1"/>
-            <a:r>
-              <a:rPr lang="en-US" dirty="0" smtClean="0"/>
-              <a:t>e.g. only allow 10</a:t>
-            </a:r>
-            <a:r>
-              <a:rPr lang="en-US" baseline="30000" dirty="0" smtClean="0"/>
-              <a:t>6</a:t>
-            </a:r>
-            <a:r>
-              <a:rPr lang="en-US" dirty="0"/>
-              <a:t> </a:t>
-            </a:r>
-            <a:r>
-              <a:rPr lang="en-US" dirty="0" smtClean="0"/>
-              <a:t>evaluations for each algorithm</a:t>
-            </a:r>
-            <a:endParaRPr lang="en-US" baseline="30000" dirty="0" smtClean="0"/>
-          </a:p>
-          <a:p>
-            <a:r>
-              <a:rPr lang="en-US" dirty="0" err="1" smtClean="0"/>
-              <a:t>TerminationOperator</a:t>
-            </a:r>
-            <a:r>
-              <a:rPr lang="en-US" dirty="0" smtClean="0"/>
-              <a:t> uses </a:t>
-            </a:r>
-            <a:r>
-              <a:rPr lang="en-US" dirty="0" err="1" smtClean="0"/>
-              <a:t>MultiTerminator</a:t>
-            </a:r>
-            <a:r>
-              <a:rPr lang="en-US" dirty="0" smtClean="0"/>
-              <a:t> and cancels the algorithm if any of the active termination criteria is not met</a:t>
-            </a:r>
-            <a:endParaRPr lang="en-US" dirty="0"/>
-          </a:p>
-        </p:txBody>
-      </p:sp>
-      <p:pic>
-        <p:nvPicPr>
-          <p:cNvPr id="11" name="Picture 10"/>
-          <p:cNvPicPr>
-            <a:picLocks noChangeAspect="1"/>
-          </p:cNvPicPr>
-          <p:nvPr/>
-        </p:nvPicPr>
-        <p:blipFill>
-          <a:blip r:embed="rId2"/>
-          <a:stretch>
-            <a:fillRect/>
-          </a:stretch>
-        </p:blipFill>
-        <p:spPr>
-          <a:xfrm>
-            <a:off x="2196291" y="4071017"/>
-            <a:ext cx="8048625" cy="2009775"/>
-          </a:xfrm>
-          <a:prstGeom prst="rect">
-            <a:avLst/>
-          </a:prstGeom>
-          <a:ln>
-            <a:noFill/>
-          </a:ln>
-          <a:effectLst>
-            <a:outerShdw blurRad="190500" algn="tl" rotWithShape="0">
-              <a:srgbClr val="000000">
-                <a:alpha val="70000"/>
-              </a:srgbClr>
-            </a:outerShdw>
-          </a:effectLst>
-        </p:spPr>
-      </p:pic>
-      <p:sp>
-        <p:nvSpPr>
-          <p:cNvPr id="7" name="Rectangle 6"/>
-          <p:cNvSpPr/>
-          <p:nvPr/>
-        </p:nvSpPr>
-        <p:spPr>
-          <a:xfrm>
-            <a:off x="2221230" y="4389127"/>
-            <a:ext cx="1419743" cy="207817"/>
-          </a:xfrm>
-          <a:prstGeom prst="rect">
-            <a:avLst/>
-          </a:prstGeom>
-          <a:noFill/>
-          <a:ln>
-            <a:solidFill>
-              <a:srgbClr val="FF0000"/>
-            </a:solidFill>
-          </a:ln>
-        </p:spPr>
-        <p:style>
-          <a:lnRef idx="2">
-            <a:schemeClr val="accent2"/>
-          </a:lnRef>
-          <a:fillRef idx="1">
-            <a:schemeClr val="lt1"/>
-          </a:fillRef>
-          <a:effectRef idx="0">
-            <a:schemeClr val="accent2"/>
-          </a:effectRef>
-          <a:fontRef idx="minor">
-            <a:schemeClr val="dk1"/>
-          </a:fontRef>
-        </p:style>
-        <p:txBody>
-          <a:bodyPr rtlCol="0" anchor="ctr"/>
-          <a:lstStyle/>
-          <a:p>
-            <a:pPr algn="ctr"/>
-            <a:endParaRPr lang="de-AT"/>
-          </a:p>
-        </p:txBody>
-      </p:sp>
-      <p:sp>
-        <p:nvSpPr>
-          <p:cNvPr id="9" name="Rectangle 8"/>
-          <p:cNvSpPr/>
-          <p:nvPr/>
-        </p:nvSpPr>
-        <p:spPr>
-          <a:xfrm>
-            <a:off x="4867449" y="4374435"/>
-            <a:ext cx="1275656" cy="207817"/>
-          </a:xfrm>
-          <a:prstGeom prst="rect">
-            <a:avLst/>
-          </a:prstGeom>
-          <a:noFill/>
-          <a:ln>
-            <a:solidFill>
-              <a:srgbClr val="FF0000"/>
-            </a:solidFill>
-          </a:ln>
-        </p:spPr>
-        <p:style>
-          <a:lnRef idx="2">
-            <a:schemeClr val="accent2"/>
-          </a:lnRef>
-          <a:fillRef idx="1">
-            <a:schemeClr val="lt1"/>
-          </a:fillRef>
-          <a:effectRef idx="0">
-            <a:schemeClr val="accent2"/>
-          </a:effectRef>
-          <a:fontRef idx="minor">
-            <a:schemeClr val="dk1"/>
-          </a:fontRef>
-        </p:style>
-        <p:txBody>
-          <a:bodyPr rtlCol="0" anchor="ctr"/>
-          <a:lstStyle/>
-          <a:p>
-            <a:pPr algn="ctr"/>
-            <a:endParaRPr lang="de-AT"/>
-          </a:p>
-        </p:txBody>
-      </p:sp>
-    </p:spTree>
-    <p:extLst>
-      <p:ext uri="{BB962C8B-B14F-4D97-AF65-F5344CB8AC3E}">
-        <p14:creationId xmlns:p14="http://schemas.microsoft.com/office/powerpoint/2010/main" val="4092597754"/>
-      </p:ext>
-    </p:extLst>
-  </p:cSld>
-  <p:clrMapOvr>
-    <a:masterClrMapping/>
-  </p:clrMapOvr>
-  <p:timing>
-    <p:tnLst>
-      <p:par>
-        <p:cTn id="1" dur="indefinite" restart="never" nodeType="tmRoot"/>
-      </p:par>
-    </p:tnLst>
-  </p:timing>
-</p:sld>
-</file>
-
-<file path=ppt/slides/slide11.xml><?xml version="1.0" encoding="utf-8"?>
-<p:sld xmlns:a="http://schemas.openxmlformats.org/drawingml/2006/main" xmlns:r="http://schemas.openxmlformats.org/officeDocument/2006/relationships" xmlns:p="http://schemas.openxmlformats.org/presentationml/2006/main">
-  <p:cSld>
-    <p:spTree>
-      <p:nvGrpSpPr>
-        <p:cNvPr id="1" name=""/>
-        <p:cNvGrpSpPr/>
-        <p:nvPr/>
-      </p:nvGrpSpPr>
-      <p:grpSpPr>
-        <a:xfrm>
-          <a:off x="0" y="0"/>
-          <a:ext cx="0" cy="0"/>
-          <a:chOff x="0" y="0"/>
-          <a:chExt cx="0" cy="0"/>
-        </a:xfrm>
-      </p:grpSpPr>
-      <p:sp>
-        <p:nvSpPr>
-          <p:cNvPr id="2" name="Title 1"/>
-          <p:cNvSpPr>
-            <a:spLocks noGrp="1"/>
-          </p:cNvSpPr>
-          <p:nvPr>
-            <p:ph type="title"/>
-          </p:nvPr>
-        </p:nvSpPr>
-        <p:spPr/>
-        <p:txBody>
-          <a:bodyPr/>
-          <a:lstStyle/>
-          <a:p>
-            <a:r>
               <a:rPr lang="en-US" dirty="0" smtClean="0"/>
               <a:t>New Persistence</a:t>
             </a:r>
@@ -3425,11 +3136,7 @@
             <a:pPr lvl="1"/>
             <a:r>
               <a:rPr lang="en-US" dirty="0" smtClean="0"/>
-              <a:t>More </a:t>
-            </a:r>
-            <a:r>
-              <a:rPr lang="en-US" dirty="0" smtClean="0"/>
-              <a:t>flexibility</a:t>
+              <a:t>More flexibility</a:t>
             </a:r>
           </a:p>
           <a:p>
@@ -3438,7 +3145,6 @@
               <a:rPr lang="en-US" dirty="0" smtClean="0"/>
               <a:t>Backwards compatibility</a:t>
             </a:r>
-            <a:endParaRPr lang="en-US" dirty="0" smtClean="0"/>
           </a:p>
           <a:p>
             <a:pPr lvl="2"/>
@@ -3484,15 +3190,7 @@
           <a:p>
             <a:r>
               <a:rPr lang="en-US" dirty="0" smtClean="0"/>
-              <a:t>Storage </a:t>
-            </a:r>
-            <a:r>
-              <a:rPr lang="en-US" dirty="0" smtClean="0"/>
-              <a:t>format, API: </a:t>
-            </a:r>
-            <a:r>
-              <a:rPr lang="en-US" dirty="0" smtClean="0"/>
-              <a:t>In development</a:t>
+              <a:t>Storage format, API: In development</a:t>
             </a:r>
             <a:endParaRPr lang="en-US" dirty="0"/>
           </a:p>
@@ -3518,7 +3216,7 @@
 </p:sld>
 </file>
 
-<file path=ppt/slides/slide12.xml><?xml version="1.0" encoding="utf-8"?>
+<file path=ppt/slides/slide11.xml><?xml version="1.0" encoding="utf-8"?>
 <p:sld xmlns:a="http://schemas.openxmlformats.org/drawingml/2006/main" xmlns:r="http://schemas.openxmlformats.org/officeDocument/2006/relationships" xmlns:p="http://schemas.openxmlformats.org/presentationml/2006/main">
   <p:cSld>
     <p:spTree>
@@ -3638,7 +3336,7 @@
 </p:sld>
 </file>
 
-<file path=ppt/slides/slide13.xml><?xml version="1.0" encoding="utf-8"?>
+<file path=ppt/slides/slide12.xml><?xml version="1.0" encoding="utf-8"?>
 <p:sld xmlns:a="http://schemas.openxmlformats.org/drawingml/2006/main" xmlns:r="http://schemas.openxmlformats.org/officeDocument/2006/relationships" xmlns:p="http://schemas.openxmlformats.org/presentationml/2006/main">
   <p:cSld>
     <p:spTree>
@@ -3760,7 +3458,7 @@
 </p:sld>
 </file>
 
-<file path=ppt/slides/slide14.xml><?xml version="1.0" encoding="utf-8"?>
+<file path=ppt/slides/slide13.xml><?xml version="1.0" encoding="utf-8"?>
 <p:sld xmlns:a="http://schemas.openxmlformats.org/drawingml/2006/main" xmlns:r="http://schemas.openxmlformats.org/officeDocument/2006/relationships" xmlns:p="http://schemas.openxmlformats.org/presentationml/2006/main">
   <p:cSld>
     <p:spTree>
@@ -3882,7 +3580,7 @@
 </p:sld>
 </file>
 
-<file path=ppt/slides/slide15.xml><?xml version="1.0" encoding="utf-8"?>
+<file path=ppt/slides/slide14.xml><?xml version="1.0" encoding="utf-8"?>
 <p:sld xmlns:a="http://schemas.openxmlformats.org/drawingml/2006/main" xmlns:r="http://schemas.openxmlformats.org/officeDocument/2006/relationships" xmlns:p="http://schemas.openxmlformats.org/presentationml/2006/main">
   <p:cSld>
     <p:spTree>
@@ -4004,7 +3702,7 @@
 </p:sld>
 </file>
 
-<file path=ppt/slides/slide16.xml><?xml version="1.0" encoding="utf-8"?>
+<file path=ppt/slides/slide15.xml><?xml version="1.0" encoding="utf-8"?>
 <p:sld xmlns:a="http://schemas.openxmlformats.org/drawingml/2006/main" xmlns:r="http://schemas.openxmlformats.org/officeDocument/2006/relationships" xmlns:p="http://schemas.openxmlformats.org/presentationml/2006/main">
   <p:cSld>
     <p:spTree>
@@ -4126,7 +3824,7 @@
 </p:sld>
 </file>
 
-<file path=ppt/slides/slide17.xml><?xml version="1.0" encoding="utf-8"?>
+<file path=ppt/slides/slide16.xml><?xml version="1.0" encoding="utf-8"?>
 <p:sld xmlns:a="http://schemas.openxmlformats.org/drawingml/2006/main" xmlns:r="http://schemas.openxmlformats.org/officeDocument/2006/relationships" xmlns:p="http://schemas.openxmlformats.org/presentationml/2006/main">
   <p:cSld>
     <p:spTree>
@@ -4272,7 +3970,7 @@
 </p:sld>
 </file>
 
-<file path=ppt/slides/slide18.xml><?xml version="1.0" encoding="utf-8"?>
+<file path=ppt/slides/slide17.xml><?xml version="1.0" encoding="utf-8"?>
 <p:sld xmlns:a="http://schemas.openxmlformats.org/drawingml/2006/main" xmlns:r="http://schemas.openxmlformats.org/officeDocument/2006/relationships" xmlns:p="http://schemas.openxmlformats.org/presentationml/2006/main">
   <p:cSld>
     <p:spTree>
@@ -4500,7 +4198,7 @@
 </p:sld>
 </file>
 
-<file path=ppt/slides/slide19.xml><?xml version="1.0" encoding="utf-8"?>
+<file path=ppt/slides/slide18.xml><?xml version="1.0" encoding="utf-8"?>
 <p:sld xmlns:a="http://schemas.openxmlformats.org/drawingml/2006/main" xmlns:r="http://schemas.openxmlformats.org/officeDocument/2006/relationships" xmlns:p="http://schemas.openxmlformats.org/presentationml/2006/main">
   <p:cSld>
     <p:spTree>
@@ -4690,6 +4388,12 @@
           <a:p>
             <a:r>
               <a:rPr lang="en-US" dirty="0" smtClean="0"/>
+              <a:t>Roadmap</a:t>
+            </a:r>
+          </a:p>
+          <a:p>
+            <a:r>
+              <a:rPr lang="en-US" dirty="0" smtClean="0"/>
               <a:t>Problem </a:t>
             </a:r>
             <a:r>
@@ -4718,21 +4422,13 @@
           <a:p>
             <a:r>
               <a:rPr lang="en-US" dirty="0" smtClean="0"/>
-              <a:t>Code </a:t>
-            </a:r>
+              <a:t>Code Organization</a:t>
+            </a:r>
+          </a:p>
+          <a:p>
             <a:r>
               <a:rPr lang="en-US" dirty="0" smtClean="0"/>
-              <a:t>Organization</a:t>
-            </a:r>
-          </a:p>
-          <a:p>
-            <a:r>
-              <a:rPr lang="en-US" dirty="0" smtClean="0"/>
-              <a:t>Minor </a:t>
-            </a:r>
-            <a:r>
-              <a:rPr lang="en-US" dirty="0" smtClean="0"/>
-              <a:t>Changes</a:t>
+              <a:t>Minor Changes</a:t>
             </a:r>
           </a:p>
           <a:p>
@@ -8383,7 +8079,7 @@
       </p:grpSpPr>
       <p:sp>
         <p:nvSpPr>
-          <p:cNvPr id="7" name="Titel 6"/>
+          <p:cNvPr id="2" name="Title 1"/>
           <p:cNvSpPr>
             <a:spLocks noGrp="1"/>
           </p:cNvSpPr>
@@ -8397,16 +8093,20 @@
           <a:lstStyle/>
           <a:p>
             <a:r>
-              <a:rPr lang="de-DE" dirty="0" smtClean="0"/>
-              <a:t>Open Points</a:t>
-            </a:r>
-            <a:endParaRPr lang="de-DE" dirty="0"/>
-          </a:p>
-        </p:txBody>
-      </p:sp>
-      <p:sp>
-        <p:nvSpPr>
-          <p:cNvPr id="8" name="Inhaltsplatzhalter 7"/>
+              <a:rPr lang="en-US" dirty="0"/>
+              <a:t>Pause for </a:t>
+            </a:r>
+            <a:r>
+              <a:rPr lang="en-US" dirty="0" err="1" smtClean="0"/>
+              <a:t>BasicAlgorithms</a:t>
+            </a:r>
+            <a:endParaRPr lang="en-US" dirty="0"/>
+          </a:p>
+        </p:txBody>
+      </p:sp>
+      <p:sp>
+        <p:nvSpPr>
+          <p:cNvPr id="3" name="Content Placeholder 2"/>
           <p:cNvSpPr>
             <a:spLocks noGrp="1"/>
           </p:cNvSpPr>
@@ -8414,113 +8114,695 @@
             <p:ph idx="1"/>
           </p:nvPr>
         </p:nvSpPr>
-        <p:spPr/>
+        <p:spPr>
+          <a:xfrm>
+            <a:off x="838200" y="1825625"/>
+            <a:ext cx="10515600" cy="2297487"/>
+          </a:xfrm>
+        </p:spPr>
         <p:txBody>
           <a:bodyPr>
-            <a:normAutofit/>
+            <a:normAutofit fontScale="70000" lnSpcReduction="20000"/>
           </a:bodyPr>
           <a:lstStyle/>
           <a:p>
             <a:r>
+              <a:rPr lang="en-US" dirty="0" err="1"/>
+              <a:t>BasicAlgorithms</a:t>
+            </a:r>
+            <a:r>
+              <a:rPr lang="en-US" dirty="0"/>
+              <a:t> allow to easily create new </a:t>
+            </a:r>
+            <a:r>
               <a:rPr lang="en-US" dirty="0" smtClean="0"/>
-              <a:t>Programmable Encodings?</a:t>
+              <a:t>algorithms</a:t>
             </a:r>
           </a:p>
           <a:p>
             <a:pPr lvl="1"/>
             <a:r>
+              <a:rPr lang="en-US" dirty="0"/>
+              <a:t>P3 (Parameter-less Population Pyramid) was implemented within one week</a:t>
+            </a:r>
+          </a:p>
+          <a:p>
+            <a:pPr lvl="1"/>
+            <a:r>
+              <a:rPr lang="en-US" dirty="0"/>
+              <a:t>Override </a:t>
+            </a:r>
+            <a:r>
               <a:rPr lang="en-US" dirty="0" smtClean="0"/>
-              <a:t>If you want to quickly test an idea for a new crossover you have to temporarily add the code to an existing plugin or create a new plugin</a:t>
-            </a:r>
-          </a:p>
-          <a:p>
+              <a:t>Initialize(…) </a:t>
+            </a:r>
+            <a:r>
+              <a:rPr lang="en-US" dirty="0"/>
+              <a:t>to initialize the algorithm</a:t>
+            </a:r>
+          </a:p>
+          <a:p>
+            <a:pPr lvl="1"/>
+            <a:r>
+              <a:rPr lang="en-US" dirty="0"/>
+              <a:t>Implement </a:t>
+            </a:r>
             <a:r>
               <a:rPr lang="en-US" dirty="0" smtClean="0"/>
-              <a:t>Analyzers for </a:t>
+              <a:t>Run(…) so that it supports pause/resume</a:t>
+            </a:r>
+            <a:endParaRPr lang="en-US" dirty="0"/>
+          </a:p>
+          <a:p>
+            <a:r>
+              <a:rPr lang="en-US" dirty="0" smtClean="0"/>
+              <a:t>Up to now, </a:t>
             </a:r>
             <a:r>
               <a:rPr lang="en-US" dirty="0" err="1" smtClean="0"/>
               <a:t>BasicAlgorithms</a:t>
             </a:r>
-            <a:endParaRPr lang="en-US" dirty="0" smtClean="0"/>
+            <a:r>
+              <a:rPr lang="en-US" dirty="0" smtClean="0"/>
+              <a:t> could not be paused</a:t>
+            </a:r>
+          </a:p>
+          <a:p>
+            <a:r>
+              <a:rPr lang="en-US" dirty="0" err="1" smtClean="0"/>
+              <a:t>BasicAlgorithms.Pausable</a:t>
+            </a:r>
+            <a:r>
+              <a:rPr lang="en-US" dirty="0" smtClean="0"/>
+              <a:t> has been added</a:t>
+            </a:r>
           </a:p>
           <a:p>
             <a:pPr lvl="1"/>
             <a:r>
+              <a:rPr lang="en-US" dirty="0" smtClean="0"/>
+              <a:t>If true, cancelling the </a:t>
+            </a:r>
+            <a:r>
               <a:rPr lang="en-US" dirty="0" err="1" smtClean="0"/>
-              <a:t>BasicAlgorithms</a:t>
+              <a:t>CancellationToken</a:t>
             </a:r>
             <a:r>
               <a:rPr lang="en-US" dirty="0" smtClean="0"/>
-              <a:t> do not use Scopes for storing solutions, they cannot currently be studied using existing Analyzers</a:t>
-            </a:r>
-          </a:p>
-          <a:p>
+              <a:t> can pause the algorithm</a:t>
+            </a:r>
+          </a:p>
+          <a:p>
+            <a:pPr lvl="1"/>
             <a:r>
               <a:rPr lang="en-US" dirty="0" smtClean="0"/>
-              <a:t>Multiple Encodings per Solution</a:t>
-            </a:r>
-          </a:p>
-          <a:p>
-            <a:pPr lvl="1"/>
-            <a:r>
-              <a:rPr lang="en-US" dirty="0" smtClean="0"/>
-              <a:t>For instance, Permutation + </a:t>
-            </a:r>
-            <a:r>
-              <a:rPr lang="en-US" dirty="0" err="1" smtClean="0"/>
-              <a:t>EdgeRepresentationEncoding</a:t>
-            </a:r>
-            <a:r>
-              <a:rPr lang="en-US" dirty="0" smtClean="0"/>
-              <a:t>, Permutation + </a:t>
-            </a:r>
-            <a:r>
-              <a:rPr lang="en-US" dirty="0" err="1" smtClean="0"/>
-              <a:t>PositionRepresentationEncoding</a:t>
-            </a:r>
-            <a:r>
-              <a:rPr lang="en-US" dirty="0" smtClean="0"/>
-              <a:t> with selected operators</a:t>
-            </a:r>
-          </a:p>
-          <a:p>
-            <a:pPr lvl="2"/>
-            <a:r>
-              <a:rPr lang="en-US" dirty="0" smtClean="0"/>
-              <a:t>TSP would be implemented with </a:t>
-            </a:r>
-            <a:r>
-              <a:rPr lang="en-US" dirty="0" err="1" smtClean="0"/>
-              <a:t>EdgeRepresentationEncoding</a:t>
-            </a:r>
-            <a:r>
-              <a:rPr lang="en-US" dirty="0" smtClean="0"/>
-              <a:t> (-&gt; no CX, CX2 anymore)</a:t>
-            </a:r>
-          </a:p>
-          <a:p>
-            <a:pPr lvl="2"/>
-            <a:r>
-              <a:rPr lang="en-US" dirty="0" smtClean="0"/>
-              <a:t>QAP would be implemented with </a:t>
-            </a:r>
-            <a:r>
-              <a:rPr lang="en-US" dirty="0" err="1" smtClean="0"/>
-              <a:t>PositionRepresentationEncoding</a:t>
-            </a:r>
-            <a:r>
-              <a:rPr lang="en-US" dirty="0" smtClean="0"/>
-              <a:t> (-&gt; no ERX anymore)</a:t>
-            </a:r>
-            <a:endParaRPr lang="en-US" dirty="0"/>
+              <a:t>Specific algorithm is responsible for supporting pause/resume</a:t>
+            </a:r>
+          </a:p>
+        </p:txBody>
+      </p:sp>
+      <p:sp>
+        <p:nvSpPr>
+          <p:cNvPr id="5" name="Inhaltsplatzhalter 7"/>
+          <p:cNvSpPr txBox="1">
+            <a:spLocks/>
+          </p:cNvSpPr>
+          <p:nvPr/>
+        </p:nvSpPr>
+        <p:spPr>
+          <a:xfrm>
+            <a:off x="2122454" y="4139739"/>
+            <a:ext cx="7947093" cy="2369129"/>
+          </a:xfrm>
+          <a:prstGeom prst="rect">
+            <a:avLst/>
+          </a:prstGeom>
+        </p:spPr>
+        <p:txBody>
+          <a:bodyPr anchor="ctr">
+            <a:noAutofit/>
+          </a:bodyPr>
+          <a:lstStyle>
+            <a:lvl1pPr marL="228600" indent="-228600" algn="l" defTabSz="914400" rtl="0" eaLnBrk="1" latinLnBrk="0" hangingPunct="1">
+              <a:lnSpc>
+                <a:spcPct val="90000"/>
+              </a:lnSpc>
+              <a:spcBef>
+                <a:spcPts val="1000"/>
+              </a:spcBef>
+              <a:buFont typeface="Arial" panose="020B0604020202020204" pitchFamily="34" charset="0"/>
+              <a:buChar char="•"/>
+              <a:defRPr sz="2800" kern="1200">
+                <a:solidFill>
+                  <a:schemeClr val="tx1"/>
+                </a:solidFill>
+                <a:latin typeface="+mn-lt"/>
+                <a:ea typeface="+mn-ea"/>
+                <a:cs typeface="+mn-cs"/>
+              </a:defRPr>
+            </a:lvl1pPr>
+            <a:lvl2pPr marL="685800" indent="-228600" algn="l" defTabSz="914400" rtl="0" eaLnBrk="1" latinLnBrk="0" hangingPunct="1">
+              <a:lnSpc>
+                <a:spcPct val="90000"/>
+              </a:lnSpc>
+              <a:spcBef>
+                <a:spcPts val="500"/>
+              </a:spcBef>
+              <a:buFont typeface="Arial" panose="020B0604020202020204" pitchFamily="34" charset="0"/>
+              <a:buChar char="•"/>
+              <a:defRPr sz="2400" kern="1200">
+                <a:solidFill>
+                  <a:schemeClr val="tx1"/>
+                </a:solidFill>
+                <a:latin typeface="+mn-lt"/>
+                <a:ea typeface="+mn-ea"/>
+                <a:cs typeface="+mn-cs"/>
+              </a:defRPr>
+            </a:lvl2pPr>
+            <a:lvl3pPr marL="1143000" indent="-228600" algn="l" defTabSz="914400" rtl="0" eaLnBrk="1" latinLnBrk="0" hangingPunct="1">
+              <a:lnSpc>
+                <a:spcPct val="90000"/>
+              </a:lnSpc>
+              <a:spcBef>
+                <a:spcPts val="500"/>
+              </a:spcBef>
+              <a:buFont typeface="Arial" panose="020B0604020202020204" pitchFamily="34" charset="0"/>
+              <a:buChar char="•"/>
+              <a:defRPr sz="2000" kern="1200">
+                <a:solidFill>
+                  <a:schemeClr val="tx1"/>
+                </a:solidFill>
+                <a:latin typeface="+mn-lt"/>
+                <a:ea typeface="+mn-ea"/>
+                <a:cs typeface="+mn-cs"/>
+              </a:defRPr>
+            </a:lvl3pPr>
+            <a:lvl4pPr marL="1600200" indent="-228600" algn="l" defTabSz="914400" rtl="0" eaLnBrk="1" latinLnBrk="0" hangingPunct="1">
+              <a:lnSpc>
+                <a:spcPct val="90000"/>
+              </a:lnSpc>
+              <a:spcBef>
+                <a:spcPts val="500"/>
+              </a:spcBef>
+              <a:buFont typeface="Arial" panose="020B0604020202020204" pitchFamily="34" charset="0"/>
+              <a:buChar char="•"/>
+              <a:defRPr sz="1800" kern="1200">
+                <a:solidFill>
+                  <a:schemeClr val="tx1"/>
+                </a:solidFill>
+                <a:latin typeface="+mn-lt"/>
+                <a:ea typeface="+mn-ea"/>
+                <a:cs typeface="+mn-cs"/>
+              </a:defRPr>
+            </a:lvl4pPr>
+            <a:lvl5pPr marL="2057400" indent="-228600" algn="l" defTabSz="914400" rtl="0" eaLnBrk="1" latinLnBrk="0" hangingPunct="1">
+              <a:lnSpc>
+                <a:spcPct val="90000"/>
+              </a:lnSpc>
+              <a:spcBef>
+                <a:spcPts val="500"/>
+              </a:spcBef>
+              <a:buFont typeface="Arial" panose="020B0604020202020204" pitchFamily="34" charset="0"/>
+              <a:buChar char="•"/>
+              <a:defRPr sz="1800" kern="1200">
+                <a:solidFill>
+                  <a:schemeClr val="tx1"/>
+                </a:solidFill>
+                <a:latin typeface="+mn-lt"/>
+                <a:ea typeface="+mn-ea"/>
+                <a:cs typeface="+mn-cs"/>
+              </a:defRPr>
+            </a:lvl5pPr>
+            <a:lvl6pPr marL="2514600" indent="-228600" algn="l" defTabSz="914400" rtl="0" eaLnBrk="1" latinLnBrk="0" hangingPunct="1">
+              <a:lnSpc>
+                <a:spcPct val="90000"/>
+              </a:lnSpc>
+              <a:spcBef>
+                <a:spcPts val="500"/>
+              </a:spcBef>
+              <a:buFont typeface="Arial" panose="020B0604020202020204" pitchFamily="34" charset="0"/>
+              <a:buChar char="•"/>
+              <a:defRPr sz="1800" kern="1200">
+                <a:solidFill>
+                  <a:schemeClr val="tx1"/>
+                </a:solidFill>
+                <a:latin typeface="+mn-lt"/>
+                <a:ea typeface="+mn-ea"/>
+                <a:cs typeface="+mn-cs"/>
+              </a:defRPr>
+            </a:lvl6pPr>
+            <a:lvl7pPr marL="2971800" indent="-228600" algn="l" defTabSz="914400" rtl="0" eaLnBrk="1" latinLnBrk="0" hangingPunct="1">
+              <a:lnSpc>
+                <a:spcPct val="90000"/>
+              </a:lnSpc>
+              <a:spcBef>
+                <a:spcPts val="500"/>
+              </a:spcBef>
+              <a:buFont typeface="Arial" panose="020B0604020202020204" pitchFamily="34" charset="0"/>
+              <a:buChar char="•"/>
+              <a:defRPr sz="1800" kern="1200">
+                <a:solidFill>
+                  <a:schemeClr val="tx1"/>
+                </a:solidFill>
+                <a:latin typeface="+mn-lt"/>
+                <a:ea typeface="+mn-ea"/>
+                <a:cs typeface="+mn-cs"/>
+              </a:defRPr>
+            </a:lvl7pPr>
+            <a:lvl8pPr marL="3429000" indent="-228600" algn="l" defTabSz="914400" rtl="0" eaLnBrk="1" latinLnBrk="0" hangingPunct="1">
+              <a:lnSpc>
+                <a:spcPct val="90000"/>
+              </a:lnSpc>
+              <a:spcBef>
+                <a:spcPts val="500"/>
+              </a:spcBef>
+              <a:buFont typeface="Arial" panose="020B0604020202020204" pitchFamily="34" charset="0"/>
+              <a:buChar char="•"/>
+              <a:defRPr sz="1800" kern="1200">
+                <a:solidFill>
+                  <a:schemeClr val="tx1"/>
+                </a:solidFill>
+                <a:latin typeface="+mn-lt"/>
+                <a:ea typeface="+mn-ea"/>
+                <a:cs typeface="+mn-cs"/>
+              </a:defRPr>
+            </a:lvl8pPr>
+            <a:lvl9pPr marL="3886200" indent="-228600" algn="l" defTabSz="914400" rtl="0" eaLnBrk="1" latinLnBrk="0" hangingPunct="1">
+              <a:lnSpc>
+                <a:spcPct val="90000"/>
+              </a:lnSpc>
+              <a:spcBef>
+                <a:spcPts val="500"/>
+              </a:spcBef>
+              <a:buFont typeface="Arial" panose="020B0604020202020204" pitchFamily="34" charset="0"/>
+              <a:buChar char="•"/>
+              <a:defRPr sz="1800" kern="1200">
+                <a:solidFill>
+                  <a:schemeClr val="tx1"/>
+                </a:solidFill>
+                <a:latin typeface="+mn-lt"/>
+                <a:ea typeface="+mn-ea"/>
+                <a:cs typeface="+mn-cs"/>
+              </a:defRPr>
+            </a:lvl9pPr>
+          </a:lstStyle>
+          <a:p>
+            <a:pPr marL="0" indent="0">
+              <a:lnSpc>
+                <a:spcPct val="100000"/>
+              </a:lnSpc>
+              <a:buNone/>
+            </a:pPr>
+            <a:r>
+              <a:rPr lang="de-AT" sz="1000" dirty="0">
+                <a:solidFill>
+                  <a:srgbClr val="0000FF"/>
+                </a:solidFill>
+              </a:rPr>
+              <a:t>protected</a:t>
+            </a:r>
+            <a:r>
+              <a:rPr lang="de-AT" sz="1000" dirty="0"/>
+              <a:t> </a:t>
+            </a:r>
+            <a:r>
+              <a:rPr lang="de-AT" sz="1000" dirty="0">
+                <a:solidFill>
+                  <a:srgbClr val="A52A2A"/>
+                </a:solidFill>
+              </a:rPr>
+              <a:t>override</a:t>
+            </a:r>
+            <a:r>
+              <a:rPr lang="de-AT" sz="1000" dirty="0"/>
+              <a:t> </a:t>
+            </a:r>
+            <a:r>
+              <a:rPr lang="de-AT" sz="1000" dirty="0">
+                <a:solidFill>
+                  <a:srgbClr val="FF0000"/>
+                </a:solidFill>
+              </a:rPr>
+              <a:t>void</a:t>
+            </a:r>
+            <a:r>
+              <a:rPr lang="de-AT" sz="1000" dirty="0"/>
+              <a:t> </a:t>
+            </a:r>
+            <a:r>
+              <a:rPr lang="de-AT" sz="1000" dirty="0">
+                <a:solidFill>
+                  <a:srgbClr val="191970"/>
+                </a:solidFill>
+              </a:rPr>
+              <a:t>Initialize</a:t>
+            </a:r>
+            <a:r>
+              <a:rPr lang="de-AT" sz="1000" dirty="0"/>
+              <a:t>(CancellationToken cancellationToken) {</a:t>
+            </a:r>
+            <a:br>
+              <a:rPr lang="de-AT" sz="1000" dirty="0"/>
+            </a:br>
+            <a:r>
+              <a:rPr lang="de-AT" sz="1000" dirty="0"/>
+              <a:t>  Results.</a:t>
+            </a:r>
+            <a:r>
+              <a:rPr lang="de-AT" sz="1000" dirty="0">
+                <a:solidFill>
+                  <a:srgbClr val="191970"/>
+                </a:solidFill>
+              </a:rPr>
+              <a:t>Add</a:t>
+            </a:r>
+            <a:r>
+              <a:rPr lang="de-AT" sz="1000" dirty="0"/>
+              <a:t>(</a:t>
+            </a:r>
+            <a:r>
+              <a:rPr lang="de-AT" sz="1000" dirty="0">
+                <a:solidFill>
+                  <a:srgbClr val="008B8B"/>
+                </a:solidFill>
+              </a:rPr>
+              <a:t>new</a:t>
+            </a:r>
+            <a:r>
+              <a:rPr lang="de-AT" sz="1000" dirty="0"/>
+              <a:t> </a:t>
+            </a:r>
+            <a:r>
+              <a:rPr lang="de-AT" sz="1000" dirty="0">
+                <a:solidFill>
+                  <a:srgbClr val="191970"/>
+                </a:solidFill>
+              </a:rPr>
+              <a:t>Result</a:t>
+            </a:r>
+            <a:r>
+              <a:rPr lang="de-AT" sz="1000" dirty="0"/>
+              <a:t>(BestQualityResultName, </a:t>
+            </a:r>
+            <a:r>
+              <a:rPr lang="de-AT" sz="1000" dirty="0">
+                <a:solidFill>
+                  <a:srgbClr val="008B8B"/>
+                </a:solidFill>
+              </a:rPr>
+              <a:t>new</a:t>
+            </a:r>
+            <a:r>
+              <a:rPr lang="de-AT" sz="1000" dirty="0"/>
+              <a:t> </a:t>
+            </a:r>
+            <a:r>
+              <a:rPr lang="de-AT" sz="1000" dirty="0">
+                <a:solidFill>
+                  <a:srgbClr val="191970"/>
+                </a:solidFill>
+              </a:rPr>
+              <a:t>DoubleValue</a:t>
+            </a:r>
+            <a:r>
+              <a:rPr lang="de-AT" sz="1000" dirty="0"/>
+              <a:t>(</a:t>
+            </a:r>
+            <a:r>
+              <a:rPr lang="de-AT" sz="1000" dirty="0">
+                <a:solidFill>
+                  <a:srgbClr val="FF0000"/>
+                </a:solidFill>
+              </a:rPr>
+              <a:t>double</a:t>
+            </a:r>
+            <a:r>
+              <a:rPr lang="de-AT" sz="1000" dirty="0"/>
+              <a:t>.NaN)));</a:t>
+            </a:r>
+            <a:br>
+              <a:rPr lang="de-AT" sz="1000" dirty="0"/>
+            </a:br>
+            <a:r>
+              <a:rPr lang="de-AT" sz="1000" dirty="0"/>
+              <a:t>  Results.</a:t>
+            </a:r>
+            <a:r>
+              <a:rPr lang="de-AT" sz="1000" dirty="0">
+                <a:solidFill>
+                  <a:srgbClr val="191970"/>
+                </a:solidFill>
+              </a:rPr>
+              <a:t>Add</a:t>
+            </a:r>
+            <a:r>
+              <a:rPr lang="de-AT" sz="1000" dirty="0"/>
+              <a:t>(</a:t>
+            </a:r>
+            <a:r>
+              <a:rPr lang="de-AT" sz="1000" dirty="0">
+                <a:solidFill>
+                  <a:srgbClr val="008B8B"/>
+                </a:solidFill>
+              </a:rPr>
+              <a:t>new</a:t>
+            </a:r>
+            <a:r>
+              <a:rPr lang="de-AT" sz="1000" dirty="0"/>
+              <a:t> </a:t>
+            </a:r>
+            <a:r>
+              <a:rPr lang="de-AT" sz="1000" dirty="0">
+                <a:solidFill>
+                  <a:srgbClr val="191970"/>
+                </a:solidFill>
+              </a:rPr>
+              <a:t>Result</a:t>
+            </a:r>
+            <a:r>
+              <a:rPr lang="de-AT" sz="1000" dirty="0"/>
+              <a:t>(IterationsResultName, </a:t>
+            </a:r>
+            <a:r>
+              <a:rPr lang="de-AT" sz="1000" dirty="0">
+                <a:solidFill>
+                  <a:srgbClr val="008B8B"/>
+                </a:solidFill>
+              </a:rPr>
+              <a:t>new</a:t>
+            </a:r>
+            <a:r>
+              <a:rPr lang="de-AT" sz="1000" dirty="0"/>
+              <a:t> </a:t>
+            </a:r>
+            <a:r>
+              <a:rPr lang="de-AT" sz="1000" dirty="0">
+                <a:solidFill>
+                  <a:srgbClr val="191970"/>
+                </a:solidFill>
+              </a:rPr>
+              <a:t>IntValue</a:t>
+            </a:r>
+            <a:r>
+              <a:rPr lang="de-AT" sz="1000" dirty="0"/>
+              <a:t>(</a:t>
+            </a:r>
+            <a:r>
+              <a:rPr lang="de-AT" sz="1000" dirty="0">
+                <a:solidFill>
+                  <a:srgbClr val="00008B"/>
+                </a:solidFill>
+              </a:rPr>
+              <a:t>0</a:t>
+            </a:r>
+            <a:r>
+              <a:rPr lang="de-AT" sz="1000" dirty="0"/>
+              <a:t>)));</a:t>
+            </a:r>
+            <a:br>
+              <a:rPr lang="de-AT" sz="1000" dirty="0"/>
+            </a:br>
+            <a:r>
+              <a:rPr lang="de-AT" sz="1000" dirty="0"/>
+              <a:t>  base.</a:t>
+            </a:r>
+            <a:r>
+              <a:rPr lang="de-AT" sz="1000" dirty="0">
+                <a:solidFill>
+                  <a:srgbClr val="191970"/>
+                </a:solidFill>
+              </a:rPr>
+              <a:t>Initialize</a:t>
+            </a:r>
+            <a:r>
+              <a:rPr lang="de-AT" sz="1000" dirty="0"/>
+              <a:t>(cancellationToken);</a:t>
+            </a:r>
+            <a:br>
+              <a:rPr lang="de-AT" sz="1000" dirty="0"/>
+            </a:br>
+            <a:r>
+              <a:rPr lang="de-AT" sz="1000" dirty="0"/>
+              <a:t>}</a:t>
+            </a:r>
+            <a:br>
+              <a:rPr lang="de-AT" sz="1000" dirty="0"/>
+            </a:br>
+            <a:r>
+              <a:rPr lang="de-AT" sz="1000" dirty="0"/>
+              <a:t/>
+            </a:r>
+            <a:br>
+              <a:rPr lang="de-AT" sz="1000" dirty="0"/>
+            </a:br>
+            <a:r>
+              <a:rPr lang="de-AT" sz="1000" dirty="0">
+                <a:solidFill>
+                  <a:srgbClr val="0000FF"/>
+                </a:solidFill>
+              </a:rPr>
+              <a:t>protected</a:t>
+            </a:r>
+            <a:r>
+              <a:rPr lang="de-AT" sz="1000" dirty="0"/>
+              <a:t> </a:t>
+            </a:r>
+            <a:r>
+              <a:rPr lang="de-AT" sz="1000" dirty="0">
+                <a:solidFill>
+                  <a:srgbClr val="A52A2A"/>
+                </a:solidFill>
+              </a:rPr>
+              <a:t>override</a:t>
+            </a:r>
+            <a:r>
+              <a:rPr lang="de-AT" sz="1000" dirty="0"/>
+              <a:t> </a:t>
+            </a:r>
+            <a:r>
+              <a:rPr lang="de-AT" sz="1000" dirty="0">
+                <a:solidFill>
+                  <a:srgbClr val="FF0000"/>
+                </a:solidFill>
+              </a:rPr>
+              <a:t>void</a:t>
+            </a:r>
+            <a:r>
+              <a:rPr lang="de-AT" sz="1000" dirty="0"/>
+              <a:t> </a:t>
+            </a:r>
+            <a:r>
+              <a:rPr lang="de-AT" sz="1000" dirty="0">
+                <a:solidFill>
+                  <a:srgbClr val="191970"/>
+                </a:solidFill>
+              </a:rPr>
+              <a:t>Run</a:t>
+            </a:r>
+            <a:r>
+              <a:rPr lang="de-AT" sz="1000" dirty="0"/>
+              <a:t>(CancellationToken cancellationToken) {</a:t>
+            </a:r>
+            <a:br>
+              <a:rPr lang="de-AT" sz="1000" dirty="0"/>
+            </a:br>
+            <a:r>
+              <a:rPr lang="de-AT" sz="1000" dirty="0"/>
+              <a:t>  </a:t>
+            </a:r>
+            <a:r>
+              <a:rPr lang="de-AT" sz="1000" dirty="0">
+                <a:solidFill>
+                  <a:srgbClr val="0000FF"/>
+                </a:solidFill>
+              </a:rPr>
+              <a:t>while</a:t>
+            </a:r>
+            <a:r>
+              <a:rPr lang="de-AT" sz="1000" dirty="0"/>
+              <a:t> (ResultsIterations &lt; Iterations) {</a:t>
+            </a:r>
+            <a:br>
+              <a:rPr lang="de-AT" sz="1000" dirty="0"/>
+            </a:br>
+            <a:r>
+              <a:rPr lang="de-AT" sz="1000" dirty="0"/>
+              <a:t>    cancellationToken.</a:t>
+            </a:r>
+            <a:r>
+              <a:rPr lang="de-AT" sz="1000" dirty="0">
+                <a:solidFill>
+                  <a:srgbClr val="191970"/>
+                </a:solidFill>
+              </a:rPr>
+              <a:t>ThrowIfCancellationRequested</a:t>
+            </a:r>
+            <a:r>
+              <a:rPr lang="de-AT" sz="1000" dirty="0"/>
+              <a:t>();</a:t>
+            </a:r>
+            <a:br>
+              <a:rPr lang="de-AT" sz="1000" dirty="0"/>
+            </a:br>
+            <a:r>
+              <a:rPr lang="de-AT" sz="1000" dirty="0"/>
+              <a:t/>
+            </a:r>
+            <a:br>
+              <a:rPr lang="de-AT" sz="1000" dirty="0"/>
+            </a:br>
+            <a:r>
+              <a:rPr lang="de-AT" sz="1000" dirty="0"/>
+              <a:t>    </a:t>
+            </a:r>
+            <a:r>
+              <a:rPr lang="de-AT" sz="1000" dirty="0">
+                <a:solidFill>
+                  <a:srgbClr val="008000"/>
+                </a:solidFill>
+              </a:rPr>
+              <a:t>// execute one iteration</a:t>
+            </a:r>
+            <a:r>
+              <a:rPr lang="de-AT" sz="1000" dirty="0"/>
+              <a:t/>
+            </a:r>
+            <a:br>
+              <a:rPr lang="de-AT" sz="1000" dirty="0"/>
+            </a:br>
+            <a:r>
+              <a:rPr lang="de-AT" sz="1000" dirty="0"/>
+              <a:t/>
+            </a:r>
+            <a:br>
+              <a:rPr lang="de-AT" sz="1000" dirty="0"/>
+            </a:br>
+            <a:r>
+              <a:rPr lang="de-AT" sz="1000" dirty="0"/>
+              <a:t>    ResultsIterations++;</a:t>
+            </a:r>
+            <a:br>
+              <a:rPr lang="de-AT" sz="1000" dirty="0"/>
+            </a:br>
+            <a:r>
+              <a:rPr lang="de-AT" sz="1000" dirty="0"/>
+              <a:t>  }</a:t>
+            </a:r>
+            <a:br>
+              <a:rPr lang="de-AT" sz="1000" dirty="0"/>
+            </a:br>
+            <a:r>
+              <a:rPr lang="de-AT" sz="1000" dirty="0"/>
+              <a:t>}</a:t>
+            </a:r>
+            <a:endParaRPr lang="de-DE" sz="1000" dirty="0"/>
           </a:p>
         </p:txBody>
       </p:sp>
     </p:spTree>
     <p:extLst>
       <p:ext uri="{BB962C8B-B14F-4D97-AF65-F5344CB8AC3E}">
-        <p14:creationId xmlns:p14="http://schemas.microsoft.com/office/powerpoint/2010/main" val="3399092715"/>
+        <p14:creationId xmlns:p14="http://schemas.microsoft.com/office/powerpoint/2010/main" val="2419751290"/>
       </p:ext>
     </p:extLst>
   </p:cSld>
@@ -8570,12 +8852,16 @@
           <a:lstStyle/>
           <a:p>
             <a:r>
-              <a:rPr lang="en-US" dirty="0"/>
-              <a:t>Pause for </a:t>
-            </a:r>
-            <a:r>
-              <a:rPr lang="en-US" dirty="0" err="1" smtClean="0"/>
-              <a:t>BasicAlgorithms</a:t>
+              <a:rPr lang="de-DE" dirty="0" smtClean="0"/>
+              <a:t>Async </a:t>
+            </a:r>
+            <a:r>
+              <a:rPr lang="de-DE" dirty="0"/>
+              <a:t>Start/Stop f</a:t>
+            </a:r>
+            <a:r>
+              <a:rPr lang="de-DE" dirty="0" smtClean="0"/>
+              <a:t>or Algorithms</a:t>
             </a:r>
             <a:endParaRPr lang="en-US" dirty="0"/>
           </a:p>
@@ -8590,133 +8876,79 @@
           <p:nvPr>
             <p:ph idx="1"/>
           </p:nvPr>
+        </p:nvSpPr>
+        <p:spPr/>
+        <p:txBody>
+          <a:bodyPr>
+            <a:normAutofit/>
+          </a:bodyPr>
+          <a:lstStyle/>
+          <a:p>
+            <a:r>
+              <a:rPr lang="de-DE" dirty="0" smtClean="0"/>
+              <a:t>We </a:t>
+            </a:r>
+            <a:r>
+              <a:rPr lang="de-DE" dirty="0"/>
+              <a:t>should better reflect the style of async/wait programming in C#</a:t>
+            </a:r>
+          </a:p>
+          <a:p>
+            <a:pPr lvl="1"/>
+            <a:r>
+              <a:rPr lang="de-DE" dirty="0"/>
+              <a:t>IExecutable.Start is actually an asynchronous operation and should be named StartAsync</a:t>
+            </a:r>
+          </a:p>
+          <a:p>
+            <a:r>
+              <a:rPr lang="de-DE" dirty="0"/>
+              <a:t>Sample tests (and e.g. scripts) must use helper functions to wait for algorithm results</a:t>
+            </a:r>
+          </a:p>
+          <a:p>
+            <a:pPr lvl="1"/>
+            <a:r>
+              <a:rPr lang="de-DE" dirty="0"/>
+              <a:t>We could just call Start synchronously</a:t>
+            </a:r>
+          </a:p>
+          <a:p>
+            <a:r>
+              <a:rPr lang="de-DE" dirty="0"/>
+              <a:t>We </a:t>
+            </a:r>
+            <a:r>
+              <a:rPr lang="de-DE" dirty="0" smtClean="0"/>
+              <a:t>added/implemented </a:t>
+            </a:r>
+            <a:r>
+              <a:rPr lang="de-DE" dirty="0"/>
+              <a:t>IExecutable.Start and IExecutable.StartAsync</a:t>
+            </a:r>
+            <a:endParaRPr lang="en-US" dirty="0"/>
+          </a:p>
+        </p:txBody>
+      </p:sp>
+      <p:sp>
+        <p:nvSpPr>
+          <p:cNvPr id="4" name="Inhaltsplatzhalter 7"/>
+          <p:cNvSpPr txBox="1">
+            <a:spLocks/>
+          </p:cNvSpPr>
+          <p:nvPr/>
         </p:nvSpPr>
         <p:spPr>
           <a:xfrm>
-            <a:off x="838200" y="1825625"/>
-            <a:ext cx="10515600" cy="2297487"/>
-          </a:xfrm>
-        </p:spPr>
-        <p:txBody>
-          <a:bodyPr>
-            <a:normAutofit fontScale="70000" lnSpcReduction="20000"/>
-          </a:bodyPr>
-          <a:lstStyle/>
-          <a:p>
-            <a:r>
-              <a:rPr lang="en-US" dirty="0" err="1"/>
-              <a:t>BasicAlgorithms</a:t>
-            </a:r>
-            <a:r>
-              <a:rPr lang="en-US" dirty="0"/>
-              <a:t> allow to easily create new </a:t>
-            </a:r>
-            <a:r>
-              <a:rPr lang="en-US" dirty="0" smtClean="0"/>
-              <a:t>algorithms</a:t>
-            </a:r>
-          </a:p>
-          <a:p>
-            <a:pPr lvl="1"/>
-            <a:r>
-              <a:rPr lang="en-US" dirty="0"/>
-              <a:t>P3 (Parameter-less Population Pyramid) was implemented within one week</a:t>
-            </a:r>
-          </a:p>
-          <a:p>
-            <a:pPr lvl="1"/>
-            <a:r>
-              <a:rPr lang="en-US" dirty="0"/>
-              <a:t>Override </a:t>
-            </a:r>
-            <a:r>
-              <a:rPr lang="en-US" dirty="0" smtClean="0"/>
-              <a:t>Initialize(…) </a:t>
-            </a:r>
-            <a:r>
-              <a:rPr lang="en-US" dirty="0"/>
-              <a:t>to initialize the algorithm</a:t>
-            </a:r>
-          </a:p>
-          <a:p>
-            <a:pPr lvl="1"/>
-            <a:r>
-              <a:rPr lang="en-US" dirty="0"/>
-              <a:t>Implement </a:t>
-            </a:r>
-            <a:r>
-              <a:rPr lang="en-US" dirty="0" smtClean="0"/>
-              <a:t>Run(…) so that it supports pause/resume</a:t>
-            </a:r>
-            <a:endParaRPr lang="en-US" dirty="0"/>
-          </a:p>
-          <a:p>
-            <a:r>
-              <a:rPr lang="en-US" dirty="0" smtClean="0"/>
-              <a:t>Up to now, </a:t>
-            </a:r>
-            <a:r>
-              <a:rPr lang="en-US" dirty="0" err="1" smtClean="0"/>
-              <a:t>BasicAlgorithms</a:t>
-            </a:r>
-            <a:r>
-              <a:rPr lang="en-US" dirty="0" smtClean="0"/>
-              <a:t> could not be paused</a:t>
-            </a:r>
-          </a:p>
-          <a:p>
-            <a:r>
-              <a:rPr lang="en-US" dirty="0" err="1" smtClean="0"/>
-              <a:t>BasicAlgorithms.Pausable</a:t>
-            </a:r>
-            <a:r>
-              <a:rPr lang="en-US" dirty="0" smtClean="0"/>
-              <a:t> has been added</a:t>
-            </a:r>
-          </a:p>
-          <a:p>
-            <a:pPr lvl="1"/>
-            <a:r>
-              <a:rPr lang="en-US" dirty="0" smtClean="0"/>
-              <a:t>If true, cancelling the </a:t>
-            </a:r>
-            <a:r>
-              <a:rPr lang="en-US" dirty="0" err="1" smtClean="0"/>
-              <a:t>CancellationToken</a:t>
-            </a:r>
-            <a:r>
-              <a:rPr lang="en-US" dirty="0" smtClean="0"/>
-              <a:t> can pause the algorithm</a:t>
-            </a:r>
-          </a:p>
-          <a:p>
-            <a:pPr lvl="1"/>
-            <a:r>
-              <a:rPr lang="en-US" dirty="0" smtClean="0"/>
-              <a:t>Specific algorithm is responsible for supporting pause/resume</a:t>
-            </a:r>
-          </a:p>
-        </p:txBody>
-      </p:sp>
-      <p:sp>
-        <p:nvSpPr>
-          <p:cNvPr id="5" name="Inhaltsplatzhalter 7"/>
-          <p:cNvSpPr txBox="1">
-            <a:spLocks/>
-          </p:cNvSpPr>
-          <p:nvPr/>
-        </p:nvSpPr>
-        <p:spPr>
-          <a:xfrm>
-            <a:off x="2122454" y="4139739"/>
-            <a:ext cx="7947093" cy="2369129"/>
+            <a:off x="1831571" y="4563687"/>
+            <a:ext cx="4535978" cy="1396538"/>
           </a:xfrm>
           <a:prstGeom prst="rect">
             <a:avLst/>
           </a:prstGeom>
         </p:spPr>
         <p:txBody>
-          <a:bodyPr anchor="ctr">
+          <a:bodyPr>
             <a:noAutofit/>
           </a:bodyPr>
           <a:lstStyle>
@@ -8888,398 +9120,372 @@
               <a:lnSpc>
                 <a:spcPct val="100000"/>
               </a:lnSpc>
+              <a:buFont typeface="Arial" panose="020B0604020202020204" pitchFamily="34" charset="0"/>
               <a:buNone/>
             </a:pPr>
-            <a:r>
-              <a:rPr lang="de-AT" sz="1000" dirty="0">
-                <a:solidFill>
-                  <a:srgbClr val="0000FF"/>
-                </a:solidFill>
-              </a:rPr>
-              <a:t>protected</a:t>
-            </a:r>
-            <a:r>
-              <a:rPr lang="de-AT" sz="1000" dirty="0"/>
-              <a:t> </a:t>
-            </a:r>
-            <a:r>
-              <a:rPr lang="de-AT" sz="1000" dirty="0">
-                <a:solidFill>
-                  <a:srgbClr val="A52A2A"/>
-                </a:solidFill>
-              </a:rPr>
-              <a:t>override</a:t>
-            </a:r>
-            <a:r>
-              <a:rPr lang="de-AT" sz="1000" dirty="0"/>
-              <a:t> </a:t>
-            </a:r>
-            <a:r>
-              <a:rPr lang="de-AT" sz="1000" dirty="0">
-                <a:solidFill>
-                  <a:srgbClr val="FF0000"/>
-                </a:solidFill>
-              </a:rPr>
-              <a:t>void</a:t>
-            </a:r>
-            <a:r>
-              <a:rPr lang="de-AT" sz="1000" dirty="0"/>
-              <a:t> </a:t>
-            </a:r>
-            <a:r>
-              <a:rPr lang="de-AT" sz="1000" dirty="0">
+            <a:endParaRPr lang="de-DE" sz="1200" dirty="0" smtClean="0"/>
+          </a:p>
+        </p:txBody>
+      </p:sp>
+      <p:sp>
+        <p:nvSpPr>
+          <p:cNvPr id="6" name="Inhaltsplatzhalter 7"/>
+          <p:cNvSpPr txBox="1">
+            <a:spLocks/>
+          </p:cNvSpPr>
+          <p:nvPr/>
+        </p:nvSpPr>
+        <p:spPr>
+          <a:xfrm>
+            <a:off x="3944358" y="4912822"/>
+            <a:ext cx="4303285" cy="1047403"/>
+          </a:xfrm>
+          <a:prstGeom prst="rect">
+            <a:avLst/>
+          </a:prstGeom>
+        </p:spPr>
+        <p:txBody>
+          <a:bodyPr anchor="ctr">
+            <a:noAutofit/>
+          </a:bodyPr>
+          <a:lstStyle>
+            <a:lvl1pPr marL="228600" indent="-228600" algn="l" defTabSz="914400" rtl="0" eaLnBrk="1" latinLnBrk="0" hangingPunct="1">
+              <a:lnSpc>
+                <a:spcPct val="90000"/>
+              </a:lnSpc>
+              <a:spcBef>
+                <a:spcPts val="1000"/>
+              </a:spcBef>
+              <a:buFont typeface="Arial" panose="020B0604020202020204" pitchFamily="34" charset="0"/>
+              <a:buChar char="•"/>
+              <a:defRPr sz="2800" kern="1200">
+                <a:solidFill>
+                  <a:schemeClr val="tx1"/>
+                </a:solidFill>
+                <a:latin typeface="+mn-lt"/>
+                <a:ea typeface="+mn-ea"/>
+                <a:cs typeface="+mn-cs"/>
+              </a:defRPr>
+            </a:lvl1pPr>
+            <a:lvl2pPr marL="685800" indent="-228600" algn="l" defTabSz="914400" rtl="0" eaLnBrk="1" latinLnBrk="0" hangingPunct="1">
+              <a:lnSpc>
+                <a:spcPct val="90000"/>
+              </a:lnSpc>
+              <a:spcBef>
+                <a:spcPts val="500"/>
+              </a:spcBef>
+              <a:buFont typeface="Arial" panose="020B0604020202020204" pitchFamily="34" charset="0"/>
+              <a:buChar char="•"/>
+              <a:defRPr sz="2400" kern="1200">
+                <a:solidFill>
+                  <a:schemeClr val="tx1"/>
+                </a:solidFill>
+                <a:latin typeface="+mn-lt"/>
+                <a:ea typeface="+mn-ea"/>
+                <a:cs typeface="+mn-cs"/>
+              </a:defRPr>
+            </a:lvl2pPr>
+            <a:lvl3pPr marL="1143000" indent="-228600" algn="l" defTabSz="914400" rtl="0" eaLnBrk="1" latinLnBrk="0" hangingPunct="1">
+              <a:lnSpc>
+                <a:spcPct val="90000"/>
+              </a:lnSpc>
+              <a:spcBef>
+                <a:spcPts val="500"/>
+              </a:spcBef>
+              <a:buFont typeface="Arial" panose="020B0604020202020204" pitchFamily="34" charset="0"/>
+              <a:buChar char="•"/>
+              <a:defRPr sz="2000" kern="1200">
+                <a:solidFill>
+                  <a:schemeClr val="tx1"/>
+                </a:solidFill>
+                <a:latin typeface="+mn-lt"/>
+                <a:ea typeface="+mn-ea"/>
+                <a:cs typeface="+mn-cs"/>
+              </a:defRPr>
+            </a:lvl3pPr>
+            <a:lvl4pPr marL="1600200" indent="-228600" algn="l" defTabSz="914400" rtl="0" eaLnBrk="1" latinLnBrk="0" hangingPunct="1">
+              <a:lnSpc>
+                <a:spcPct val="90000"/>
+              </a:lnSpc>
+              <a:spcBef>
+                <a:spcPts val="500"/>
+              </a:spcBef>
+              <a:buFont typeface="Arial" panose="020B0604020202020204" pitchFamily="34" charset="0"/>
+              <a:buChar char="•"/>
+              <a:defRPr sz="1800" kern="1200">
+                <a:solidFill>
+                  <a:schemeClr val="tx1"/>
+                </a:solidFill>
+                <a:latin typeface="+mn-lt"/>
+                <a:ea typeface="+mn-ea"/>
+                <a:cs typeface="+mn-cs"/>
+              </a:defRPr>
+            </a:lvl4pPr>
+            <a:lvl5pPr marL="2057400" indent="-228600" algn="l" defTabSz="914400" rtl="0" eaLnBrk="1" latinLnBrk="0" hangingPunct="1">
+              <a:lnSpc>
+                <a:spcPct val="90000"/>
+              </a:lnSpc>
+              <a:spcBef>
+                <a:spcPts val="500"/>
+              </a:spcBef>
+              <a:buFont typeface="Arial" panose="020B0604020202020204" pitchFamily="34" charset="0"/>
+              <a:buChar char="•"/>
+              <a:defRPr sz="1800" kern="1200">
+                <a:solidFill>
+                  <a:schemeClr val="tx1"/>
+                </a:solidFill>
+                <a:latin typeface="+mn-lt"/>
+                <a:ea typeface="+mn-ea"/>
+                <a:cs typeface="+mn-cs"/>
+              </a:defRPr>
+            </a:lvl5pPr>
+            <a:lvl6pPr marL="2514600" indent="-228600" algn="l" defTabSz="914400" rtl="0" eaLnBrk="1" latinLnBrk="0" hangingPunct="1">
+              <a:lnSpc>
+                <a:spcPct val="90000"/>
+              </a:lnSpc>
+              <a:spcBef>
+                <a:spcPts val="500"/>
+              </a:spcBef>
+              <a:buFont typeface="Arial" panose="020B0604020202020204" pitchFamily="34" charset="0"/>
+              <a:buChar char="•"/>
+              <a:defRPr sz="1800" kern="1200">
+                <a:solidFill>
+                  <a:schemeClr val="tx1"/>
+                </a:solidFill>
+                <a:latin typeface="+mn-lt"/>
+                <a:ea typeface="+mn-ea"/>
+                <a:cs typeface="+mn-cs"/>
+              </a:defRPr>
+            </a:lvl6pPr>
+            <a:lvl7pPr marL="2971800" indent="-228600" algn="l" defTabSz="914400" rtl="0" eaLnBrk="1" latinLnBrk="0" hangingPunct="1">
+              <a:lnSpc>
+                <a:spcPct val="90000"/>
+              </a:lnSpc>
+              <a:spcBef>
+                <a:spcPts val="500"/>
+              </a:spcBef>
+              <a:buFont typeface="Arial" panose="020B0604020202020204" pitchFamily="34" charset="0"/>
+              <a:buChar char="•"/>
+              <a:defRPr sz="1800" kern="1200">
+                <a:solidFill>
+                  <a:schemeClr val="tx1"/>
+                </a:solidFill>
+                <a:latin typeface="+mn-lt"/>
+                <a:ea typeface="+mn-ea"/>
+                <a:cs typeface="+mn-cs"/>
+              </a:defRPr>
+            </a:lvl7pPr>
+            <a:lvl8pPr marL="3429000" indent="-228600" algn="l" defTabSz="914400" rtl="0" eaLnBrk="1" latinLnBrk="0" hangingPunct="1">
+              <a:lnSpc>
+                <a:spcPct val="90000"/>
+              </a:lnSpc>
+              <a:spcBef>
+                <a:spcPts val="500"/>
+              </a:spcBef>
+              <a:buFont typeface="Arial" panose="020B0604020202020204" pitchFamily="34" charset="0"/>
+              <a:buChar char="•"/>
+              <a:defRPr sz="1800" kern="1200">
+                <a:solidFill>
+                  <a:schemeClr val="tx1"/>
+                </a:solidFill>
+                <a:latin typeface="+mn-lt"/>
+                <a:ea typeface="+mn-ea"/>
+                <a:cs typeface="+mn-cs"/>
+              </a:defRPr>
+            </a:lvl8pPr>
+            <a:lvl9pPr marL="3886200" indent="-228600" algn="l" defTabSz="914400" rtl="0" eaLnBrk="1" latinLnBrk="0" hangingPunct="1">
+              <a:lnSpc>
+                <a:spcPct val="90000"/>
+              </a:lnSpc>
+              <a:spcBef>
+                <a:spcPts val="500"/>
+              </a:spcBef>
+              <a:buFont typeface="Arial" panose="020B0604020202020204" pitchFamily="34" charset="0"/>
+              <a:buChar char="•"/>
+              <a:defRPr sz="1800" kern="1200">
+                <a:solidFill>
+                  <a:schemeClr val="tx1"/>
+                </a:solidFill>
+                <a:latin typeface="+mn-lt"/>
+                <a:ea typeface="+mn-ea"/>
+                <a:cs typeface="+mn-cs"/>
+              </a:defRPr>
+            </a:lvl9pPr>
+          </a:lstStyle>
+          <a:p>
+            <a:pPr marL="0" indent="0">
+              <a:lnSpc>
+                <a:spcPct val="100000"/>
+              </a:lnSpc>
+              <a:buNone/>
+            </a:pPr>
+            <a:r>
+              <a:rPr lang="de-AT" sz="1200" dirty="0">
+                <a:solidFill>
+                  <a:srgbClr val="000080"/>
+                </a:solidFill>
+              </a:rPr>
+              <a:t>var</a:t>
+            </a:r>
+            <a:r>
+              <a:rPr lang="de-AT" sz="1200" dirty="0"/>
+              <a:t> ga = </a:t>
+            </a:r>
+            <a:r>
+              <a:rPr lang="de-AT" sz="1200" dirty="0">
+                <a:solidFill>
+                  <a:srgbClr val="008B8B"/>
+                </a:solidFill>
+              </a:rPr>
+              <a:t>new</a:t>
+            </a:r>
+            <a:r>
+              <a:rPr lang="de-AT" sz="1200" dirty="0"/>
+              <a:t> </a:t>
+            </a:r>
+            <a:r>
+              <a:rPr lang="de-AT" sz="1200" dirty="0">
                 <a:solidFill>
                   <a:srgbClr val="191970"/>
                 </a:solidFill>
               </a:rPr>
-              <a:t>Initialize</a:t>
-            </a:r>
-            <a:r>
-              <a:rPr lang="de-AT" sz="1000" dirty="0"/>
-              <a:t>(CancellationToken cancellationToken) {</a:t>
+              <a:t>GeneticAlgorithm</a:t>
+            </a:r>
+            <a:r>
+              <a:rPr lang="de-AT" sz="1200" dirty="0"/>
+              <a:t>()</a:t>
             </a:r>
             <a:br>
-              <a:rPr lang="de-AT" sz="1000" dirty="0"/>
+              <a:rPr lang="de-AT" sz="1200" dirty="0"/>
             </a:br>
             <a:r>
-              <a:rPr lang="de-AT" sz="1000" dirty="0"/>
-              <a:t>  Results.</a:t>
-            </a:r>
-            <a:r>
-              <a:rPr lang="de-AT" sz="1000" dirty="0">
+              <a:rPr lang="de-AT" sz="1200" dirty="0">
+                <a:solidFill>
+                  <a:srgbClr val="008000"/>
+                </a:solidFill>
+              </a:rPr>
+              <a:t>// configure algorithm ...</a:t>
+            </a:r>
+            <a:r>
+              <a:rPr lang="de-AT" sz="1200" dirty="0"/>
+              <a:t/>
+            </a:r>
+            <a:br>
+              <a:rPr lang="de-AT" sz="1200" dirty="0"/>
+            </a:br>
+            <a:r>
+              <a:rPr lang="de-AT" sz="1200" dirty="0"/>
+              <a:t/>
+            </a:r>
+            <a:br>
+              <a:rPr lang="de-AT" sz="1200" dirty="0"/>
+            </a:br>
+            <a:r>
+              <a:rPr lang="de-AT" sz="1200" dirty="0"/>
+              <a:t>ga.</a:t>
+            </a:r>
+            <a:r>
+              <a:rPr lang="de-AT" sz="1200" dirty="0">
                 <a:solidFill>
                   <a:srgbClr val="191970"/>
                 </a:solidFill>
               </a:rPr>
-              <a:t>Add</a:t>
-            </a:r>
-            <a:r>
-              <a:rPr lang="de-AT" sz="1000" dirty="0"/>
-              <a:t>(</a:t>
-            </a:r>
-            <a:r>
-              <a:rPr lang="de-AT" sz="1000" dirty="0">
-                <a:solidFill>
-                  <a:srgbClr val="008B8B"/>
-                </a:solidFill>
-              </a:rPr>
-              <a:t>new</a:t>
-            </a:r>
-            <a:r>
-              <a:rPr lang="de-AT" sz="1000" dirty="0"/>
-              <a:t> </a:t>
-            </a:r>
-            <a:r>
-              <a:rPr lang="de-AT" sz="1000" dirty="0">
+              <a:t>Start</a:t>
+            </a:r>
+            <a:r>
+              <a:rPr lang="de-AT" sz="1200" dirty="0"/>
+              <a:t>() </a:t>
+            </a:r>
+            <a:r>
+              <a:rPr lang="de-AT" sz="1200" dirty="0">
+                <a:solidFill>
+                  <a:srgbClr val="008000"/>
+                </a:solidFill>
+              </a:rPr>
+              <a:t>// start "synchronously" (calls StartAsync().Wait())</a:t>
+            </a:r>
+            <a:r>
+              <a:rPr lang="de-AT" sz="1200" dirty="0"/>
+              <a:t/>
+            </a:r>
+            <a:br>
+              <a:rPr lang="de-AT" sz="1200" dirty="0"/>
+            </a:br>
+            <a:r>
+              <a:rPr lang="de-AT" sz="1200" dirty="0"/>
+              <a:t>ga.</a:t>
+            </a:r>
+            <a:r>
+              <a:rPr lang="de-AT" sz="1200" dirty="0">
                 <a:solidFill>
                   <a:srgbClr val="191970"/>
                 </a:solidFill>
               </a:rPr>
-              <a:t>Result</a:t>
-            </a:r>
-            <a:r>
-              <a:rPr lang="de-AT" sz="1000" dirty="0"/>
-              <a:t>(BestQualityResultName, </a:t>
-            </a:r>
-            <a:r>
-              <a:rPr lang="de-AT" sz="1000" dirty="0">
-                <a:solidFill>
-                  <a:srgbClr val="008B8B"/>
-                </a:solidFill>
-              </a:rPr>
-              <a:t>new</a:t>
-            </a:r>
-            <a:r>
-              <a:rPr lang="de-AT" sz="1000" dirty="0"/>
-              <a:t> </a:t>
-            </a:r>
-            <a:r>
-              <a:rPr lang="de-AT" sz="1000" dirty="0">
+              <a:t>StartAsync</a:t>
+            </a:r>
+            <a:r>
+              <a:rPr lang="de-AT" sz="1200" dirty="0"/>
+              <a:t>() </a:t>
+            </a:r>
+            <a:r>
+              <a:rPr lang="de-AT" sz="1200" dirty="0">
+                <a:solidFill>
+                  <a:srgbClr val="008000"/>
+                </a:solidFill>
+              </a:rPr>
+              <a:t>// start asynchronously</a:t>
+            </a:r>
+            <a:r>
+              <a:rPr lang="de-AT" sz="1200" dirty="0"/>
+              <a:t/>
+            </a:r>
+            <a:br>
+              <a:rPr lang="de-AT" sz="1200" dirty="0"/>
+            </a:br>
+            <a:r>
+              <a:rPr lang="de-AT" sz="1200" dirty="0"/>
+              <a:t>ga.</a:t>
+            </a:r>
+            <a:r>
+              <a:rPr lang="de-AT" sz="1200" dirty="0">
                 <a:solidFill>
                   <a:srgbClr val="191970"/>
                 </a:solidFill>
               </a:rPr>
-              <a:t>DoubleValue</a:t>
-            </a:r>
-            <a:r>
-              <a:rPr lang="de-AT" sz="1000" dirty="0"/>
-              <a:t>(</a:t>
-            </a:r>
-            <a:r>
-              <a:rPr lang="de-AT" sz="1000" dirty="0">
-                <a:solidFill>
-                  <a:srgbClr val="FF0000"/>
-                </a:solidFill>
-              </a:rPr>
-              <a:t>double</a:t>
-            </a:r>
-            <a:r>
-              <a:rPr lang="de-AT" sz="1000" dirty="0"/>
-              <a:t>.NaN)));</a:t>
-            </a:r>
-            <a:br>
-              <a:rPr lang="de-AT" sz="1000" dirty="0"/>
-            </a:br>
-            <a:r>
-              <a:rPr lang="de-AT" sz="1000" dirty="0"/>
-              <a:t>  Results.</a:t>
-            </a:r>
-            <a:r>
-              <a:rPr lang="de-AT" sz="1000" dirty="0">
+              <a:t>StartAsync</a:t>
+            </a:r>
+            <a:r>
+              <a:rPr lang="de-AT" sz="1200" dirty="0"/>
+              <a:t>().</a:t>
+            </a:r>
+            <a:r>
+              <a:rPr lang="de-AT" sz="1200" dirty="0">
                 <a:solidFill>
                   <a:srgbClr val="191970"/>
                 </a:solidFill>
               </a:rPr>
-              <a:t>Add</a:t>
-            </a:r>
-            <a:r>
-              <a:rPr lang="de-AT" sz="1000" dirty="0"/>
-              <a:t>(</a:t>
-            </a:r>
-            <a:r>
-              <a:rPr lang="de-AT" sz="1000" dirty="0">
-                <a:solidFill>
-                  <a:srgbClr val="008B8B"/>
-                </a:solidFill>
-              </a:rPr>
-              <a:t>new</a:t>
-            </a:r>
-            <a:r>
-              <a:rPr lang="de-AT" sz="1000" dirty="0"/>
-              <a:t> </a:t>
-            </a:r>
-            <a:r>
-              <a:rPr lang="de-AT" sz="1000" dirty="0">
-                <a:solidFill>
-                  <a:srgbClr val="191970"/>
-                </a:solidFill>
-              </a:rPr>
-              <a:t>Result</a:t>
-            </a:r>
-            <a:r>
-              <a:rPr lang="de-AT" sz="1000" dirty="0"/>
-              <a:t>(IterationsResultName, </a:t>
-            </a:r>
-            <a:r>
-              <a:rPr lang="de-AT" sz="1000" dirty="0">
-                <a:solidFill>
-                  <a:srgbClr val="008B8B"/>
-                </a:solidFill>
-              </a:rPr>
-              <a:t>new</a:t>
-            </a:r>
-            <a:r>
-              <a:rPr lang="de-AT" sz="1000" dirty="0"/>
-              <a:t> </a:t>
-            </a:r>
-            <a:r>
-              <a:rPr lang="de-AT" sz="1000" dirty="0">
-                <a:solidFill>
-                  <a:srgbClr val="191970"/>
-                </a:solidFill>
-              </a:rPr>
-              <a:t>IntValue</a:t>
-            </a:r>
-            <a:r>
-              <a:rPr lang="de-AT" sz="1000" dirty="0"/>
-              <a:t>(</a:t>
-            </a:r>
-            <a:r>
-              <a:rPr lang="de-AT" sz="1000" dirty="0">
-                <a:solidFill>
-                  <a:srgbClr val="00008B"/>
-                </a:solidFill>
-              </a:rPr>
-              <a:t>0</a:t>
-            </a:r>
-            <a:r>
-              <a:rPr lang="de-AT" sz="1000" dirty="0"/>
-              <a:t>)));</a:t>
-            </a:r>
-            <a:br>
-              <a:rPr lang="de-AT" sz="1000" dirty="0"/>
-            </a:br>
-            <a:r>
-              <a:rPr lang="de-AT" sz="1000" dirty="0"/>
-              <a:t>  base.</a:t>
-            </a:r>
-            <a:r>
-              <a:rPr lang="de-AT" sz="1000" dirty="0">
-                <a:solidFill>
-                  <a:srgbClr val="191970"/>
-                </a:solidFill>
-              </a:rPr>
-              <a:t>Initialize</a:t>
-            </a:r>
-            <a:r>
-              <a:rPr lang="de-AT" sz="1000" dirty="0"/>
-              <a:t>(cancellationToken);</a:t>
-            </a:r>
-            <a:br>
-              <a:rPr lang="de-AT" sz="1000" dirty="0"/>
-            </a:br>
-            <a:r>
-              <a:rPr lang="de-AT" sz="1000" dirty="0"/>
-              <a:t>}</a:t>
-            </a:r>
-            <a:br>
-              <a:rPr lang="de-AT" sz="1000" dirty="0"/>
-            </a:br>
-            <a:r>
-              <a:rPr lang="de-AT" sz="1000" dirty="0"/>
-              <a:t/>
-            </a:r>
-            <a:br>
-              <a:rPr lang="de-AT" sz="1000" dirty="0"/>
-            </a:br>
-            <a:r>
-              <a:rPr lang="de-AT" sz="1000" dirty="0">
-                <a:solidFill>
-                  <a:srgbClr val="0000FF"/>
-                </a:solidFill>
-              </a:rPr>
-              <a:t>protected</a:t>
-            </a:r>
-            <a:r>
-              <a:rPr lang="de-AT" sz="1000" dirty="0"/>
-              <a:t> </a:t>
-            </a:r>
-            <a:r>
-              <a:rPr lang="de-AT" sz="1000" dirty="0">
-                <a:solidFill>
-                  <a:srgbClr val="A52A2A"/>
-                </a:solidFill>
-              </a:rPr>
-              <a:t>override</a:t>
-            </a:r>
-            <a:r>
-              <a:rPr lang="de-AT" sz="1000" dirty="0"/>
-              <a:t> </a:t>
-            </a:r>
-            <a:r>
-              <a:rPr lang="de-AT" sz="1000" dirty="0">
-                <a:solidFill>
-                  <a:srgbClr val="FF0000"/>
-                </a:solidFill>
-              </a:rPr>
-              <a:t>void</a:t>
-            </a:r>
-            <a:r>
-              <a:rPr lang="de-AT" sz="1000" dirty="0"/>
-              <a:t> </a:t>
-            </a:r>
-            <a:r>
-              <a:rPr lang="de-AT" sz="1000" dirty="0">
-                <a:solidFill>
-                  <a:srgbClr val="191970"/>
-                </a:solidFill>
-              </a:rPr>
-              <a:t>Run</a:t>
-            </a:r>
-            <a:r>
-              <a:rPr lang="de-AT" sz="1000" dirty="0"/>
-              <a:t>(CancellationToken cancellationToken) {</a:t>
-            </a:r>
-            <a:br>
-              <a:rPr lang="de-AT" sz="1000" dirty="0"/>
-            </a:br>
-            <a:r>
-              <a:rPr lang="de-AT" sz="1000" dirty="0"/>
-              <a:t>  </a:t>
-            </a:r>
-            <a:r>
-              <a:rPr lang="de-AT" sz="1000" dirty="0">
-                <a:solidFill>
-                  <a:srgbClr val="0000FF"/>
-                </a:solidFill>
-              </a:rPr>
-              <a:t>while</a:t>
-            </a:r>
-            <a:r>
-              <a:rPr lang="de-AT" sz="1000" dirty="0"/>
-              <a:t> (ResultsIterations &lt; Iterations) {</a:t>
-            </a:r>
-            <a:br>
-              <a:rPr lang="de-AT" sz="1000" dirty="0"/>
-            </a:br>
-            <a:r>
-              <a:rPr lang="de-AT" sz="1000" dirty="0"/>
-              <a:t>    cancellationToken.</a:t>
-            </a:r>
-            <a:r>
-              <a:rPr lang="de-AT" sz="1000" dirty="0">
-                <a:solidFill>
-                  <a:srgbClr val="191970"/>
-                </a:solidFill>
-              </a:rPr>
-              <a:t>ThrowIfCancellationRequested</a:t>
-            </a:r>
-            <a:r>
-              <a:rPr lang="de-AT" sz="1000" dirty="0"/>
-              <a:t>();</a:t>
-            </a:r>
-            <a:br>
-              <a:rPr lang="de-AT" sz="1000" dirty="0"/>
-            </a:br>
-            <a:r>
-              <a:rPr lang="de-AT" sz="1000" dirty="0"/>
-              <a:t/>
-            </a:r>
-            <a:br>
-              <a:rPr lang="de-AT" sz="1000" dirty="0"/>
-            </a:br>
-            <a:r>
-              <a:rPr lang="de-AT" sz="1000" dirty="0"/>
-              <a:t>    </a:t>
-            </a:r>
-            <a:r>
-              <a:rPr lang="de-AT" sz="1000" dirty="0">
+              <a:t>Wait</a:t>
+            </a:r>
+            <a:r>
+              <a:rPr lang="de-AT" sz="1200" dirty="0"/>
+              <a:t>() </a:t>
+            </a:r>
+            <a:r>
+              <a:rPr lang="de-AT" sz="1200" dirty="0">
                 <a:solidFill>
                   <a:srgbClr val="008000"/>
                 </a:solidFill>
               </a:rPr>
-              <a:t>// execute one iteration</a:t>
-            </a:r>
-            <a:r>
-              <a:rPr lang="de-AT" sz="1000" dirty="0"/>
-              <a:t/>
-            </a:r>
-            <a:br>
-              <a:rPr lang="de-AT" sz="1000" dirty="0"/>
-            </a:br>
-            <a:r>
-              <a:rPr lang="de-AT" sz="1000" dirty="0"/>
-              <a:t/>
-            </a:r>
-            <a:br>
-              <a:rPr lang="de-AT" sz="1000" dirty="0"/>
-            </a:br>
-            <a:r>
-              <a:rPr lang="de-AT" sz="1000" dirty="0"/>
-              <a:t>    ResultsIterations++;</a:t>
-            </a:r>
-            <a:br>
-              <a:rPr lang="de-AT" sz="1000" dirty="0"/>
-            </a:br>
-            <a:r>
-              <a:rPr lang="de-AT" sz="1000" dirty="0"/>
-              <a:t>  }</a:t>
-            </a:r>
-            <a:br>
-              <a:rPr lang="de-AT" sz="1000" dirty="0"/>
-            </a:br>
-            <a:r>
-              <a:rPr lang="de-AT" sz="1000" dirty="0"/>
-              <a:t>}</a:t>
-            </a:r>
-            <a:endParaRPr lang="de-DE" sz="1000" dirty="0"/>
+              <a:t>// start asynchronously and wait</a:t>
+            </a:r>
+            <a:endParaRPr lang="de-DE" sz="1200" dirty="0"/>
           </a:p>
         </p:txBody>
       </p:sp>
     </p:spTree>
     <p:extLst>
       <p:ext uri="{BB962C8B-B14F-4D97-AF65-F5344CB8AC3E}">
-        <p14:creationId xmlns:p14="http://schemas.microsoft.com/office/powerpoint/2010/main" val="2419751290"/>
+        <p14:creationId xmlns:p14="http://schemas.microsoft.com/office/powerpoint/2010/main" val="1822671034"/>
       </p:ext>
     </p:extLst>
   </p:cSld>
@@ -9329,16 +9535,12 @@
           <a:lstStyle/>
           <a:p>
             <a:r>
-              <a:rPr lang="de-DE" dirty="0" smtClean="0"/>
-              <a:t>Async </a:t>
-            </a:r>
-            <a:r>
               <a:rPr lang="de-DE" dirty="0"/>
-              <a:t>Start/Stop f</a:t>
-            </a:r>
-            <a:r>
-              <a:rPr lang="de-DE" dirty="0" smtClean="0"/>
-              <a:t>or Algorithms</a:t>
+              <a:t>New Termination </a:t>
+            </a:r>
+            <a:r>
+              <a:rPr lang="de-DE" dirty="0" err="1" smtClean="0"/>
+              <a:t>Criteria</a:t>
             </a:r>
             <a:endParaRPr lang="en-US" dirty="0"/>
           </a:p>
@@ -9362,607 +9564,189 @@
           <a:lstStyle/>
           <a:p>
             <a:r>
-              <a:rPr lang="de-DE" dirty="0" smtClean="0"/>
-              <a:t>We </a:t>
-            </a:r>
-            <a:r>
-              <a:rPr lang="de-DE" dirty="0"/>
-              <a:t>should better reflect the style of async/wait programming in C#</a:t>
-            </a:r>
+              <a:rPr lang="en-US" dirty="0" smtClean="0"/>
+              <a:t>Allows consistent termination in all </a:t>
+            </a:r>
+            <a:r>
+              <a:rPr lang="en-US" dirty="0" err="1" smtClean="0"/>
+              <a:t>EngineAlgorithms</a:t>
+            </a:r>
+            <a:endParaRPr lang="en-US" dirty="0" smtClean="0"/>
           </a:p>
           <a:p>
             <a:pPr lvl="1"/>
             <a:r>
-              <a:rPr lang="de-DE" dirty="0"/>
-              <a:t>IExecutable.Start is actually an asynchronous operation and should be named StartAsync</a:t>
-            </a:r>
-          </a:p>
-          <a:p>
-            <a:r>
-              <a:rPr lang="de-DE" dirty="0"/>
-              <a:t>Sample tests (and e.g. scripts) must use helper functions to wait for algorithm results</a:t>
+              <a:rPr lang="en-US" dirty="0" smtClean="0"/>
+              <a:t>Additional concept to better compare algorithm performances</a:t>
             </a:r>
           </a:p>
           <a:p>
             <a:pPr lvl="1"/>
             <a:r>
-              <a:rPr lang="de-DE" dirty="0"/>
-              <a:t>We could just call Start synchronously</a:t>
-            </a:r>
-          </a:p>
-          <a:p>
-            <a:r>
-              <a:rPr lang="de-DE" dirty="0"/>
-              <a:t>We </a:t>
-            </a:r>
-            <a:r>
-              <a:rPr lang="de-DE" dirty="0" smtClean="0"/>
-              <a:t>added/implemented </a:t>
-            </a:r>
-            <a:r>
-              <a:rPr lang="de-DE" dirty="0"/>
-              <a:t>IExecutable.Start and IExecutable.StartAsync</a:t>
+              <a:rPr lang="en-US" dirty="0" smtClean="0"/>
+              <a:t>e.g. only allow 10</a:t>
+            </a:r>
+            <a:r>
+              <a:rPr lang="en-US" baseline="30000" dirty="0" smtClean="0"/>
+              <a:t>6</a:t>
+            </a:r>
+            <a:r>
+              <a:rPr lang="en-US" dirty="0"/>
+              <a:t> </a:t>
+            </a:r>
+            <a:r>
+              <a:rPr lang="en-US" dirty="0" smtClean="0"/>
+              <a:t>evaluations for each algorithm</a:t>
+            </a:r>
+            <a:endParaRPr lang="en-US" baseline="30000" dirty="0" smtClean="0"/>
+          </a:p>
+          <a:p>
+            <a:r>
+              <a:rPr lang="en-US" dirty="0" err="1" smtClean="0"/>
+              <a:t>TerminationOperator</a:t>
+            </a:r>
+            <a:r>
+              <a:rPr lang="en-US" dirty="0" smtClean="0"/>
+              <a:t> uses </a:t>
+            </a:r>
+            <a:r>
+              <a:rPr lang="en-US" dirty="0" err="1" smtClean="0"/>
+              <a:t>MultiTerminator</a:t>
+            </a:r>
+            <a:r>
+              <a:rPr lang="en-US" dirty="0" smtClean="0"/>
+              <a:t> and cancels the algorithm if any of the active termination criteria is not met</a:t>
             </a:r>
             <a:endParaRPr lang="en-US" dirty="0"/>
           </a:p>
         </p:txBody>
       </p:sp>
-      <p:sp>
-        <p:nvSpPr>
-          <p:cNvPr id="4" name="Inhaltsplatzhalter 7"/>
-          <p:cNvSpPr txBox="1">
-            <a:spLocks/>
-          </p:cNvSpPr>
+      <p:pic>
+        <p:nvPicPr>
+          <p:cNvPr id="11" name="Picture 10"/>
+          <p:cNvPicPr>
+            <a:picLocks noChangeAspect="1"/>
+          </p:cNvPicPr>
           <p:nvPr/>
-        </p:nvSpPr>
+        </p:nvPicPr>
+        <p:blipFill>
+          <a:blip r:embed="rId2"/>
+          <a:stretch>
+            <a:fillRect/>
+          </a:stretch>
+        </p:blipFill>
         <p:spPr>
           <a:xfrm>
-            <a:off x="1831571" y="4563687"/>
-            <a:ext cx="4535978" cy="1396538"/>
+            <a:off x="2196291" y="4071017"/>
+            <a:ext cx="8048625" cy="2009775"/>
           </a:xfrm>
           <a:prstGeom prst="rect">
             <a:avLst/>
           </a:prstGeom>
+          <a:ln>
+            <a:noFill/>
+          </a:ln>
+          <a:effectLst>
+            <a:outerShdw blurRad="190500" algn="tl" rotWithShape="0">
+              <a:srgbClr val="000000">
+                <a:alpha val="70000"/>
+              </a:srgbClr>
+            </a:outerShdw>
+          </a:effectLst>
         </p:spPr>
-        <p:txBody>
-          <a:bodyPr>
-            <a:noAutofit/>
-          </a:bodyPr>
-          <a:lstStyle>
-            <a:lvl1pPr marL="228600" indent="-228600" algn="l" defTabSz="914400" rtl="0" eaLnBrk="1" latinLnBrk="0" hangingPunct="1">
-              <a:lnSpc>
-                <a:spcPct val="90000"/>
-              </a:lnSpc>
-              <a:spcBef>
-                <a:spcPts val="1000"/>
-              </a:spcBef>
-              <a:buFont typeface="Arial" panose="020B0604020202020204" pitchFamily="34" charset="0"/>
-              <a:buChar char="•"/>
-              <a:defRPr sz="2800" kern="1200">
-                <a:solidFill>
-                  <a:schemeClr val="tx1"/>
-                </a:solidFill>
-                <a:latin typeface="+mn-lt"/>
-                <a:ea typeface="+mn-ea"/>
-                <a:cs typeface="+mn-cs"/>
-              </a:defRPr>
-            </a:lvl1pPr>
-            <a:lvl2pPr marL="685800" indent="-228600" algn="l" defTabSz="914400" rtl="0" eaLnBrk="1" latinLnBrk="0" hangingPunct="1">
-              <a:lnSpc>
-                <a:spcPct val="90000"/>
-              </a:lnSpc>
-              <a:spcBef>
-                <a:spcPts val="500"/>
-              </a:spcBef>
-              <a:buFont typeface="Arial" panose="020B0604020202020204" pitchFamily="34" charset="0"/>
-              <a:buChar char="•"/>
-              <a:defRPr sz="2400" kern="1200">
-                <a:solidFill>
-                  <a:schemeClr val="tx1"/>
-                </a:solidFill>
-                <a:latin typeface="+mn-lt"/>
-                <a:ea typeface="+mn-ea"/>
-                <a:cs typeface="+mn-cs"/>
-              </a:defRPr>
-            </a:lvl2pPr>
-            <a:lvl3pPr marL="1143000" indent="-228600" algn="l" defTabSz="914400" rtl="0" eaLnBrk="1" latinLnBrk="0" hangingPunct="1">
-              <a:lnSpc>
-                <a:spcPct val="90000"/>
-              </a:lnSpc>
-              <a:spcBef>
-                <a:spcPts val="500"/>
-              </a:spcBef>
-              <a:buFont typeface="Arial" panose="020B0604020202020204" pitchFamily="34" charset="0"/>
-              <a:buChar char="•"/>
-              <a:defRPr sz="2000" kern="1200">
-                <a:solidFill>
-                  <a:schemeClr val="tx1"/>
-                </a:solidFill>
-                <a:latin typeface="+mn-lt"/>
-                <a:ea typeface="+mn-ea"/>
-                <a:cs typeface="+mn-cs"/>
-              </a:defRPr>
-            </a:lvl3pPr>
-            <a:lvl4pPr marL="1600200" indent="-228600" algn="l" defTabSz="914400" rtl="0" eaLnBrk="1" latinLnBrk="0" hangingPunct="1">
-              <a:lnSpc>
-                <a:spcPct val="90000"/>
-              </a:lnSpc>
-              <a:spcBef>
-                <a:spcPts val="500"/>
-              </a:spcBef>
-              <a:buFont typeface="Arial" panose="020B0604020202020204" pitchFamily="34" charset="0"/>
-              <a:buChar char="•"/>
-              <a:defRPr sz="1800" kern="1200">
-                <a:solidFill>
-                  <a:schemeClr val="tx1"/>
-                </a:solidFill>
-                <a:latin typeface="+mn-lt"/>
-                <a:ea typeface="+mn-ea"/>
-                <a:cs typeface="+mn-cs"/>
-              </a:defRPr>
-            </a:lvl4pPr>
-            <a:lvl5pPr marL="2057400" indent="-228600" algn="l" defTabSz="914400" rtl="0" eaLnBrk="1" latinLnBrk="0" hangingPunct="1">
-              <a:lnSpc>
-                <a:spcPct val="90000"/>
-              </a:lnSpc>
-              <a:spcBef>
-                <a:spcPts val="500"/>
-              </a:spcBef>
-              <a:buFont typeface="Arial" panose="020B0604020202020204" pitchFamily="34" charset="0"/>
-              <a:buChar char="•"/>
-              <a:defRPr sz="1800" kern="1200">
-                <a:solidFill>
-                  <a:schemeClr val="tx1"/>
-                </a:solidFill>
-                <a:latin typeface="+mn-lt"/>
-                <a:ea typeface="+mn-ea"/>
-                <a:cs typeface="+mn-cs"/>
-              </a:defRPr>
-            </a:lvl5pPr>
-            <a:lvl6pPr marL="2514600" indent="-228600" algn="l" defTabSz="914400" rtl="0" eaLnBrk="1" latinLnBrk="0" hangingPunct="1">
-              <a:lnSpc>
-                <a:spcPct val="90000"/>
-              </a:lnSpc>
-              <a:spcBef>
-                <a:spcPts val="500"/>
-              </a:spcBef>
-              <a:buFont typeface="Arial" panose="020B0604020202020204" pitchFamily="34" charset="0"/>
-              <a:buChar char="•"/>
-              <a:defRPr sz="1800" kern="1200">
-                <a:solidFill>
-                  <a:schemeClr val="tx1"/>
-                </a:solidFill>
-                <a:latin typeface="+mn-lt"/>
-                <a:ea typeface="+mn-ea"/>
-                <a:cs typeface="+mn-cs"/>
-              </a:defRPr>
-            </a:lvl6pPr>
-            <a:lvl7pPr marL="2971800" indent="-228600" algn="l" defTabSz="914400" rtl="0" eaLnBrk="1" latinLnBrk="0" hangingPunct="1">
-              <a:lnSpc>
-                <a:spcPct val="90000"/>
-              </a:lnSpc>
-              <a:spcBef>
-                <a:spcPts val="500"/>
-              </a:spcBef>
-              <a:buFont typeface="Arial" panose="020B0604020202020204" pitchFamily="34" charset="0"/>
-              <a:buChar char="•"/>
-              <a:defRPr sz="1800" kern="1200">
-                <a:solidFill>
-                  <a:schemeClr val="tx1"/>
-                </a:solidFill>
-                <a:latin typeface="+mn-lt"/>
-                <a:ea typeface="+mn-ea"/>
-                <a:cs typeface="+mn-cs"/>
-              </a:defRPr>
-            </a:lvl7pPr>
-            <a:lvl8pPr marL="3429000" indent="-228600" algn="l" defTabSz="914400" rtl="0" eaLnBrk="1" latinLnBrk="0" hangingPunct="1">
-              <a:lnSpc>
-                <a:spcPct val="90000"/>
-              </a:lnSpc>
-              <a:spcBef>
-                <a:spcPts val="500"/>
-              </a:spcBef>
-              <a:buFont typeface="Arial" panose="020B0604020202020204" pitchFamily="34" charset="0"/>
-              <a:buChar char="•"/>
-              <a:defRPr sz="1800" kern="1200">
-                <a:solidFill>
-                  <a:schemeClr val="tx1"/>
-                </a:solidFill>
-                <a:latin typeface="+mn-lt"/>
-                <a:ea typeface="+mn-ea"/>
-                <a:cs typeface="+mn-cs"/>
-              </a:defRPr>
-            </a:lvl8pPr>
-            <a:lvl9pPr marL="3886200" indent="-228600" algn="l" defTabSz="914400" rtl="0" eaLnBrk="1" latinLnBrk="0" hangingPunct="1">
-              <a:lnSpc>
-                <a:spcPct val="90000"/>
-              </a:lnSpc>
-              <a:spcBef>
-                <a:spcPts val="500"/>
-              </a:spcBef>
-              <a:buFont typeface="Arial" panose="020B0604020202020204" pitchFamily="34" charset="0"/>
-              <a:buChar char="•"/>
-              <a:defRPr sz="1800" kern="1200">
-                <a:solidFill>
-                  <a:schemeClr val="tx1"/>
-                </a:solidFill>
-                <a:latin typeface="+mn-lt"/>
-                <a:ea typeface="+mn-ea"/>
-                <a:cs typeface="+mn-cs"/>
-              </a:defRPr>
-            </a:lvl9pPr>
-          </a:lstStyle>
-          <a:p>
-            <a:pPr marL="0" indent="0">
-              <a:lnSpc>
-                <a:spcPct val="100000"/>
-              </a:lnSpc>
-              <a:buFont typeface="Arial" panose="020B0604020202020204" pitchFamily="34" charset="0"/>
-              <a:buNone/>
-            </a:pPr>
-            <a:endParaRPr lang="de-DE" sz="1200" dirty="0" smtClean="0"/>
-          </a:p>
-        </p:txBody>
-      </p:sp>
-      <p:sp>
-        <p:nvSpPr>
-          <p:cNvPr id="6" name="Inhaltsplatzhalter 7"/>
-          <p:cNvSpPr txBox="1">
-            <a:spLocks/>
-          </p:cNvSpPr>
+      </p:pic>
+      <p:sp>
+        <p:nvSpPr>
+          <p:cNvPr id="7" name="Rectangle 6"/>
+          <p:cNvSpPr/>
           <p:nvPr/>
         </p:nvSpPr>
         <p:spPr>
           <a:xfrm>
-            <a:off x="3944358" y="4912822"/>
-            <a:ext cx="4303285" cy="1047403"/>
+            <a:off x="2221230" y="4389127"/>
+            <a:ext cx="1419743" cy="207817"/>
           </a:xfrm>
           <a:prstGeom prst="rect">
             <a:avLst/>
           </a:prstGeom>
+          <a:noFill/>
+          <a:ln>
+            <a:solidFill>
+              <a:srgbClr val="FF0000"/>
+            </a:solidFill>
+          </a:ln>
         </p:spPr>
-        <p:txBody>
-          <a:bodyPr anchor="ctr">
-            <a:noAutofit/>
-          </a:bodyPr>
-          <a:lstStyle>
-            <a:lvl1pPr marL="228600" indent="-228600" algn="l" defTabSz="914400" rtl="0" eaLnBrk="1" latinLnBrk="0" hangingPunct="1">
-              <a:lnSpc>
-                <a:spcPct val="90000"/>
-              </a:lnSpc>
-              <a:spcBef>
-                <a:spcPts val="1000"/>
-              </a:spcBef>
-              <a:buFont typeface="Arial" panose="020B0604020202020204" pitchFamily="34" charset="0"/>
-              <a:buChar char="•"/>
-              <a:defRPr sz="2800" kern="1200">
-                <a:solidFill>
-                  <a:schemeClr val="tx1"/>
-                </a:solidFill>
-                <a:latin typeface="+mn-lt"/>
-                <a:ea typeface="+mn-ea"/>
-                <a:cs typeface="+mn-cs"/>
-              </a:defRPr>
-            </a:lvl1pPr>
-            <a:lvl2pPr marL="685800" indent="-228600" algn="l" defTabSz="914400" rtl="0" eaLnBrk="1" latinLnBrk="0" hangingPunct="1">
-              <a:lnSpc>
-                <a:spcPct val="90000"/>
-              </a:lnSpc>
-              <a:spcBef>
-                <a:spcPts val="500"/>
-              </a:spcBef>
-              <a:buFont typeface="Arial" panose="020B0604020202020204" pitchFamily="34" charset="0"/>
-              <a:buChar char="•"/>
-              <a:defRPr sz="2400" kern="1200">
-                <a:solidFill>
-                  <a:schemeClr val="tx1"/>
-                </a:solidFill>
-                <a:latin typeface="+mn-lt"/>
-                <a:ea typeface="+mn-ea"/>
-                <a:cs typeface="+mn-cs"/>
-              </a:defRPr>
-            </a:lvl2pPr>
-            <a:lvl3pPr marL="1143000" indent="-228600" algn="l" defTabSz="914400" rtl="0" eaLnBrk="1" latinLnBrk="0" hangingPunct="1">
-              <a:lnSpc>
-                <a:spcPct val="90000"/>
-              </a:lnSpc>
-              <a:spcBef>
-                <a:spcPts val="500"/>
-              </a:spcBef>
-              <a:buFont typeface="Arial" panose="020B0604020202020204" pitchFamily="34" charset="0"/>
-              <a:buChar char="•"/>
-              <a:defRPr sz="2000" kern="1200">
-                <a:solidFill>
-                  <a:schemeClr val="tx1"/>
-                </a:solidFill>
-                <a:latin typeface="+mn-lt"/>
-                <a:ea typeface="+mn-ea"/>
-                <a:cs typeface="+mn-cs"/>
-              </a:defRPr>
-            </a:lvl3pPr>
-            <a:lvl4pPr marL="1600200" indent="-228600" algn="l" defTabSz="914400" rtl="0" eaLnBrk="1" latinLnBrk="0" hangingPunct="1">
-              <a:lnSpc>
-                <a:spcPct val="90000"/>
-              </a:lnSpc>
-              <a:spcBef>
-                <a:spcPts val="500"/>
-              </a:spcBef>
-              <a:buFont typeface="Arial" panose="020B0604020202020204" pitchFamily="34" charset="0"/>
-              <a:buChar char="•"/>
-              <a:defRPr sz="1800" kern="1200">
-                <a:solidFill>
-                  <a:schemeClr val="tx1"/>
-                </a:solidFill>
-                <a:latin typeface="+mn-lt"/>
-                <a:ea typeface="+mn-ea"/>
-                <a:cs typeface="+mn-cs"/>
-              </a:defRPr>
-            </a:lvl4pPr>
-            <a:lvl5pPr marL="2057400" indent="-228600" algn="l" defTabSz="914400" rtl="0" eaLnBrk="1" latinLnBrk="0" hangingPunct="1">
-              <a:lnSpc>
-                <a:spcPct val="90000"/>
-              </a:lnSpc>
-              <a:spcBef>
-                <a:spcPts val="500"/>
-              </a:spcBef>
-              <a:buFont typeface="Arial" panose="020B0604020202020204" pitchFamily="34" charset="0"/>
-              <a:buChar char="•"/>
-              <a:defRPr sz="1800" kern="1200">
-                <a:solidFill>
-                  <a:schemeClr val="tx1"/>
-                </a:solidFill>
-                <a:latin typeface="+mn-lt"/>
-                <a:ea typeface="+mn-ea"/>
-                <a:cs typeface="+mn-cs"/>
-              </a:defRPr>
-            </a:lvl5pPr>
-            <a:lvl6pPr marL="2514600" indent="-228600" algn="l" defTabSz="914400" rtl="0" eaLnBrk="1" latinLnBrk="0" hangingPunct="1">
-              <a:lnSpc>
-                <a:spcPct val="90000"/>
-              </a:lnSpc>
-              <a:spcBef>
-                <a:spcPts val="500"/>
-              </a:spcBef>
-              <a:buFont typeface="Arial" panose="020B0604020202020204" pitchFamily="34" charset="0"/>
-              <a:buChar char="•"/>
-              <a:defRPr sz="1800" kern="1200">
-                <a:solidFill>
-                  <a:schemeClr val="tx1"/>
-                </a:solidFill>
-                <a:latin typeface="+mn-lt"/>
-                <a:ea typeface="+mn-ea"/>
-                <a:cs typeface="+mn-cs"/>
-              </a:defRPr>
-            </a:lvl6pPr>
-            <a:lvl7pPr marL="2971800" indent="-228600" algn="l" defTabSz="914400" rtl="0" eaLnBrk="1" latinLnBrk="0" hangingPunct="1">
-              <a:lnSpc>
-                <a:spcPct val="90000"/>
-              </a:lnSpc>
-              <a:spcBef>
-                <a:spcPts val="500"/>
-              </a:spcBef>
-              <a:buFont typeface="Arial" panose="020B0604020202020204" pitchFamily="34" charset="0"/>
-              <a:buChar char="•"/>
-              <a:defRPr sz="1800" kern="1200">
-                <a:solidFill>
-                  <a:schemeClr val="tx1"/>
-                </a:solidFill>
-                <a:latin typeface="+mn-lt"/>
-                <a:ea typeface="+mn-ea"/>
-                <a:cs typeface="+mn-cs"/>
-              </a:defRPr>
-            </a:lvl7pPr>
-            <a:lvl8pPr marL="3429000" indent="-228600" algn="l" defTabSz="914400" rtl="0" eaLnBrk="1" latinLnBrk="0" hangingPunct="1">
-              <a:lnSpc>
-                <a:spcPct val="90000"/>
-              </a:lnSpc>
-              <a:spcBef>
-                <a:spcPts val="500"/>
-              </a:spcBef>
-              <a:buFont typeface="Arial" panose="020B0604020202020204" pitchFamily="34" charset="0"/>
-              <a:buChar char="•"/>
-              <a:defRPr sz="1800" kern="1200">
-                <a:solidFill>
-                  <a:schemeClr val="tx1"/>
-                </a:solidFill>
-                <a:latin typeface="+mn-lt"/>
-                <a:ea typeface="+mn-ea"/>
-                <a:cs typeface="+mn-cs"/>
-              </a:defRPr>
-            </a:lvl8pPr>
-            <a:lvl9pPr marL="3886200" indent="-228600" algn="l" defTabSz="914400" rtl="0" eaLnBrk="1" latinLnBrk="0" hangingPunct="1">
-              <a:lnSpc>
-                <a:spcPct val="90000"/>
-              </a:lnSpc>
-              <a:spcBef>
-                <a:spcPts val="500"/>
-              </a:spcBef>
-              <a:buFont typeface="Arial" panose="020B0604020202020204" pitchFamily="34" charset="0"/>
-              <a:buChar char="•"/>
-              <a:defRPr sz="1800" kern="1200">
-                <a:solidFill>
-                  <a:schemeClr val="tx1"/>
-                </a:solidFill>
-                <a:latin typeface="+mn-lt"/>
-                <a:ea typeface="+mn-ea"/>
-                <a:cs typeface="+mn-cs"/>
-              </a:defRPr>
-            </a:lvl9pPr>
-          </a:lstStyle>
-          <a:p>
-            <a:pPr marL="0" indent="0">
-              <a:lnSpc>
-                <a:spcPct val="100000"/>
-              </a:lnSpc>
-              <a:buNone/>
-            </a:pPr>
-            <a:r>
-              <a:rPr lang="de-AT" sz="1200" dirty="0">
-                <a:solidFill>
-                  <a:srgbClr val="000080"/>
-                </a:solidFill>
-              </a:rPr>
-              <a:t>var</a:t>
-            </a:r>
-            <a:r>
-              <a:rPr lang="de-AT" sz="1200" dirty="0"/>
-              <a:t> ga = </a:t>
-            </a:r>
-            <a:r>
-              <a:rPr lang="de-AT" sz="1200" dirty="0">
-                <a:solidFill>
-                  <a:srgbClr val="008B8B"/>
-                </a:solidFill>
-              </a:rPr>
-              <a:t>new</a:t>
-            </a:r>
-            <a:r>
-              <a:rPr lang="de-AT" sz="1200" dirty="0"/>
-              <a:t> </a:t>
-            </a:r>
-            <a:r>
-              <a:rPr lang="de-AT" sz="1200" dirty="0">
-                <a:solidFill>
-                  <a:srgbClr val="191970"/>
-                </a:solidFill>
-              </a:rPr>
-              <a:t>GeneticAlgorithm</a:t>
-            </a:r>
-            <a:r>
-              <a:rPr lang="de-AT" sz="1200" dirty="0"/>
-              <a:t>()</a:t>
-            </a:r>
-            <a:br>
-              <a:rPr lang="de-AT" sz="1200" dirty="0"/>
-            </a:br>
-            <a:r>
-              <a:rPr lang="de-AT" sz="1200" dirty="0">
-                <a:solidFill>
-                  <a:srgbClr val="008000"/>
-                </a:solidFill>
-              </a:rPr>
-              <a:t>// configure algorithm ...</a:t>
-            </a:r>
-            <a:r>
-              <a:rPr lang="de-AT" sz="1200" dirty="0"/>
-              <a:t/>
-            </a:r>
-            <a:br>
-              <a:rPr lang="de-AT" sz="1200" dirty="0"/>
-            </a:br>
-            <a:r>
-              <a:rPr lang="de-AT" sz="1200" dirty="0"/>
-              <a:t/>
-            </a:r>
-            <a:br>
-              <a:rPr lang="de-AT" sz="1200" dirty="0"/>
-            </a:br>
-            <a:r>
-              <a:rPr lang="de-AT" sz="1200" dirty="0"/>
-              <a:t>ga.</a:t>
-            </a:r>
-            <a:r>
-              <a:rPr lang="de-AT" sz="1200" dirty="0">
-                <a:solidFill>
-                  <a:srgbClr val="191970"/>
-                </a:solidFill>
-              </a:rPr>
-              <a:t>Start</a:t>
-            </a:r>
-            <a:r>
-              <a:rPr lang="de-AT" sz="1200" dirty="0"/>
-              <a:t>() </a:t>
-            </a:r>
-            <a:r>
-              <a:rPr lang="de-AT" sz="1200" dirty="0">
-                <a:solidFill>
-                  <a:srgbClr val="008000"/>
-                </a:solidFill>
-              </a:rPr>
-              <a:t>// start "synchronously" (calls StartAsync().Wait())</a:t>
-            </a:r>
-            <a:r>
-              <a:rPr lang="de-AT" sz="1200" dirty="0"/>
-              <a:t/>
-            </a:r>
-            <a:br>
-              <a:rPr lang="de-AT" sz="1200" dirty="0"/>
-            </a:br>
-            <a:r>
-              <a:rPr lang="de-AT" sz="1200" dirty="0"/>
-              <a:t>ga.</a:t>
-            </a:r>
-            <a:r>
-              <a:rPr lang="de-AT" sz="1200" dirty="0">
-                <a:solidFill>
-                  <a:srgbClr val="191970"/>
-                </a:solidFill>
-              </a:rPr>
-              <a:t>StartAsync</a:t>
-            </a:r>
-            <a:r>
-              <a:rPr lang="de-AT" sz="1200" dirty="0"/>
-              <a:t>() </a:t>
-            </a:r>
-            <a:r>
-              <a:rPr lang="de-AT" sz="1200" dirty="0">
-                <a:solidFill>
-                  <a:srgbClr val="008000"/>
-                </a:solidFill>
-              </a:rPr>
-              <a:t>// start asynchronously</a:t>
-            </a:r>
-            <a:r>
-              <a:rPr lang="de-AT" sz="1200" dirty="0"/>
-              <a:t/>
-            </a:r>
-            <a:br>
-              <a:rPr lang="de-AT" sz="1200" dirty="0"/>
-            </a:br>
-            <a:r>
-              <a:rPr lang="de-AT" sz="1200" dirty="0"/>
-              <a:t>ga.</a:t>
-            </a:r>
-            <a:r>
-              <a:rPr lang="de-AT" sz="1200" dirty="0">
-                <a:solidFill>
-                  <a:srgbClr val="191970"/>
-                </a:solidFill>
-              </a:rPr>
-              <a:t>StartAsync</a:t>
-            </a:r>
-            <a:r>
-              <a:rPr lang="de-AT" sz="1200" dirty="0"/>
-              <a:t>().</a:t>
-            </a:r>
-            <a:r>
-              <a:rPr lang="de-AT" sz="1200" dirty="0">
-                <a:solidFill>
-                  <a:srgbClr val="191970"/>
-                </a:solidFill>
-              </a:rPr>
-              <a:t>Wait</a:t>
-            </a:r>
-            <a:r>
-              <a:rPr lang="de-AT" sz="1200" dirty="0"/>
-              <a:t>() </a:t>
-            </a:r>
-            <a:r>
-              <a:rPr lang="de-AT" sz="1200" dirty="0">
-                <a:solidFill>
-                  <a:srgbClr val="008000"/>
-                </a:solidFill>
-              </a:rPr>
-              <a:t>// start asynchronously and wait</a:t>
-            </a:r>
-            <a:endParaRPr lang="de-DE" sz="1200" dirty="0"/>
+        <p:style>
+          <a:lnRef idx="2">
+            <a:schemeClr val="accent2"/>
+          </a:lnRef>
+          <a:fillRef idx="1">
+            <a:schemeClr val="lt1"/>
+          </a:fillRef>
+          <a:effectRef idx="0">
+            <a:schemeClr val="accent2"/>
+          </a:effectRef>
+          <a:fontRef idx="minor">
+            <a:schemeClr val="dk1"/>
+          </a:fontRef>
+        </p:style>
+        <p:txBody>
+          <a:bodyPr rtlCol="0" anchor="ctr"/>
+          <a:lstStyle/>
+          <a:p>
+            <a:pPr algn="ctr"/>
+            <a:endParaRPr lang="de-AT"/>
+          </a:p>
+        </p:txBody>
+      </p:sp>
+      <p:sp>
+        <p:nvSpPr>
+          <p:cNvPr id="9" name="Rectangle 8"/>
+          <p:cNvSpPr/>
+          <p:nvPr/>
+        </p:nvSpPr>
+        <p:spPr>
+          <a:xfrm>
+            <a:off x="4867449" y="4374435"/>
+            <a:ext cx="1275656" cy="207817"/>
+          </a:xfrm>
+          <a:prstGeom prst="rect">
+            <a:avLst/>
+          </a:prstGeom>
+          <a:noFill/>
+          <a:ln>
+            <a:solidFill>
+              <a:srgbClr val="FF0000"/>
+            </a:solidFill>
+          </a:ln>
+        </p:spPr>
+        <p:style>
+          <a:lnRef idx="2">
+            <a:schemeClr val="accent2"/>
+          </a:lnRef>
+          <a:fillRef idx="1">
+            <a:schemeClr val="lt1"/>
+          </a:fillRef>
+          <a:effectRef idx="0">
+            <a:schemeClr val="accent2"/>
+          </a:effectRef>
+          <a:fontRef idx="minor">
+            <a:schemeClr val="dk1"/>
+          </a:fontRef>
+        </p:style>
+        <p:txBody>
+          <a:bodyPr rtlCol="0" anchor="ctr"/>
+          <a:lstStyle/>
+          <a:p>
+            <a:pPr algn="ctr"/>
+            <a:endParaRPr lang="de-AT"/>
           </a:p>
         </p:txBody>
       </p:sp>
     </p:spTree>
     <p:extLst>
       <p:ext uri="{BB962C8B-B14F-4D97-AF65-F5344CB8AC3E}">
-        <p14:creationId xmlns:p14="http://schemas.microsoft.com/office/powerpoint/2010/main" val="1822671034"/>
+        <p14:creationId xmlns:p14="http://schemas.microsoft.com/office/powerpoint/2010/main" val="4092597754"/>
       </p:ext>
     </p:extLst>
   </p:cSld>

</xml_diff>